<commit_message>
Update the train detection part in the read me file.
</commit_message>
<xml_diff>
--- a/doc/designDoc.pptx
+++ b/doc/designDoc.pptx
@@ -5,10 +5,11 @@
     <p:sldMasterId id="2147483648" r:id="rId1"/>
   </p:sldMasterIdLst>
   <p:notesMasterIdLst>
-    <p:notesMasterId r:id="rId3"/>
+    <p:notesMasterId r:id="rId4"/>
   </p:notesMasterIdLst>
   <p:sldIdLst>
     <p:sldId id="256" r:id="rId2"/>
+    <p:sldId id="258" r:id="rId3"/>
   </p:sldIdLst>
   <p:sldSz cx="12192000" cy="6858000"/>
   <p:notesSz cx="6858000" cy="9144000"/>
@@ -197,7 +198,7 @@
           <a:p>
             <a:fld id="{B20EB3CF-2C03-445A-AC68-BFCA7FF1C3FD}" type="datetimeFigureOut">
               <a:rPr lang="en-SG" smtClean="0"/>
-              <a:t>9/2/2024</a:t>
+              <a:t>10/2/2024</a:t>
             </a:fld>
             <a:endParaRPr lang="en-SG"/>
           </a:p>
@@ -549,6 +550,114 @@
 </p:notes>
 </file>
 
+<file path=ppt/notesSlides/notesSlide2.xml><?xml version="1.0" encoding="utf-8"?>
+<p:notes xmlns:a="http://schemas.openxmlformats.org/drawingml/2006/main" xmlns:r="http://schemas.openxmlformats.org/officeDocument/2006/relationships" xmlns:p="http://schemas.openxmlformats.org/presentationml/2006/main">
+  <p:cSld>
+    <p:spTree>
+      <p:nvGrpSpPr>
+        <p:cNvPr id="1" name="">
+          <a:extLst>
+            <a:ext uri="{FF2B5EF4-FFF2-40B4-BE49-F238E27FC236}">
+              <a16:creationId xmlns:a16="http://schemas.microsoft.com/office/drawing/2014/main" id="{6B3B8FA2-D9AC-E8BF-B058-908A8CD7BE28}"/>
+            </a:ext>
+          </a:extLst>
+        </p:cNvPr>
+        <p:cNvGrpSpPr/>
+        <p:nvPr/>
+      </p:nvGrpSpPr>
+      <p:grpSpPr>
+        <a:xfrm>
+          <a:off x="0" y="0"/>
+          <a:ext cx="0" cy="0"/>
+          <a:chOff x="0" y="0"/>
+          <a:chExt cx="0" cy="0"/>
+        </a:xfrm>
+      </p:grpSpPr>
+      <p:sp>
+        <p:nvSpPr>
+          <p:cNvPr id="2" name="Slide Image Placeholder 1">
+            <a:extLst>
+              <a:ext uri="{FF2B5EF4-FFF2-40B4-BE49-F238E27FC236}">
+                <a16:creationId xmlns:a16="http://schemas.microsoft.com/office/drawing/2014/main" id="{5C4998AC-6750-2165-DFD7-010DA69AD79E}"/>
+              </a:ext>
+            </a:extLst>
+          </p:cNvPr>
+          <p:cNvSpPr>
+            <a:spLocks noGrp="1" noRot="1" noChangeAspect="1"/>
+          </p:cNvSpPr>
+          <p:nvPr>
+            <p:ph type="sldImg"/>
+          </p:nvPr>
+        </p:nvSpPr>
+        <p:spPr/>
+      </p:sp>
+      <p:sp>
+        <p:nvSpPr>
+          <p:cNvPr id="3" name="Notes Placeholder 2">
+            <a:extLst>
+              <a:ext uri="{FF2B5EF4-FFF2-40B4-BE49-F238E27FC236}">
+                <a16:creationId xmlns:a16="http://schemas.microsoft.com/office/drawing/2014/main" id="{F43621A7-BB8B-31FF-5E55-61F35D385771}"/>
+              </a:ext>
+            </a:extLst>
+          </p:cNvPr>
+          <p:cNvSpPr>
+            <a:spLocks noGrp="1"/>
+          </p:cNvSpPr>
+          <p:nvPr>
+            <p:ph type="body" idx="1"/>
+          </p:nvPr>
+        </p:nvSpPr>
+        <p:spPr/>
+        <p:txBody>
+          <a:bodyPr/>
+          <a:lstStyle/>
+          <a:p>
+            <a:endParaRPr lang="en-SG" dirty="0"/>
+          </a:p>
+        </p:txBody>
+      </p:sp>
+      <p:sp>
+        <p:nvSpPr>
+          <p:cNvPr id="4" name="Slide Number Placeholder 3">
+            <a:extLst>
+              <a:ext uri="{FF2B5EF4-FFF2-40B4-BE49-F238E27FC236}">
+                <a16:creationId xmlns:a16="http://schemas.microsoft.com/office/drawing/2014/main" id="{A65F43A9-02B3-1B63-1FFC-E4A4009A49A1}"/>
+              </a:ext>
+            </a:extLst>
+          </p:cNvPr>
+          <p:cNvSpPr>
+            <a:spLocks noGrp="1"/>
+          </p:cNvSpPr>
+          <p:nvPr>
+            <p:ph type="sldNum" sz="quarter" idx="5"/>
+          </p:nvPr>
+        </p:nvSpPr>
+        <p:spPr/>
+        <p:txBody>
+          <a:bodyPr/>
+          <a:lstStyle/>
+          <a:p>
+            <a:fld id="{19C3B740-82E1-45ED-83DB-9842BDDAE2E6}" type="slidenum">
+              <a:rPr lang="en-SG" smtClean="0"/>
+              <a:t>2</a:t>
+            </a:fld>
+            <a:endParaRPr lang="en-SG"/>
+          </a:p>
+        </p:txBody>
+      </p:sp>
+    </p:spTree>
+    <p:extLst>
+      <p:ext uri="{BB962C8B-B14F-4D97-AF65-F5344CB8AC3E}">
+        <p14:creationId xmlns:p14="http://schemas.microsoft.com/office/powerpoint/2010/main" val="3623944080"/>
+      </p:ext>
+    </p:extLst>
+  </p:cSld>
+  <p:clrMapOvr>
+    <a:masterClrMapping/>
+  </p:clrMapOvr>
+</p:notes>
+</file>
+
 <file path=ppt/slideLayouts/slideLayout1.xml><?xml version="1.0" encoding="utf-8"?>
 <p:sldLayout xmlns:a="http://schemas.openxmlformats.org/drawingml/2006/main" xmlns:r="http://schemas.openxmlformats.org/officeDocument/2006/relationships" xmlns:p="http://schemas.openxmlformats.org/presentationml/2006/main" type="title" preserve="1">
   <p:cSld name="Title Slide">
@@ -698,7 +807,7 @@
           <a:p>
             <a:fld id="{80132922-2178-4F3C-8D0D-6F4C7FD468A5}" type="datetimeFigureOut">
               <a:rPr lang="en-SG" smtClean="0"/>
-              <a:t>9/2/2024</a:t>
+              <a:t>10/2/2024</a:t>
             </a:fld>
             <a:endParaRPr lang="en-SG"/>
           </a:p>
@@ -898,7 +1007,7 @@
           <a:p>
             <a:fld id="{80132922-2178-4F3C-8D0D-6F4C7FD468A5}" type="datetimeFigureOut">
               <a:rPr lang="en-SG" smtClean="0"/>
-              <a:t>9/2/2024</a:t>
+              <a:t>10/2/2024</a:t>
             </a:fld>
             <a:endParaRPr lang="en-SG"/>
           </a:p>
@@ -1108,7 +1217,7 @@
           <a:p>
             <a:fld id="{80132922-2178-4F3C-8D0D-6F4C7FD468A5}" type="datetimeFigureOut">
               <a:rPr lang="en-SG" smtClean="0"/>
-              <a:t>9/2/2024</a:t>
+              <a:t>10/2/2024</a:t>
             </a:fld>
             <a:endParaRPr lang="en-SG"/>
           </a:p>
@@ -1308,7 +1417,7 @@
           <a:p>
             <a:fld id="{80132922-2178-4F3C-8D0D-6F4C7FD468A5}" type="datetimeFigureOut">
               <a:rPr lang="en-SG" smtClean="0"/>
-              <a:t>9/2/2024</a:t>
+              <a:t>10/2/2024</a:t>
             </a:fld>
             <a:endParaRPr lang="en-SG"/>
           </a:p>
@@ -1584,7 +1693,7 @@
           <a:p>
             <a:fld id="{80132922-2178-4F3C-8D0D-6F4C7FD468A5}" type="datetimeFigureOut">
               <a:rPr lang="en-SG" smtClean="0"/>
-              <a:t>9/2/2024</a:t>
+              <a:t>10/2/2024</a:t>
             </a:fld>
             <a:endParaRPr lang="en-SG"/>
           </a:p>
@@ -1852,7 +1961,7 @@
           <a:p>
             <a:fld id="{80132922-2178-4F3C-8D0D-6F4C7FD468A5}" type="datetimeFigureOut">
               <a:rPr lang="en-SG" smtClean="0"/>
-              <a:t>9/2/2024</a:t>
+              <a:t>10/2/2024</a:t>
             </a:fld>
             <a:endParaRPr lang="en-SG"/>
           </a:p>
@@ -2267,7 +2376,7 @@
           <a:p>
             <a:fld id="{80132922-2178-4F3C-8D0D-6F4C7FD468A5}" type="datetimeFigureOut">
               <a:rPr lang="en-SG" smtClean="0"/>
-              <a:t>9/2/2024</a:t>
+              <a:t>10/2/2024</a:t>
             </a:fld>
             <a:endParaRPr lang="en-SG"/>
           </a:p>
@@ -2409,7 +2518,7 @@
           <a:p>
             <a:fld id="{80132922-2178-4F3C-8D0D-6F4C7FD468A5}" type="datetimeFigureOut">
               <a:rPr lang="en-SG" smtClean="0"/>
-              <a:t>9/2/2024</a:t>
+              <a:t>10/2/2024</a:t>
             </a:fld>
             <a:endParaRPr lang="en-SG"/>
           </a:p>
@@ -2522,7 +2631,7 @@
           <a:p>
             <a:fld id="{80132922-2178-4F3C-8D0D-6F4C7FD468A5}" type="datetimeFigureOut">
               <a:rPr lang="en-SG" smtClean="0"/>
-              <a:t>9/2/2024</a:t>
+              <a:t>10/2/2024</a:t>
             </a:fld>
             <a:endParaRPr lang="en-SG"/>
           </a:p>
@@ -2835,7 +2944,7 @@
           <a:p>
             <a:fld id="{80132922-2178-4F3C-8D0D-6F4C7FD468A5}" type="datetimeFigureOut">
               <a:rPr lang="en-SG" smtClean="0"/>
-              <a:t>9/2/2024</a:t>
+              <a:t>10/2/2024</a:t>
             </a:fld>
             <a:endParaRPr lang="en-SG"/>
           </a:p>
@@ -3124,7 +3233,7 @@
           <a:p>
             <a:fld id="{80132922-2178-4F3C-8D0D-6F4C7FD468A5}" type="datetimeFigureOut">
               <a:rPr lang="en-SG" smtClean="0"/>
-              <a:t>9/2/2024</a:t>
+              <a:t>10/2/2024</a:t>
             </a:fld>
             <a:endParaRPr lang="en-SG"/>
           </a:p>
@@ -3367,7 +3476,7 @@
           <a:p>
             <a:fld id="{80132922-2178-4F3C-8D0D-6F4C7FD468A5}" type="datetimeFigureOut">
               <a:rPr lang="en-SG" smtClean="0"/>
-              <a:t>9/2/2024</a:t>
+              <a:t>10/2/2024</a:t>
             </a:fld>
             <a:endParaRPr lang="en-SG"/>
           </a:p>
@@ -6084,6 +6193,1692 @@
     <p:extLst>
       <p:ext uri="{BB962C8B-B14F-4D97-AF65-F5344CB8AC3E}">
         <p14:creationId xmlns:p14="http://schemas.microsoft.com/office/powerpoint/2010/main" val="3536045105"/>
+      </p:ext>
+    </p:extLst>
+  </p:cSld>
+  <p:clrMapOvr>
+    <a:masterClrMapping/>
+  </p:clrMapOvr>
+</p:sld>
+</file>
+
+<file path=ppt/slides/slide2.xml><?xml version="1.0" encoding="utf-8"?>
+<p:sld xmlns:a="http://schemas.openxmlformats.org/drawingml/2006/main" xmlns:r="http://schemas.openxmlformats.org/officeDocument/2006/relationships" xmlns:p="http://schemas.openxmlformats.org/presentationml/2006/main">
+  <p:cSld>
+    <p:spTree>
+      <p:nvGrpSpPr>
+        <p:cNvPr id="1" name="">
+          <a:extLst>
+            <a:ext uri="{FF2B5EF4-FFF2-40B4-BE49-F238E27FC236}">
+              <a16:creationId xmlns:a16="http://schemas.microsoft.com/office/drawing/2014/main" id="{0E85DE36-E84B-5C13-6563-F63925092182}"/>
+            </a:ext>
+          </a:extLst>
+        </p:cNvPr>
+        <p:cNvGrpSpPr/>
+        <p:nvPr/>
+      </p:nvGrpSpPr>
+      <p:grpSpPr>
+        <a:xfrm>
+          <a:off x="0" y="0"/>
+          <a:ext cx="0" cy="0"/>
+          <a:chOff x="0" y="0"/>
+          <a:chExt cx="0" cy="0"/>
+        </a:xfrm>
+      </p:grpSpPr>
+      <p:pic>
+        <p:nvPicPr>
+          <p:cNvPr id="9" name="Picture 8" descr="A screenshot of a computer&#10;&#10;Description automatically generated">
+            <a:extLst>
+              <a:ext uri="{FF2B5EF4-FFF2-40B4-BE49-F238E27FC236}">
+                <a16:creationId xmlns:a16="http://schemas.microsoft.com/office/drawing/2014/main" id="{4B207725-C025-D3F6-B98C-BFBE0A5381A7}"/>
+              </a:ext>
+            </a:extLst>
+          </p:cNvPr>
+          <p:cNvPicPr>
+            <a:picLocks noChangeAspect="1"/>
+          </p:cNvPicPr>
+          <p:nvPr/>
+        </p:nvPicPr>
+        <p:blipFill>
+          <a:blip r:embed="rId3">
+            <a:extLst>
+              <a:ext uri="{28A0092B-C50C-407E-A947-70E740481C1C}">
+                <a14:useLocalDpi xmlns:a14="http://schemas.microsoft.com/office/drawing/2010/main" val="0"/>
+              </a:ext>
+            </a:extLst>
+          </a:blip>
+          <a:stretch>
+            <a:fillRect/>
+          </a:stretch>
+        </p:blipFill>
+        <p:spPr>
+          <a:xfrm>
+            <a:off x="8876670" y="2196930"/>
+            <a:ext cx="2949526" cy="1689455"/>
+          </a:xfrm>
+          <a:prstGeom prst="rect">
+            <a:avLst/>
+          </a:prstGeom>
+        </p:spPr>
+      </p:pic>
+      <p:pic>
+        <p:nvPicPr>
+          <p:cNvPr id="12" name="Picture 11">
+            <a:extLst>
+              <a:ext uri="{FF2B5EF4-FFF2-40B4-BE49-F238E27FC236}">
+                <a16:creationId xmlns:a16="http://schemas.microsoft.com/office/drawing/2014/main" id="{F7183DC6-920A-12E9-1ED7-0798624380EE}"/>
+              </a:ext>
+            </a:extLst>
+          </p:cNvPr>
+          <p:cNvPicPr>
+            <a:picLocks noChangeAspect="1"/>
+          </p:cNvPicPr>
+          <p:nvPr/>
+        </p:nvPicPr>
+        <p:blipFill>
+          <a:blip r:embed="rId4"/>
+          <a:stretch>
+            <a:fillRect/>
+          </a:stretch>
+        </p:blipFill>
+        <p:spPr>
+          <a:xfrm>
+            <a:off x="404125" y="1718730"/>
+            <a:ext cx="4714286" cy="2761905"/>
+          </a:xfrm>
+          <a:prstGeom prst="rect">
+            <a:avLst/>
+          </a:prstGeom>
+          <a:ln w="9525">
+            <a:solidFill>
+              <a:schemeClr val="tx1"/>
+            </a:solidFill>
+          </a:ln>
+        </p:spPr>
+      </p:pic>
+      <p:cxnSp>
+        <p:nvCxnSpPr>
+          <p:cNvPr id="7" name="Straight Arrow Connector 6">
+            <a:extLst>
+              <a:ext uri="{FF2B5EF4-FFF2-40B4-BE49-F238E27FC236}">
+                <a16:creationId xmlns:a16="http://schemas.microsoft.com/office/drawing/2014/main" id="{C79CADF0-82B3-499D-BB9B-5CC9932130BE}"/>
+              </a:ext>
+            </a:extLst>
+          </p:cNvPr>
+          <p:cNvCxnSpPr>
+            <a:cxnSpLocks/>
+            <a:endCxn id="16" idx="1"/>
+          </p:cNvCxnSpPr>
+          <p:nvPr/>
+        </p:nvCxnSpPr>
+        <p:spPr>
+          <a:xfrm>
+            <a:off x="4068756" y="2294890"/>
+            <a:ext cx="1837122" cy="1196667"/>
+          </a:xfrm>
+          <a:prstGeom prst="straightConnector1">
+            <a:avLst/>
+          </a:prstGeom>
+          <a:ln w="28575">
+            <a:solidFill>
+              <a:srgbClr val="00B050"/>
+            </a:solidFill>
+            <a:tailEnd type="triangle"/>
+          </a:ln>
+        </p:spPr>
+        <p:style>
+          <a:lnRef idx="2">
+            <a:schemeClr val="accent1"/>
+          </a:lnRef>
+          <a:fillRef idx="0">
+            <a:schemeClr val="accent1"/>
+          </a:fillRef>
+          <a:effectRef idx="1">
+            <a:schemeClr val="accent1"/>
+          </a:effectRef>
+          <a:fontRef idx="minor">
+            <a:schemeClr val="tx1"/>
+          </a:fontRef>
+        </p:style>
+      </p:cxnSp>
+      <p:pic>
+        <p:nvPicPr>
+          <p:cNvPr id="16" name="Picture 15">
+            <a:extLst>
+              <a:ext uri="{FF2B5EF4-FFF2-40B4-BE49-F238E27FC236}">
+                <a16:creationId xmlns:a16="http://schemas.microsoft.com/office/drawing/2014/main" id="{99B83D4C-6989-335A-DD2B-611D6A92A614}"/>
+              </a:ext>
+            </a:extLst>
+          </p:cNvPr>
+          <p:cNvPicPr>
+            <a:picLocks noChangeAspect="1"/>
+          </p:cNvPicPr>
+          <p:nvPr/>
+        </p:nvPicPr>
+        <p:blipFill>
+          <a:blip r:embed="rId5">
+            <a:duotone>
+              <a:schemeClr val="accent3">
+                <a:shade val="45000"/>
+                <a:satMod val="135000"/>
+              </a:schemeClr>
+              <a:prstClr val="white"/>
+            </a:duotone>
+          </a:blip>
+          <a:stretch>
+            <a:fillRect/>
+          </a:stretch>
+        </p:blipFill>
+        <p:spPr>
+          <a:xfrm>
+            <a:off x="5905878" y="3291557"/>
+            <a:ext cx="476190" cy="400000"/>
+          </a:xfrm>
+          <a:prstGeom prst="rect">
+            <a:avLst/>
+          </a:prstGeom>
+        </p:spPr>
+      </p:pic>
+      <p:pic>
+        <p:nvPicPr>
+          <p:cNvPr id="20" name="Picture 19">
+            <a:extLst>
+              <a:ext uri="{FF2B5EF4-FFF2-40B4-BE49-F238E27FC236}">
+                <a16:creationId xmlns:a16="http://schemas.microsoft.com/office/drawing/2014/main" id="{0CD7ABFB-99C1-2DD0-17D1-146C246AD342}"/>
+              </a:ext>
+            </a:extLst>
+          </p:cNvPr>
+          <p:cNvPicPr>
+            <a:picLocks noChangeAspect="1"/>
+          </p:cNvPicPr>
+          <p:nvPr/>
+        </p:nvPicPr>
+        <p:blipFill>
+          <a:blip r:embed="rId6"/>
+          <a:stretch>
+            <a:fillRect/>
+          </a:stretch>
+        </p:blipFill>
+        <p:spPr>
+          <a:xfrm>
+            <a:off x="6974731" y="3317042"/>
+            <a:ext cx="952381" cy="971429"/>
+          </a:xfrm>
+          <a:prstGeom prst="rect">
+            <a:avLst/>
+          </a:prstGeom>
+          <a:solidFill>
+            <a:schemeClr val="tx1"/>
+          </a:solidFill>
+          <a:ln>
+            <a:solidFill>
+              <a:schemeClr val="tx1"/>
+            </a:solidFill>
+          </a:ln>
+        </p:spPr>
+      </p:pic>
+      <p:cxnSp>
+        <p:nvCxnSpPr>
+          <p:cNvPr id="21" name="Straight Arrow Connector 20">
+            <a:extLst>
+              <a:ext uri="{FF2B5EF4-FFF2-40B4-BE49-F238E27FC236}">
+                <a16:creationId xmlns:a16="http://schemas.microsoft.com/office/drawing/2014/main" id="{B158E64E-4B4A-9D08-706A-2C1C966C5FE4}"/>
+              </a:ext>
+            </a:extLst>
+          </p:cNvPr>
+          <p:cNvCxnSpPr>
+            <a:cxnSpLocks/>
+            <a:stCxn id="16" idx="3"/>
+          </p:cNvCxnSpPr>
+          <p:nvPr/>
+        </p:nvCxnSpPr>
+        <p:spPr>
+          <a:xfrm>
+            <a:off x="6382068" y="3491557"/>
+            <a:ext cx="532036" cy="0"/>
+          </a:xfrm>
+          <a:prstGeom prst="straightConnector1">
+            <a:avLst/>
+          </a:prstGeom>
+          <a:ln w="28575">
+            <a:solidFill>
+              <a:srgbClr val="00B050"/>
+            </a:solidFill>
+            <a:tailEnd type="triangle"/>
+          </a:ln>
+        </p:spPr>
+        <p:style>
+          <a:lnRef idx="2">
+            <a:schemeClr val="accent1"/>
+          </a:lnRef>
+          <a:fillRef idx="0">
+            <a:schemeClr val="accent1"/>
+          </a:fillRef>
+          <a:effectRef idx="1">
+            <a:schemeClr val="accent1"/>
+          </a:effectRef>
+          <a:fontRef idx="minor">
+            <a:schemeClr val="tx1"/>
+          </a:fontRef>
+        </p:style>
+      </p:cxnSp>
+      <p:cxnSp>
+        <p:nvCxnSpPr>
+          <p:cNvPr id="23" name="Straight Arrow Connector 22">
+            <a:extLst>
+              <a:ext uri="{FF2B5EF4-FFF2-40B4-BE49-F238E27FC236}">
+                <a16:creationId xmlns:a16="http://schemas.microsoft.com/office/drawing/2014/main" id="{EA4B0E44-8E6D-8B7F-F28F-F32A4F4219CB}"/>
+              </a:ext>
+            </a:extLst>
+          </p:cNvPr>
+          <p:cNvCxnSpPr>
+            <a:cxnSpLocks/>
+          </p:cNvCxnSpPr>
+          <p:nvPr/>
+        </p:nvCxnSpPr>
+        <p:spPr>
+          <a:xfrm>
+            <a:off x="7999310" y="3691557"/>
+            <a:ext cx="830589" cy="0"/>
+          </a:xfrm>
+          <a:prstGeom prst="straightConnector1">
+            <a:avLst/>
+          </a:prstGeom>
+          <a:ln w="28575">
+            <a:solidFill>
+              <a:srgbClr val="00B050"/>
+            </a:solidFill>
+            <a:tailEnd type="triangle"/>
+          </a:ln>
+        </p:spPr>
+        <p:style>
+          <a:lnRef idx="2">
+            <a:schemeClr val="accent1"/>
+          </a:lnRef>
+          <a:fillRef idx="0">
+            <a:schemeClr val="accent1"/>
+          </a:fillRef>
+          <a:effectRef idx="1">
+            <a:schemeClr val="accent1"/>
+          </a:effectRef>
+          <a:fontRef idx="minor">
+            <a:schemeClr val="tx1"/>
+          </a:fontRef>
+        </p:style>
+      </p:cxnSp>
+      <p:pic>
+        <p:nvPicPr>
+          <p:cNvPr id="61" name="Picture 60">
+            <a:extLst>
+              <a:ext uri="{FF2B5EF4-FFF2-40B4-BE49-F238E27FC236}">
+                <a16:creationId xmlns:a16="http://schemas.microsoft.com/office/drawing/2014/main" id="{C9CCB4A0-2258-03EC-078D-9504B950CBD0}"/>
+              </a:ext>
+            </a:extLst>
+          </p:cNvPr>
+          <p:cNvPicPr>
+            <a:picLocks noChangeAspect="1"/>
+          </p:cNvPicPr>
+          <p:nvPr/>
+        </p:nvPicPr>
+        <p:blipFill>
+          <a:blip r:embed="rId7"/>
+          <a:stretch>
+            <a:fillRect/>
+          </a:stretch>
+        </p:blipFill>
+        <p:spPr>
+          <a:xfrm>
+            <a:off x="10106168" y="4119614"/>
+            <a:ext cx="489507" cy="569523"/>
+          </a:xfrm>
+          <a:prstGeom prst="rect">
+            <a:avLst/>
+          </a:prstGeom>
+          <a:ln w="9525">
+            <a:solidFill>
+              <a:schemeClr val="tx1"/>
+            </a:solidFill>
+          </a:ln>
+        </p:spPr>
+      </p:pic>
+      <p:sp>
+        <p:nvSpPr>
+          <p:cNvPr id="64" name="TextBox 63">
+            <a:extLst>
+              <a:ext uri="{FF2B5EF4-FFF2-40B4-BE49-F238E27FC236}">
+                <a16:creationId xmlns:a16="http://schemas.microsoft.com/office/drawing/2014/main" id="{3608B9C7-BBE4-A26E-21B8-A8B531582F3C}"/>
+              </a:ext>
+            </a:extLst>
+          </p:cNvPr>
+          <p:cNvSpPr txBox="1"/>
+          <p:nvPr/>
+        </p:nvSpPr>
+        <p:spPr>
+          <a:xfrm>
+            <a:off x="5287167" y="4653866"/>
+            <a:ext cx="1929530" cy="461665"/>
+          </a:xfrm>
+          <a:prstGeom prst="rect">
+            <a:avLst/>
+          </a:prstGeom>
+          <a:noFill/>
+        </p:spPr>
+        <p:txBody>
+          <a:bodyPr wrap="square">
+            <a:spAutoFit/>
+          </a:bodyPr>
+          <a:lstStyle/>
+          <a:p>
+            <a:r>
+              <a:rPr lang="en-US" sz="1200" b="1" dirty="0">
+                <a:solidFill>
+                  <a:schemeClr val="accent6">
+                    <a:lumMod val="50000"/>
+                  </a:schemeClr>
+                </a:solidFill>
+              </a:rPr>
+              <a:t>Normal train detection video stream </a:t>
+            </a:r>
+            <a:endParaRPr lang="en-SG" sz="1200" b="1" dirty="0">
+              <a:solidFill>
+                <a:schemeClr val="accent6">
+                  <a:lumMod val="50000"/>
+                </a:schemeClr>
+              </a:solidFill>
+            </a:endParaRPr>
+          </a:p>
+        </p:txBody>
+      </p:sp>
+      <p:sp>
+        <p:nvSpPr>
+          <p:cNvPr id="66" name="TextBox 65">
+            <a:extLst>
+              <a:ext uri="{FF2B5EF4-FFF2-40B4-BE49-F238E27FC236}">
+                <a16:creationId xmlns:a16="http://schemas.microsoft.com/office/drawing/2014/main" id="{364A38B7-C4E1-BA79-57CF-DC9D02671393}"/>
+              </a:ext>
+            </a:extLst>
+          </p:cNvPr>
+          <p:cNvSpPr txBox="1"/>
+          <p:nvPr/>
+        </p:nvSpPr>
+        <p:spPr>
+          <a:xfrm>
+            <a:off x="6708758" y="2794511"/>
+            <a:ext cx="1971236" cy="461665"/>
+          </a:xfrm>
+          <a:prstGeom prst="rect">
+            <a:avLst/>
+          </a:prstGeom>
+          <a:noFill/>
+        </p:spPr>
+        <p:txBody>
+          <a:bodyPr wrap="square">
+            <a:spAutoFit/>
+          </a:bodyPr>
+          <a:lstStyle/>
+          <a:p>
+            <a:r>
+              <a:rPr lang="en-US" sz="1200" b="1" dirty="0"/>
+              <a:t>Train video process [train detection] computer </a:t>
+            </a:r>
+            <a:endParaRPr lang="en-SG" sz="1200" b="1" dirty="0"/>
+          </a:p>
+        </p:txBody>
+      </p:sp>
+      <p:sp>
+        <p:nvSpPr>
+          <p:cNvPr id="67" name="TextBox 66">
+            <a:extLst>
+              <a:ext uri="{FF2B5EF4-FFF2-40B4-BE49-F238E27FC236}">
+                <a16:creationId xmlns:a16="http://schemas.microsoft.com/office/drawing/2014/main" id="{628092DF-A3D7-C39F-F441-084E0CFA9F35}"/>
+              </a:ext>
+            </a:extLst>
+          </p:cNvPr>
+          <p:cNvSpPr txBox="1"/>
+          <p:nvPr/>
+        </p:nvSpPr>
+        <p:spPr>
+          <a:xfrm>
+            <a:off x="10595675" y="4165638"/>
+            <a:ext cx="1245964" cy="461665"/>
+          </a:xfrm>
+          <a:prstGeom prst="rect">
+            <a:avLst/>
+          </a:prstGeom>
+          <a:noFill/>
+        </p:spPr>
+        <p:txBody>
+          <a:bodyPr wrap="square">
+            <a:spAutoFit/>
+          </a:bodyPr>
+          <a:lstStyle/>
+          <a:p>
+            <a:r>
+              <a:rPr lang="en-US" sz="1200" b="1" dirty="0"/>
+              <a:t>Railway station operator </a:t>
+            </a:r>
+            <a:endParaRPr lang="en-SG" sz="1200" b="1" dirty="0"/>
+          </a:p>
+        </p:txBody>
+      </p:sp>
+      <p:cxnSp>
+        <p:nvCxnSpPr>
+          <p:cNvPr id="68" name="Straight Arrow Connector 67">
+            <a:extLst>
+              <a:ext uri="{FF2B5EF4-FFF2-40B4-BE49-F238E27FC236}">
+                <a16:creationId xmlns:a16="http://schemas.microsoft.com/office/drawing/2014/main" id="{12F3267B-B289-E44B-21BE-1C8A9E2F23FF}"/>
+              </a:ext>
+            </a:extLst>
+          </p:cNvPr>
+          <p:cNvCxnSpPr>
+            <a:cxnSpLocks/>
+          </p:cNvCxnSpPr>
+          <p:nvPr/>
+        </p:nvCxnSpPr>
+        <p:spPr>
+          <a:xfrm flipV="1">
+            <a:off x="10350922" y="3898767"/>
+            <a:ext cx="0" cy="194891"/>
+          </a:xfrm>
+          <a:prstGeom prst="straightConnector1">
+            <a:avLst/>
+          </a:prstGeom>
+          <a:ln w="28575">
+            <a:tailEnd type="triangle"/>
+          </a:ln>
+        </p:spPr>
+        <p:style>
+          <a:lnRef idx="1">
+            <a:schemeClr val="dk1"/>
+          </a:lnRef>
+          <a:fillRef idx="0">
+            <a:schemeClr val="dk1"/>
+          </a:fillRef>
+          <a:effectRef idx="0">
+            <a:schemeClr val="dk1"/>
+          </a:effectRef>
+          <a:fontRef idx="minor">
+            <a:schemeClr val="tx1"/>
+          </a:fontRef>
+        </p:style>
+      </p:cxnSp>
+      <p:sp>
+        <p:nvSpPr>
+          <p:cNvPr id="80" name="TextBox 79">
+            <a:extLst>
+              <a:ext uri="{FF2B5EF4-FFF2-40B4-BE49-F238E27FC236}">
+                <a16:creationId xmlns:a16="http://schemas.microsoft.com/office/drawing/2014/main" id="{82A89B09-827E-C3EB-007D-CFA57E3D819F}"/>
+              </a:ext>
+            </a:extLst>
+          </p:cNvPr>
+          <p:cNvSpPr txBox="1"/>
+          <p:nvPr/>
+        </p:nvSpPr>
+        <p:spPr>
+          <a:xfrm>
+            <a:off x="7984255" y="3980972"/>
+            <a:ext cx="1270691" cy="646331"/>
+          </a:xfrm>
+          <a:prstGeom prst="rect">
+            <a:avLst/>
+          </a:prstGeom>
+          <a:noFill/>
+        </p:spPr>
+        <p:txBody>
+          <a:bodyPr wrap="square">
+            <a:spAutoFit/>
+          </a:bodyPr>
+          <a:lstStyle/>
+          <a:p>
+            <a:r>
+              <a:rPr lang="en-US" sz="1200" b="1" dirty="0">
+                <a:solidFill>
+                  <a:schemeClr val="accent6">
+                    <a:lumMod val="50000"/>
+                  </a:schemeClr>
+                </a:solidFill>
+              </a:rPr>
+              <a:t>Correct train detection docking signal</a:t>
+            </a:r>
+            <a:endParaRPr lang="en-SG" sz="1200" b="1" dirty="0">
+              <a:solidFill>
+                <a:schemeClr val="accent6">
+                  <a:lumMod val="50000"/>
+                </a:schemeClr>
+              </a:solidFill>
+            </a:endParaRPr>
+          </a:p>
+        </p:txBody>
+      </p:sp>
+      <p:sp>
+        <p:nvSpPr>
+          <p:cNvPr id="81" name="TextBox 80">
+            <a:extLst>
+              <a:ext uri="{FF2B5EF4-FFF2-40B4-BE49-F238E27FC236}">
+                <a16:creationId xmlns:a16="http://schemas.microsoft.com/office/drawing/2014/main" id="{862D7D4F-952A-7FF0-4C81-0FB92822172F}"/>
+              </a:ext>
+            </a:extLst>
+          </p:cNvPr>
+          <p:cNvSpPr txBox="1"/>
+          <p:nvPr/>
+        </p:nvSpPr>
+        <p:spPr>
+          <a:xfrm>
+            <a:off x="8799041" y="1892714"/>
+            <a:ext cx="3126971" cy="307777"/>
+          </a:xfrm>
+          <a:prstGeom prst="rect">
+            <a:avLst/>
+          </a:prstGeom>
+          <a:noFill/>
+        </p:spPr>
+        <p:txBody>
+          <a:bodyPr wrap="square">
+            <a:spAutoFit/>
+          </a:bodyPr>
+          <a:lstStyle/>
+          <a:p>
+            <a:r>
+              <a:rPr lang="en-US" sz="1400" b="1" dirty="0"/>
+              <a:t>Railway Station Signal Control HMI</a:t>
+            </a:r>
+            <a:endParaRPr lang="en-SG" sz="1400" b="1" dirty="0"/>
+          </a:p>
+        </p:txBody>
+      </p:sp>
+      <p:sp>
+        <p:nvSpPr>
+          <p:cNvPr id="82" name="TextBox 81">
+            <a:extLst>
+              <a:ext uri="{FF2B5EF4-FFF2-40B4-BE49-F238E27FC236}">
+                <a16:creationId xmlns:a16="http://schemas.microsoft.com/office/drawing/2014/main" id="{61F80B34-1D46-9B6C-A62F-2FBA2D7C8047}"/>
+              </a:ext>
+            </a:extLst>
+          </p:cNvPr>
+          <p:cNvSpPr txBox="1"/>
+          <p:nvPr/>
+        </p:nvSpPr>
+        <p:spPr>
+          <a:xfrm>
+            <a:off x="338668" y="1427256"/>
+            <a:ext cx="2144557" cy="307777"/>
+          </a:xfrm>
+          <a:prstGeom prst="rect">
+            <a:avLst/>
+          </a:prstGeom>
+          <a:noFill/>
+        </p:spPr>
+        <p:txBody>
+          <a:bodyPr wrap="square">
+            <a:spAutoFit/>
+          </a:bodyPr>
+          <a:lstStyle/>
+          <a:p>
+            <a:r>
+              <a:rPr lang="en-US" sz="1400" b="1" dirty="0"/>
+              <a:t>Real world emulator </a:t>
+            </a:r>
+            <a:endParaRPr lang="en-SG" sz="1400" b="1" dirty="0"/>
+          </a:p>
+        </p:txBody>
+      </p:sp>
+      <p:cxnSp>
+        <p:nvCxnSpPr>
+          <p:cNvPr id="84" name="Straight Arrow Connector 83">
+            <a:extLst>
+              <a:ext uri="{FF2B5EF4-FFF2-40B4-BE49-F238E27FC236}">
+                <a16:creationId xmlns:a16="http://schemas.microsoft.com/office/drawing/2014/main" id="{812AC911-403D-DF44-3C24-FE469DE882E9}"/>
+              </a:ext>
+            </a:extLst>
+          </p:cNvPr>
+          <p:cNvCxnSpPr>
+            <a:cxnSpLocks/>
+          </p:cNvCxnSpPr>
+          <p:nvPr/>
+        </p:nvCxnSpPr>
+        <p:spPr>
+          <a:xfrm>
+            <a:off x="3141722" y="1593451"/>
+            <a:ext cx="735786" cy="690603"/>
+          </a:xfrm>
+          <a:prstGeom prst="straightConnector1">
+            <a:avLst/>
+          </a:prstGeom>
+          <a:ln>
+            <a:solidFill>
+              <a:srgbClr val="FF9900"/>
+            </a:solidFill>
+            <a:tailEnd type="triangle"/>
+          </a:ln>
+        </p:spPr>
+        <p:style>
+          <a:lnRef idx="2">
+            <a:schemeClr val="accent1"/>
+          </a:lnRef>
+          <a:fillRef idx="0">
+            <a:schemeClr val="accent1"/>
+          </a:fillRef>
+          <a:effectRef idx="1">
+            <a:schemeClr val="accent1"/>
+          </a:effectRef>
+          <a:fontRef idx="minor">
+            <a:schemeClr val="tx1"/>
+          </a:fontRef>
+        </p:style>
+      </p:cxnSp>
+      <p:sp>
+        <p:nvSpPr>
+          <p:cNvPr id="89" name="TextBox 88">
+            <a:extLst>
+              <a:ext uri="{FF2B5EF4-FFF2-40B4-BE49-F238E27FC236}">
+                <a16:creationId xmlns:a16="http://schemas.microsoft.com/office/drawing/2014/main" id="{690CEAC3-F14F-3E47-BAEA-9EB02E05BDC7}"/>
+              </a:ext>
+            </a:extLst>
+          </p:cNvPr>
+          <p:cNvSpPr txBox="1"/>
+          <p:nvPr/>
+        </p:nvSpPr>
+        <p:spPr>
+          <a:xfrm>
+            <a:off x="2464414" y="1249943"/>
+            <a:ext cx="1144339" cy="461665"/>
+          </a:xfrm>
+          <a:prstGeom prst="rect">
+            <a:avLst/>
+          </a:prstGeom>
+          <a:noFill/>
+        </p:spPr>
+        <p:txBody>
+          <a:bodyPr wrap="square">
+            <a:spAutoFit/>
+          </a:bodyPr>
+          <a:lstStyle/>
+          <a:p>
+            <a:r>
+              <a:rPr lang="en-SG" sz="1200" b="1" dirty="0"/>
+              <a:t>surveillance  camera </a:t>
+            </a:r>
+          </a:p>
+        </p:txBody>
+      </p:sp>
+      <p:cxnSp>
+        <p:nvCxnSpPr>
+          <p:cNvPr id="92" name="Straight Arrow Connector 91">
+            <a:extLst>
+              <a:ext uri="{FF2B5EF4-FFF2-40B4-BE49-F238E27FC236}">
+                <a16:creationId xmlns:a16="http://schemas.microsoft.com/office/drawing/2014/main" id="{178FF702-08A7-7086-96B9-DBC6B43F2532}"/>
+              </a:ext>
+            </a:extLst>
+          </p:cNvPr>
+          <p:cNvCxnSpPr>
+            <a:cxnSpLocks/>
+          </p:cNvCxnSpPr>
+          <p:nvPr/>
+        </p:nvCxnSpPr>
+        <p:spPr>
+          <a:xfrm>
+            <a:off x="3825432" y="1481370"/>
+            <a:ext cx="29181" cy="492174"/>
+          </a:xfrm>
+          <a:prstGeom prst="straightConnector1">
+            <a:avLst/>
+          </a:prstGeom>
+          <a:ln>
+            <a:solidFill>
+              <a:srgbClr val="FF9900"/>
+            </a:solidFill>
+            <a:tailEnd type="triangle"/>
+          </a:ln>
+        </p:spPr>
+        <p:style>
+          <a:lnRef idx="2">
+            <a:schemeClr val="accent1"/>
+          </a:lnRef>
+          <a:fillRef idx="0">
+            <a:schemeClr val="accent1"/>
+          </a:fillRef>
+          <a:effectRef idx="1">
+            <a:schemeClr val="accent1"/>
+          </a:effectRef>
+          <a:fontRef idx="minor">
+            <a:schemeClr val="tx1"/>
+          </a:fontRef>
+        </p:style>
+      </p:cxnSp>
+      <p:sp>
+        <p:nvSpPr>
+          <p:cNvPr id="95" name="TextBox 94">
+            <a:extLst>
+              <a:ext uri="{FF2B5EF4-FFF2-40B4-BE49-F238E27FC236}">
+                <a16:creationId xmlns:a16="http://schemas.microsoft.com/office/drawing/2014/main" id="{3F9F7F0E-857C-F884-0C20-3CA1E062F4F6}"/>
+              </a:ext>
+            </a:extLst>
+          </p:cNvPr>
+          <p:cNvSpPr txBox="1"/>
+          <p:nvPr/>
+        </p:nvSpPr>
+        <p:spPr>
+          <a:xfrm>
+            <a:off x="3517482" y="1254194"/>
+            <a:ext cx="572170" cy="276999"/>
+          </a:xfrm>
+          <a:prstGeom prst="rect">
+            <a:avLst/>
+          </a:prstGeom>
+          <a:noFill/>
+        </p:spPr>
+        <p:txBody>
+          <a:bodyPr wrap="square">
+            <a:spAutoFit/>
+          </a:bodyPr>
+          <a:lstStyle/>
+          <a:p>
+            <a:r>
+              <a:rPr lang="en-US" sz="1200" b="1" dirty="0"/>
+              <a:t>Train </a:t>
+            </a:r>
+            <a:endParaRPr lang="en-SG" sz="1200" b="1" dirty="0"/>
+          </a:p>
+        </p:txBody>
+      </p:sp>
+      <p:cxnSp>
+        <p:nvCxnSpPr>
+          <p:cNvPr id="97" name="Straight Arrow Connector 96">
+            <a:extLst>
+              <a:ext uri="{FF2B5EF4-FFF2-40B4-BE49-F238E27FC236}">
+                <a16:creationId xmlns:a16="http://schemas.microsoft.com/office/drawing/2014/main" id="{BF0AD5F6-607D-E0DF-BF67-5DA777804266}"/>
+              </a:ext>
+            </a:extLst>
+          </p:cNvPr>
+          <p:cNvCxnSpPr>
+            <a:cxnSpLocks/>
+          </p:cNvCxnSpPr>
+          <p:nvPr/>
+        </p:nvCxnSpPr>
+        <p:spPr>
+          <a:xfrm>
+            <a:off x="4180325" y="1522961"/>
+            <a:ext cx="0" cy="264537"/>
+          </a:xfrm>
+          <a:prstGeom prst="straightConnector1">
+            <a:avLst/>
+          </a:prstGeom>
+          <a:ln>
+            <a:solidFill>
+              <a:srgbClr val="FF9900"/>
+            </a:solidFill>
+            <a:tailEnd type="triangle"/>
+          </a:ln>
+        </p:spPr>
+        <p:style>
+          <a:lnRef idx="2">
+            <a:schemeClr val="accent1"/>
+          </a:lnRef>
+          <a:fillRef idx="0">
+            <a:schemeClr val="accent1"/>
+          </a:fillRef>
+          <a:effectRef idx="1">
+            <a:schemeClr val="accent1"/>
+          </a:effectRef>
+          <a:fontRef idx="minor">
+            <a:schemeClr val="tx1"/>
+          </a:fontRef>
+        </p:style>
+      </p:cxnSp>
+      <p:sp>
+        <p:nvSpPr>
+          <p:cNvPr id="99" name="TextBox 98">
+            <a:extLst>
+              <a:ext uri="{FF2B5EF4-FFF2-40B4-BE49-F238E27FC236}">
+                <a16:creationId xmlns:a16="http://schemas.microsoft.com/office/drawing/2014/main" id="{3D6EFAD2-C1B0-6E18-52C1-8FD9AB2851AC}"/>
+              </a:ext>
+            </a:extLst>
+          </p:cNvPr>
+          <p:cNvSpPr txBox="1"/>
+          <p:nvPr/>
+        </p:nvSpPr>
+        <p:spPr>
+          <a:xfrm>
+            <a:off x="3988847" y="1105144"/>
+            <a:ext cx="2043017" cy="461665"/>
+          </a:xfrm>
+          <a:prstGeom prst="rect">
+            <a:avLst/>
+          </a:prstGeom>
+          <a:noFill/>
+        </p:spPr>
+        <p:txBody>
+          <a:bodyPr wrap="square">
+            <a:spAutoFit/>
+          </a:bodyPr>
+          <a:lstStyle/>
+          <a:p>
+            <a:r>
+              <a:rPr lang="en-US" sz="1200" b="1" dirty="0"/>
+              <a:t>Station’s train entrance detection sensor </a:t>
+            </a:r>
+            <a:endParaRPr lang="en-SG" sz="1200" b="1" dirty="0"/>
+          </a:p>
+        </p:txBody>
+      </p:sp>
+      <p:sp>
+        <p:nvSpPr>
+          <p:cNvPr id="101" name="TextBox 100">
+            <a:extLst>
+              <a:ext uri="{FF2B5EF4-FFF2-40B4-BE49-F238E27FC236}">
+                <a16:creationId xmlns:a16="http://schemas.microsoft.com/office/drawing/2014/main" id="{A08F141A-6967-45BB-7E9D-671CF5C419F4}"/>
+              </a:ext>
+            </a:extLst>
+          </p:cNvPr>
+          <p:cNvSpPr txBox="1"/>
+          <p:nvPr/>
+        </p:nvSpPr>
+        <p:spPr>
+          <a:xfrm>
+            <a:off x="6067969" y="1040329"/>
+            <a:ext cx="2758573" cy="461665"/>
+          </a:xfrm>
+          <a:prstGeom prst="rect">
+            <a:avLst/>
+          </a:prstGeom>
+          <a:noFill/>
+        </p:spPr>
+        <p:txBody>
+          <a:bodyPr wrap="square">
+            <a:spAutoFit/>
+          </a:bodyPr>
+          <a:lstStyle/>
+          <a:p>
+            <a:r>
+              <a:rPr lang="en-US" sz="1200" b="1" dirty="0">
+                <a:solidFill>
+                  <a:schemeClr val="tx2">
+                    <a:lumMod val="75000"/>
+                    <a:lumOff val="25000"/>
+                  </a:schemeClr>
+                </a:solidFill>
+              </a:rPr>
+              <a:t>Train docking PLC signal from the station entrance sensor </a:t>
+            </a:r>
+            <a:endParaRPr lang="en-SG" sz="1200" b="1" dirty="0">
+              <a:solidFill>
+                <a:schemeClr val="tx2">
+                  <a:lumMod val="75000"/>
+                  <a:lumOff val="25000"/>
+                </a:schemeClr>
+              </a:solidFill>
+            </a:endParaRPr>
+          </a:p>
+        </p:txBody>
+      </p:sp>
+      <p:sp>
+        <p:nvSpPr>
+          <p:cNvPr id="102" name="Rectangle 101">
+            <a:extLst>
+              <a:ext uri="{FF2B5EF4-FFF2-40B4-BE49-F238E27FC236}">
+                <a16:creationId xmlns:a16="http://schemas.microsoft.com/office/drawing/2014/main" id="{1E85ACDE-D3BA-B80A-5864-7BB361EE9C06}"/>
+              </a:ext>
+            </a:extLst>
+          </p:cNvPr>
+          <p:cNvSpPr/>
+          <p:nvPr/>
+        </p:nvSpPr>
+        <p:spPr>
+          <a:xfrm>
+            <a:off x="4074683" y="2794511"/>
+            <a:ext cx="1145818" cy="1431507"/>
+          </a:xfrm>
+          <a:prstGeom prst="rect">
+            <a:avLst/>
+          </a:prstGeom>
+          <a:noFill/>
+          <a:ln w="28575">
+            <a:solidFill>
+              <a:srgbClr val="FF9900"/>
+            </a:solidFill>
+            <a:prstDash val="sysDash"/>
+          </a:ln>
+        </p:spPr>
+        <p:style>
+          <a:lnRef idx="2">
+            <a:schemeClr val="accent6"/>
+          </a:lnRef>
+          <a:fillRef idx="1">
+            <a:schemeClr val="lt1"/>
+          </a:fillRef>
+          <a:effectRef idx="0">
+            <a:schemeClr val="accent6"/>
+          </a:effectRef>
+          <a:fontRef idx="minor">
+            <a:schemeClr val="dk1"/>
+          </a:fontRef>
+        </p:style>
+        <p:txBody>
+          <a:bodyPr rtlCol="0" anchor="ctr"/>
+          <a:lstStyle/>
+          <a:p>
+            <a:pPr algn="ctr"/>
+            <a:endParaRPr lang="en-SG" dirty="0"/>
+          </a:p>
+        </p:txBody>
+      </p:sp>
+      <p:cxnSp>
+        <p:nvCxnSpPr>
+          <p:cNvPr id="103" name="Straight Arrow Connector 102">
+            <a:extLst>
+              <a:ext uri="{FF2B5EF4-FFF2-40B4-BE49-F238E27FC236}">
+                <a16:creationId xmlns:a16="http://schemas.microsoft.com/office/drawing/2014/main" id="{80186B93-3875-3504-D134-AAE49145EBCB}"/>
+              </a:ext>
+            </a:extLst>
+          </p:cNvPr>
+          <p:cNvCxnSpPr>
+            <a:cxnSpLocks/>
+          </p:cNvCxnSpPr>
+          <p:nvPr/>
+        </p:nvCxnSpPr>
+        <p:spPr>
+          <a:xfrm flipV="1">
+            <a:off x="4126527" y="4288471"/>
+            <a:ext cx="0" cy="400666"/>
+          </a:xfrm>
+          <a:prstGeom prst="straightConnector1">
+            <a:avLst/>
+          </a:prstGeom>
+          <a:ln>
+            <a:solidFill>
+              <a:srgbClr val="FF9900"/>
+            </a:solidFill>
+            <a:tailEnd type="triangle"/>
+          </a:ln>
+        </p:spPr>
+        <p:style>
+          <a:lnRef idx="2">
+            <a:schemeClr val="accent1"/>
+          </a:lnRef>
+          <a:fillRef idx="0">
+            <a:schemeClr val="accent1"/>
+          </a:fillRef>
+          <a:effectRef idx="1">
+            <a:schemeClr val="accent1"/>
+          </a:effectRef>
+          <a:fontRef idx="minor">
+            <a:schemeClr val="tx1"/>
+          </a:fontRef>
+        </p:style>
+      </p:cxnSp>
+      <p:sp>
+        <p:nvSpPr>
+          <p:cNvPr id="106" name="TextBox 105">
+            <a:extLst>
+              <a:ext uri="{FF2B5EF4-FFF2-40B4-BE49-F238E27FC236}">
+                <a16:creationId xmlns:a16="http://schemas.microsoft.com/office/drawing/2014/main" id="{7D7D9BF6-83A6-879B-E840-339F30DC360E}"/>
+              </a:ext>
+            </a:extLst>
+          </p:cNvPr>
+          <p:cNvSpPr txBox="1"/>
+          <p:nvPr/>
+        </p:nvSpPr>
+        <p:spPr>
+          <a:xfrm>
+            <a:off x="3614703" y="4702660"/>
+            <a:ext cx="1144339" cy="276999"/>
+          </a:xfrm>
+          <a:prstGeom prst="rect">
+            <a:avLst/>
+          </a:prstGeom>
+          <a:noFill/>
+        </p:spPr>
+        <p:txBody>
+          <a:bodyPr wrap="square">
+            <a:spAutoFit/>
+          </a:bodyPr>
+          <a:lstStyle/>
+          <a:p>
+            <a:r>
+              <a:rPr lang="en-US" sz="1200" b="1" dirty="0"/>
+              <a:t>Train station </a:t>
+            </a:r>
+            <a:endParaRPr lang="en-SG" sz="1200" b="1" dirty="0"/>
+          </a:p>
+        </p:txBody>
+      </p:sp>
+      <p:sp>
+        <p:nvSpPr>
+          <p:cNvPr id="108" name="Rectangle 107">
+            <a:extLst>
+              <a:ext uri="{FF2B5EF4-FFF2-40B4-BE49-F238E27FC236}">
+                <a16:creationId xmlns:a16="http://schemas.microsoft.com/office/drawing/2014/main" id="{6BD02769-F43E-2F88-D7E3-C19E7A41B805}"/>
+              </a:ext>
+            </a:extLst>
+          </p:cNvPr>
+          <p:cNvSpPr/>
+          <p:nvPr/>
+        </p:nvSpPr>
+        <p:spPr>
+          <a:xfrm>
+            <a:off x="921107" y="3200388"/>
+            <a:ext cx="1562118" cy="756682"/>
+          </a:xfrm>
+          <a:prstGeom prst="rect">
+            <a:avLst/>
+          </a:prstGeom>
+          <a:noFill/>
+          <a:ln w="28575">
+            <a:solidFill>
+              <a:srgbClr val="00FF00"/>
+            </a:solidFill>
+          </a:ln>
+        </p:spPr>
+        <p:style>
+          <a:lnRef idx="2">
+            <a:schemeClr val="accent6"/>
+          </a:lnRef>
+          <a:fillRef idx="1">
+            <a:schemeClr val="lt1"/>
+          </a:fillRef>
+          <a:effectRef idx="0">
+            <a:schemeClr val="accent6"/>
+          </a:effectRef>
+          <a:fontRef idx="minor">
+            <a:schemeClr val="dk1"/>
+          </a:fontRef>
+        </p:style>
+        <p:txBody>
+          <a:bodyPr rtlCol="0" anchor="ctr"/>
+          <a:lstStyle/>
+          <a:p>
+            <a:pPr algn="ctr"/>
+            <a:endParaRPr lang="en-SG" dirty="0"/>
+          </a:p>
+        </p:txBody>
+      </p:sp>
+      <p:sp>
+        <p:nvSpPr>
+          <p:cNvPr id="109" name="Rectangle 108">
+            <a:extLst>
+              <a:ext uri="{FF2B5EF4-FFF2-40B4-BE49-F238E27FC236}">
+                <a16:creationId xmlns:a16="http://schemas.microsoft.com/office/drawing/2014/main" id="{21242E6A-2952-04D1-A28D-7471C3BB2CC6}"/>
+              </a:ext>
+            </a:extLst>
+          </p:cNvPr>
+          <p:cNvSpPr/>
+          <p:nvPr/>
+        </p:nvSpPr>
+        <p:spPr>
+          <a:xfrm>
+            <a:off x="1894874" y="3050659"/>
+            <a:ext cx="1539138" cy="756682"/>
+          </a:xfrm>
+          <a:prstGeom prst="rect">
+            <a:avLst/>
+          </a:prstGeom>
+          <a:noFill/>
+          <a:ln w="28575">
+            <a:solidFill>
+              <a:srgbClr val="00FF00"/>
+            </a:solidFill>
+          </a:ln>
+        </p:spPr>
+        <p:style>
+          <a:lnRef idx="2">
+            <a:schemeClr val="accent6"/>
+          </a:lnRef>
+          <a:fillRef idx="1">
+            <a:schemeClr val="lt1"/>
+          </a:fillRef>
+          <a:effectRef idx="0">
+            <a:schemeClr val="accent6"/>
+          </a:effectRef>
+          <a:fontRef idx="minor">
+            <a:schemeClr val="dk1"/>
+          </a:fontRef>
+        </p:style>
+        <p:txBody>
+          <a:bodyPr rtlCol="0" anchor="ctr"/>
+          <a:lstStyle/>
+          <a:p>
+            <a:pPr algn="ctr"/>
+            <a:endParaRPr lang="en-SG" dirty="0"/>
+          </a:p>
+        </p:txBody>
+      </p:sp>
+      <p:cxnSp>
+        <p:nvCxnSpPr>
+          <p:cNvPr id="110" name="Straight Arrow Connector 109">
+            <a:extLst>
+              <a:ext uri="{FF2B5EF4-FFF2-40B4-BE49-F238E27FC236}">
+                <a16:creationId xmlns:a16="http://schemas.microsoft.com/office/drawing/2014/main" id="{4E9FE03B-A085-7A58-4D9F-FE6E58F66BFF}"/>
+              </a:ext>
+            </a:extLst>
+          </p:cNvPr>
+          <p:cNvCxnSpPr>
+            <a:cxnSpLocks/>
+          </p:cNvCxnSpPr>
+          <p:nvPr/>
+        </p:nvCxnSpPr>
+        <p:spPr>
+          <a:xfrm flipV="1">
+            <a:off x="1572303" y="3993846"/>
+            <a:ext cx="0" cy="386130"/>
+          </a:xfrm>
+          <a:prstGeom prst="straightConnector1">
+            <a:avLst/>
+          </a:prstGeom>
+          <a:ln>
+            <a:solidFill>
+              <a:srgbClr val="00FF00"/>
+            </a:solidFill>
+            <a:tailEnd type="triangle"/>
+          </a:ln>
+        </p:spPr>
+        <p:style>
+          <a:lnRef idx="2">
+            <a:schemeClr val="accent1"/>
+          </a:lnRef>
+          <a:fillRef idx="0">
+            <a:schemeClr val="accent1"/>
+          </a:fillRef>
+          <a:effectRef idx="1">
+            <a:schemeClr val="accent1"/>
+          </a:effectRef>
+          <a:fontRef idx="minor">
+            <a:schemeClr val="tx1"/>
+          </a:fontRef>
+        </p:style>
+      </p:cxnSp>
+      <p:cxnSp>
+        <p:nvCxnSpPr>
+          <p:cNvPr id="112" name="Straight Arrow Connector 111">
+            <a:extLst>
+              <a:ext uri="{FF2B5EF4-FFF2-40B4-BE49-F238E27FC236}">
+                <a16:creationId xmlns:a16="http://schemas.microsoft.com/office/drawing/2014/main" id="{26FF5342-9AC0-4E28-A17C-AAA582950C56}"/>
+              </a:ext>
+            </a:extLst>
+          </p:cNvPr>
+          <p:cNvCxnSpPr>
+            <a:cxnSpLocks/>
+          </p:cNvCxnSpPr>
+          <p:nvPr/>
+        </p:nvCxnSpPr>
+        <p:spPr>
+          <a:xfrm flipV="1">
+            <a:off x="2620815" y="3807341"/>
+            <a:ext cx="0" cy="572635"/>
+          </a:xfrm>
+          <a:prstGeom prst="straightConnector1">
+            <a:avLst/>
+          </a:prstGeom>
+          <a:ln>
+            <a:solidFill>
+              <a:srgbClr val="00FF00"/>
+            </a:solidFill>
+            <a:tailEnd type="triangle"/>
+          </a:ln>
+        </p:spPr>
+        <p:style>
+          <a:lnRef idx="2">
+            <a:schemeClr val="accent1"/>
+          </a:lnRef>
+          <a:fillRef idx="0">
+            <a:schemeClr val="accent1"/>
+          </a:fillRef>
+          <a:effectRef idx="1">
+            <a:schemeClr val="accent1"/>
+          </a:effectRef>
+          <a:fontRef idx="minor">
+            <a:schemeClr val="tx1"/>
+          </a:fontRef>
+        </p:style>
+      </p:cxnSp>
+      <p:sp>
+        <p:nvSpPr>
+          <p:cNvPr id="114" name="TextBox 113">
+            <a:extLst>
+              <a:ext uri="{FF2B5EF4-FFF2-40B4-BE49-F238E27FC236}">
+                <a16:creationId xmlns:a16="http://schemas.microsoft.com/office/drawing/2014/main" id="{528D12AE-EEF4-3795-DAD1-DBD18073F70E}"/>
+              </a:ext>
+            </a:extLst>
+          </p:cNvPr>
+          <p:cNvSpPr txBox="1"/>
+          <p:nvPr/>
+        </p:nvSpPr>
+        <p:spPr>
+          <a:xfrm>
+            <a:off x="1153887" y="4415017"/>
+            <a:ext cx="2130999" cy="646331"/>
+          </a:xfrm>
+          <a:prstGeom prst="rect">
+            <a:avLst/>
+          </a:prstGeom>
+          <a:solidFill>
+            <a:schemeClr val="bg1"/>
+          </a:solidFill>
+          <a:ln>
+            <a:solidFill>
+              <a:schemeClr val="accent6">
+                <a:lumMod val="75000"/>
+              </a:schemeClr>
+            </a:solidFill>
+          </a:ln>
+        </p:spPr>
+        <p:txBody>
+          <a:bodyPr wrap="square">
+            <a:spAutoFit/>
+          </a:bodyPr>
+          <a:lstStyle/>
+          <a:p>
+            <a:r>
+              <a:rPr lang="en-SG" sz="1200" b="1" dirty="0">
+                <a:solidFill>
+                  <a:schemeClr val="accent6">
+                    <a:lumMod val="50000"/>
+                  </a:schemeClr>
+                </a:solidFill>
+              </a:rPr>
+              <a:t>Railway Surveillance camera  train objective and motion detection </a:t>
+            </a:r>
+          </a:p>
+        </p:txBody>
+      </p:sp>
+      <p:pic>
+        <p:nvPicPr>
+          <p:cNvPr id="2" name="Picture 1">
+            <a:extLst>
+              <a:ext uri="{FF2B5EF4-FFF2-40B4-BE49-F238E27FC236}">
+                <a16:creationId xmlns:a16="http://schemas.microsoft.com/office/drawing/2014/main" id="{BB901F55-DCE5-C7D9-0990-B69F1647D5D4}"/>
+              </a:ext>
+            </a:extLst>
+          </p:cNvPr>
+          <p:cNvPicPr>
+            <a:picLocks noChangeAspect="1"/>
+          </p:cNvPicPr>
+          <p:nvPr/>
+        </p:nvPicPr>
+        <p:blipFill rotWithShape="1">
+          <a:blip r:embed="rId8"/>
+          <a:srcRect r="4560"/>
+          <a:stretch/>
+        </p:blipFill>
+        <p:spPr>
+          <a:xfrm>
+            <a:off x="5484875" y="3727565"/>
+            <a:ext cx="1271202" cy="890224"/>
+          </a:xfrm>
+          <a:prstGeom prst="rect">
+            <a:avLst/>
+          </a:prstGeom>
+          <a:ln w="12700">
+            <a:solidFill>
+              <a:schemeClr val="tx1"/>
+            </a:solidFill>
+          </a:ln>
+        </p:spPr>
+      </p:pic>
+      <p:sp>
+        <p:nvSpPr>
+          <p:cNvPr id="3" name="Rectangle 2">
+            <a:extLst>
+              <a:ext uri="{FF2B5EF4-FFF2-40B4-BE49-F238E27FC236}">
+                <a16:creationId xmlns:a16="http://schemas.microsoft.com/office/drawing/2014/main" id="{5D64D5EA-9E21-C5A1-D4E5-07973D7AA704}"/>
+              </a:ext>
+            </a:extLst>
+          </p:cNvPr>
+          <p:cNvSpPr/>
+          <p:nvPr/>
+        </p:nvSpPr>
+        <p:spPr>
+          <a:xfrm>
+            <a:off x="5849815" y="4011447"/>
+            <a:ext cx="804234" cy="445770"/>
+          </a:xfrm>
+          <a:prstGeom prst="rect">
+            <a:avLst/>
+          </a:prstGeom>
+          <a:noFill/>
+          <a:ln w="28575">
+            <a:solidFill>
+              <a:srgbClr val="00FF00"/>
+            </a:solidFill>
+          </a:ln>
+        </p:spPr>
+        <p:style>
+          <a:lnRef idx="2">
+            <a:schemeClr val="accent6"/>
+          </a:lnRef>
+          <a:fillRef idx="1">
+            <a:schemeClr val="lt1"/>
+          </a:fillRef>
+          <a:effectRef idx="0">
+            <a:schemeClr val="accent6"/>
+          </a:effectRef>
+          <a:fontRef idx="minor">
+            <a:schemeClr val="dk1"/>
+          </a:fontRef>
+        </p:style>
+        <p:txBody>
+          <a:bodyPr rtlCol="0" anchor="ctr"/>
+          <a:lstStyle/>
+          <a:p>
+            <a:pPr algn="ctr"/>
+            <a:endParaRPr lang="en-SG" dirty="0"/>
+          </a:p>
+        </p:txBody>
+      </p:sp>
+      <p:cxnSp>
+        <p:nvCxnSpPr>
+          <p:cNvPr id="11" name="Straight Arrow Connector 10">
+            <a:extLst>
+              <a:ext uri="{FF2B5EF4-FFF2-40B4-BE49-F238E27FC236}">
+                <a16:creationId xmlns:a16="http://schemas.microsoft.com/office/drawing/2014/main" id="{AC926BD6-5510-B1F9-DA3C-E00DCAC539D9}"/>
+              </a:ext>
+            </a:extLst>
+          </p:cNvPr>
+          <p:cNvCxnSpPr>
+            <a:cxnSpLocks/>
+          </p:cNvCxnSpPr>
+          <p:nvPr/>
+        </p:nvCxnSpPr>
+        <p:spPr>
+          <a:xfrm>
+            <a:off x="4240587" y="1841492"/>
+            <a:ext cx="1827382" cy="0"/>
+          </a:xfrm>
+          <a:prstGeom prst="straightConnector1">
+            <a:avLst/>
+          </a:prstGeom>
+          <a:ln>
+            <a:solidFill>
+              <a:srgbClr val="00B0F0"/>
+            </a:solidFill>
+            <a:tailEnd type="triangle"/>
+          </a:ln>
+        </p:spPr>
+        <p:style>
+          <a:lnRef idx="2">
+            <a:schemeClr val="accent1"/>
+          </a:lnRef>
+          <a:fillRef idx="0">
+            <a:schemeClr val="accent1"/>
+          </a:fillRef>
+          <a:effectRef idx="1">
+            <a:schemeClr val="accent1"/>
+          </a:effectRef>
+          <a:fontRef idx="minor">
+            <a:schemeClr val="tx1"/>
+          </a:fontRef>
+        </p:style>
+      </p:cxnSp>
+      <p:cxnSp>
+        <p:nvCxnSpPr>
+          <p:cNvPr id="15" name="Straight Arrow Connector 14">
+            <a:extLst>
+              <a:ext uri="{FF2B5EF4-FFF2-40B4-BE49-F238E27FC236}">
+                <a16:creationId xmlns:a16="http://schemas.microsoft.com/office/drawing/2014/main" id="{CB3E753B-0084-EA61-6EFD-2125E62BFEB4}"/>
+              </a:ext>
+            </a:extLst>
+          </p:cNvPr>
+          <p:cNvCxnSpPr>
+            <a:cxnSpLocks/>
+          </p:cNvCxnSpPr>
+          <p:nvPr/>
+        </p:nvCxnSpPr>
+        <p:spPr>
+          <a:xfrm>
+            <a:off x="4759042" y="2368296"/>
+            <a:ext cx="1308927" cy="0"/>
+          </a:xfrm>
+          <a:prstGeom prst="straightConnector1">
+            <a:avLst/>
+          </a:prstGeom>
+          <a:ln>
+            <a:solidFill>
+              <a:srgbClr val="00B0F0"/>
+            </a:solidFill>
+            <a:tailEnd type="triangle"/>
+          </a:ln>
+        </p:spPr>
+        <p:style>
+          <a:lnRef idx="2">
+            <a:schemeClr val="accent1"/>
+          </a:lnRef>
+          <a:fillRef idx="0">
+            <a:schemeClr val="accent1"/>
+          </a:fillRef>
+          <a:effectRef idx="1">
+            <a:schemeClr val="accent1"/>
+          </a:effectRef>
+          <a:fontRef idx="minor">
+            <a:schemeClr val="tx1"/>
+          </a:fontRef>
+        </p:style>
+      </p:cxnSp>
+      <p:pic>
+        <p:nvPicPr>
+          <p:cNvPr id="24" name="Picture 23">
+            <a:extLst>
+              <a:ext uri="{FF2B5EF4-FFF2-40B4-BE49-F238E27FC236}">
+                <a16:creationId xmlns:a16="http://schemas.microsoft.com/office/drawing/2014/main" id="{02E0E6DE-E210-96D3-EFDA-415F1ECE5382}"/>
+              </a:ext>
+            </a:extLst>
+          </p:cNvPr>
+          <p:cNvPicPr>
+            <a:picLocks noChangeAspect="1"/>
+          </p:cNvPicPr>
+          <p:nvPr/>
+        </p:nvPicPr>
+        <p:blipFill>
+          <a:blip r:embed="rId9"/>
+          <a:stretch>
+            <a:fillRect/>
+          </a:stretch>
+        </p:blipFill>
+        <p:spPr>
+          <a:xfrm>
+            <a:off x="6122538" y="1522961"/>
+            <a:ext cx="1028571" cy="1066667"/>
+          </a:xfrm>
+          <a:prstGeom prst="rect">
+            <a:avLst/>
+          </a:prstGeom>
+          <a:ln w="12700">
+            <a:solidFill>
+              <a:schemeClr val="tx1"/>
+            </a:solidFill>
+          </a:ln>
+        </p:spPr>
+      </p:pic>
+      <p:cxnSp>
+        <p:nvCxnSpPr>
+          <p:cNvPr id="31" name="Straight Arrow Connector 30">
+            <a:extLst>
+              <a:ext uri="{FF2B5EF4-FFF2-40B4-BE49-F238E27FC236}">
+                <a16:creationId xmlns:a16="http://schemas.microsoft.com/office/drawing/2014/main" id="{DF1FB204-93EB-DA01-9D51-E2EE5468979B}"/>
+              </a:ext>
+            </a:extLst>
+          </p:cNvPr>
+          <p:cNvCxnSpPr>
+            <a:cxnSpLocks/>
+          </p:cNvCxnSpPr>
+          <p:nvPr/>
+        </p:nvCxnSpPr>
+        <p:spPr>
+          <a:xfrm>
+            <a:off x="4284263" y="2081782"/>
+            <a:ext cx="1783706" cy="0"/>
+          </a:xfrm>
+          <a:prstGeom prst="straightConnector1">
+            <a:avLst/>
+          </a:prstGeom>
+          <a:ln>
+            <a:solidFill>
+              <a:srgbClr val="00B0F0"/>
+            </a:solidFill>
+            <a:tailEnd type="triangle"/>
+          </a:ln>
+        </p:spPr>
+        <p:style>
+          <a:lnRef idx="2">
+            <a:schemeClr val="accent1"/>
+          </a:lnRef>
+          <a:fillRef idx="0">
+            <a:schemeClr val="accent1"/>
+          </a:fillRef>
+          <a:effectRef idx="1">
+            <a:schemeClr val="accent1"/>
+          </a:effectRef>
+          <a:fontRef idx="minor">
+            <a:schemeClr val="tx1"/>
+          </a:fontRef>
+        </p:style>
+      </p:cxnSp>
+      <p:sp>
+        <p:nvSpPr>
+          <p:cNvPr id="36" name="TextBox 35">
+            <a:extLst>
+              <a:ext uri="{FF2B5EF4-FFF2-40B4-BE49-F238E27FC236}">
+                <a16:creationId xmlns:a16="http://schemas.microsoft.com/office/drawing/2014/main" id="{A395B7B2-BC5D-AED2-A142-8EF614FA073F}"/>
+              </a:ext>
+            </a:extLst>
+          </p:cNvPr>
+          <p:cNvSpPr txBox="1"/>
+          <p:nvPr/>
+        </p:nvSpPr>
+        <p:spPr>
+          <a:xfrm>
+            <a:off x="5068908" y="2385624"/>
+            <a:ext cx="1746939" cy="461665"/>
+          </a:xfrm>
+          <a:prstGeom prst="rect">
+            <a:avLst/>
+          </a:prstGeom>
+          <a:noFill/>
+        </p:spPr>
+        <p:txBody>
+          <a:bodyPr wrap="square">
+            <a:spAutoFit/>
+          </a:bodyPr>
+          <a:lstStyle/>
+          <a:p>
+            <a:r>
+              <a:rPr lang="en-US" sz="1200" b="1" dirty="0">
+                <a:solidFill>
+                  <a:schemeClr val="tx2">
+                    <a:lumMod val="75000"/>
+                    <a:lumOff val="25000"/>
+                  </a:schemeClr>
+                </a:solidFill>
+              </a:rPr>
+              <a:t>Motion sensor electrical signal </a:t>
+            </a:r>
+            <a:endParaRPr lang="en-SG" sz="1200" b="1" dirty="0">
+              <a:solidFill>
+                <a:schemeClr val="tx2">
+                  <a:lumMod val="75000"/>
+                  <a:lumOff val="25000"/>
+                </a:schemeClr>
+              </a:solidFill>
+            </a:endParaRPr>
+          </a:p>
+        </p:txBody>
+      </p:sp>
+      <p:cxnSp>
+        <p:nvCxnSpPr>
+          <p:cNvPr id="39" name="Straight Arrow Connector 38">
+            <a:extLst>
+              <a:ext uri="{FF2B5EF4-FFF2-40B4-BE49-F238E27FC236}">
+                <a16:creationId xmlns:a16="http://schemas.microsoft.com/office/drawing/2014/main" id="{7EA41147-F493-9462-C0AA-6123B75E1318}"/>
+              </a:ext>
+            </a:extLst>
+          </p:cNvPr>
+          <p:cNvCxnSpPr>
+            <a:cxnSpLocks/>
+          </p:cNvCxnSpPr>
+          <p:nvPr/>
+        </p:nvCxnSpPr>
+        <p:spPr>
+          <a:xfrm>
+            <a:off x="7151109" y="2438400"/>
+            <a:ext cx="1647932" cy="0"/>
+          </a:xfrm>
+          <a:prstGeom prst="straightConnector1">
+            <a:avLst/>
+          </a:prstGeom>
+          <a:ln>
+            <a:solidFill>
+              <a:srgbClr val="00B0F0"/>
+            </a:solidFill>
+            <a:tailEnd type="triangle"/>
+          </a:ln>
+        </p:spPr>
+        <p:style>
+          <a:lnRef idx="2">
+            <a:schemeClr val="accent1"/>
+          </a:lnRef>
+          <a:fillRef idx="0">
+            <a:schemeClr val="accent1"/>
+          </a:fillRef>
+          <a:effectRef idx="1">
+            <a:schemeClr val="accent1"/>
+          </a:effectRef>
+          <a:fontRef idx="minor">
+            <a:schemeClr val="tx1"/>
+          </a:fontRef>
+        </p:style>
+      </p:cxnSp>
+      <p:sp>
+        <p:nvSpPr>
+          <p:cNvPr id="44" name="TextBox 43">
+            <a:extLst>
+              <a:ext uri="{FF2B5EF4-FFF2-40B4-BE49-F238E27FC236}">
+                <a16:creationId xmlns:a16="http://schemas.microsoft.com/office/drawing/2014/main" id="{E3455B86-18F2-516A-BBBB-95CDD3EA1CC3}"/>
+              </a:ext>
+            </a:extLst>
+          </p:cNvPr>
+          <p:cNvSpPr txBox="1"/>
+          <p:nvPr/>
+        </p:nvSpPr>
+        <p:spPr>
+          <a:xfrm>
+            <a:off x="7151109" y="2064173"/>
+            <a:ext cx="1971236" cy="276999"/>
+          </a:xfrm>
+          <a:prstGeom prst="rect">
+            <a:avLst/>
+          </a:prstGeom>
+          <a:noFill/>
+        </p:spPr>
+        <p:txBody>
+          <a:bodyPr wrap="square">
+            <a:spAutoFit/>
+          </a:bodyPr>
+          <a:lstStyle/>
+          <a:p>
+            <a:r>
+              <a:rPr lang="en-US" sz="1200" b="1" dirty="0">
+                <a:solidFill>
+                  <a:schemeClr val="tx2">
+                    <a:lumMod val="75000"/>
+                    <a:lumOff val="25000"/>
+                  </a:schemeClr>
+                </a:solidFill>
+              </a:rPr>
+              <a:t>PLC Modbus-TCP data</a:t>
+            </a:r>
+            <a:endParaRPr lang="en-SG" sz="1200" b="1" dirty="0">
+              <a:solidFill>
+                <a:schemeClr val="tx2">
+                  <a:lumMod val="75000"/>
+                  <a:lumOff val="25000"/>
+                </a:schemeClr>
+              </a:solidFill>
+            </a:endParaRPr>
+          </a:p>
+        </p:txBody>
+      </p:sp>
+    </p:spTree>
+    <p:extLst>
+      <p:ext uri="{BB962C8B-B14F-4D97-AF65-F5344CB8AC3E}">
+        <p14:creationId xmlns:p14="http://schemas.microsoft.com/office/powerpoint/2010/main" val="612237545"/>
       </p:ext>
     </p:extLst>
   </p:cSld>

</xml_diff>

<commit_message>
Finished the introduction of the read me file.
</commit_message>
<xml_diff>
--- a/doc/designDoc.pptx
+++ b/doc/designDoc.pptx
@@ -5,11 +5,12 @@
     <p:sldMasterId id="2147483648" r:id="rId1"/>
   </p:sldMasterIdLst>
   <p:notesMasterIdLst>
-    <p:notesMasterId r:id="rId4"/>
+    <p:notesMasterId r:id="rId5"/>
   </p:notesMasterIdLst>
   <p:sldIdLst>
     <p:sldId id="256" r:id="rId2"/>
     <p:sldId id="258" r:id="rId3"/>
+    <p:sldId id="259" r:id="rId4"/>
   </p:sldIdLst>
   <p:sldSz cx="12192000" cy="6858000"/>
   <p:notesSz cx="6858000" cy="9144000"/>
@@ -198,7 +199,7 @@
           <a:p>
             <a:fld id="{B20EB3CF-2C03-445A-AC68-BFCA7FF1C3FD}" type="datetimeFigureOut">
               <a:rPr lang="en-SG" smtClean="0"/>
-              <a:t>10/2/2024</a:t>
+              <a:t>11/2/2024</a:t>
             </a:fld>
             <a:endParaRPr lang="en-SG"/>
           </a:p>
@@ -658,6 +659,90 @@
 </p:notes>
 </file>
 
+<file path=ppt/notesSlides/notesSlide3.xml><?xml version="1.0" encoding="utf-8"?>
+<p:notes xmlns:a="http://schemas.openxmlformats.org/drawingml/2006/main" xmlns:r="http://schemas.openxmlformats.org/officeDocument/2006/relationships" xmlns:p="http://schemas.openxmlformats.org/presentationml/2006/main">
+  <p:cSld>
+    <p:spTree>
+      <p:nvGrpSpPr>
+        <p:cNvPr id="1" name=""/>
+        <p:cNvGrpSpPr/>
+        <p:nvPr/>
+      </p:nvGrpSpPr>
+      <p:grpSpPr>
+        <a:xfrm>
+          <a:off x="0" y="0"/>
+          <a:ext cx="0" cy="0"/>
+          <a:chOff x="0" y="0"/>
+          <a:chExt cx="0" cy="0"/>
+        </a:xfrm>
+      </p:grpSpPr>
+      <p:sp>
+        <p:nvSpPr>
+          <p:cNvPr id="2" name="Slide Image Placeholder 1"/>
+          <p:cNvSpPr>
+            <a:spLocks noGrp="1" noRot="1" noChangeAspect="1"/>
+          </p:cNvSpPr>
+          <p:nvPr>
+            <p:ph type="sldImg"/>
+          </p:nvPr>
+        </p:nvSpPr>
+        <p:spPr/>
+      </p:sp>
+      <p:sp>
+        <p:nvSpPr>
+          <p:cNvPr id="3" name="Notes Placeholder 2"/>
+          <p:cNvSpPr>
+            <a:spLocks noGrp="1"/>
+          </p:cNvSpPr>
+          <p:nvPr>
+            <p:ph type="body" idx="1"/>
+          </p:nvPr>
+        </p:nvSpPr>
+        <p:spPr/>
+        <p:txBody>
+          <a:bodyPr/>
+          <a:lstStyle/>
+          <a:p>
+            <a:endParaRPr lang="en-SG" dirty="0"/>
+          </a:p>
+        </p:txBody>
+      </p:sp>
+      <p:sp>
+        <p:nvSpPr>
+          <p:cNvPr id="4" name="Slide Number Placeholder 3"/>
+          <p:cNvSpPr>
+            <a:spLocks noGrp="1"/>
+          </p:cNvSpPr>
+          <p:nvPr>
+            <p:ph type="sldNum" sz="quarter" idx="5"/>
+          </p:nvPr>
+        </p:nvSpPr>
+        <p:spPr/>
+        <p:txBody>
+          <a:bodyPr/>
+          <a:lstStyle/>
+          <a:p>
+            <a:fld id="{19C3B740-82E1-45ED-83DB-9842BDDAE2E6}" type="slidenum">
+              <a:rPr lang="en-SG" smtClean="0"/>
+              <a:t>3</a:t>
+            </a:fld>
+            <a:endParaRPr lang="en-SG"/>
+          </a:p>
+        </p:txBody>
+      </p:sp>
+    </p:spTree>
+    <p:extLst>
+      <p:ext uri="{BB962C8B-B14F-4D97-AF65-F5344CB8AC3E}">
+        <p14:creationId xmlns:p14="http://schemas.microsoft.com/office/powerpoint/2010/main" val="2180194021"/>
+      </p:ext>
+    </p:extLst>
+  </p:cSld>
+  <p:clrMapOvr>
+    <a:masterClrMapping/>
+  </p:clrMapOvr>
+</p:notes>
+</file>
+
 <file path=ppt/slideLayouts/slideLayout1.xml><?xml version="1.0" encoding="utf-8"?>
 <p:sldLayout xmlns:a="http://schemas.openxmlformats.org/drawingml/2006/main" xmlns:r="http://schemas.openxmlformats.org/officeDocument/2006/relationships" xmlns:p="http://schemas.openxmlformats.org/presentationml/2006/main" type="title" preserve="1">
   <p:cSld name="Title Slide">
@@ -807,7 +892,7 @@
           <a:p>
             <a:fld id="{80132922-2178-4F3C-8D0D-6F4C7FD468A5}" type="datetimeFigureOut">
               <a:rPr lang="en-SG" smtClean="0"/>
-              <a:t>10/2/2024</a:t>
+              <a:t>11/2/2024</a:t>
             </a:fld>
             <a:endParaRPr lang="en-SG"/>
           </a:p>
@@ -1007,7 +1092,7 @@
           <a:p>
             <a:fld id="{80132922-2178-4F3C-8D0D-6F4C7FD468A5}" type="datetimeFigureOut">
               <a:rPr lang="en-SG" smtClean="0"/>
-              <a:t>10/2/2024</a:t>
+              <a:t>11/2/2024</a:t>
             </a:fld>
             <a:endParaRPr lang="en-SG"/>
           </a:p>
@@ -1217,7 +1302,7 @@
           <a:p>
             <a:fld id="{80132922-2178-4F3C-8D0D-6F4C7FD468A5}" type="datetimeFigureOut">
               <a:rPr lang="en-SG" smtClean="0"/>
-              <a:t>10/2/2024</a:t>
+              <a:t>11/2/2024</a:t>
             </a:fld>
             <a:endParaRPr lang="en-SG"/>
           </a:p>
@@ -1417,7 +1502,7 @@
           <a:p>
             <a:fld id="{80132922-2178-4F3C-8D0D-6F4C7FD468A5}" type="datetimeFigureOut">
               <a:rPr lang="en-SG" smtClean="0"/>
-              <a:t>10/2/2024</a:t>
+              <a:t>11/2/2024</a:t>
             </a:fld>
             <a:endParaRPr lang="en-SG"/>
           </a:p>
@@ -1693,7 +1778,7 @@
           <a:p>
             <a:fld id="{80132922-2178-4F3C-8D0D-6F4C7FD468A5}" type="datetimeFigureOut">
               <a:rPr lang="en-SG" smtClean="0"/>
-              <a:t>10/2/2024</a:t>
+              <a:t>11/2/2024</a:t>
             </a:fld>
             <a:endParaRPr lang="en-SG"/>
           </a:p>
@@ -1961,7 +2046,7 @@
           <a:p>
             <a:fld id="{80132922-2178-4F3C-8D0D-6F4C7FD468A5}" type="datetimeFigureOut">
               <a:rPr lang="en-SG" smtClean="0"/>
-              <a:t>10/2/2024</a:t>
+              <a:t>11/2/2024</a:t>
             </a:fld>
             <a:endParaRPr lang="en-SG"/>
           </a:p>
@@ -2376,7 +2461,7 @@
           <a:p>
             <a:fld id="{80132922-2178-4F3C-8D0D-6F4C7FD468A5}" type="datetimeFigureOut">
               <a:rPr lang="en-SG" smtClean="0"/>
-              <a:t>10/2/2024</a:t>
+              <a:t>11/2/2024</a:t>
             </a:fld>
             <a:endParaRPr lang="en-SG"/>
           </a:p>
@@ -2518,7 +2603,7 @@
           <a:p>
             <a:fld id="{80132922-2178-4F3C-8D0D-6F4C7FD468A5}" type="datetimeFigureOut">
               <a:rPr lang="en-SG" smtClean="0"/>
-              <a:t>10/2/2024</a:t>
+              <a:t>11/2/2024</a:t>
             </a:fld>
             <a:endParaRPr lang="en-SG"/>
           </a:p>
@@ -2631,7 +2716,7 @@
           <a:p>
             <a:fld id="{80132922-2178-4F3C-8D0D-6F4C7FD468A5}" type="datetimeFigureOut">
               <a:rPr lang="en-SG" smtClean="0"/>
-              <a:t>10/2/2024</a:t>
+              <a:t>11/2/2024</a:t>
             </a:fld>
             <a:endParaRPr lang="en-SG"/>
           </a:p>
@@ -2944,7 +3029,7 @@
           <a:p>
             <a:fld id="{80132922-2178-4F3C-8D0D-6F4C7FD468A5}" type="datetimeFigureOut">
               <a:rPr lang="en-SG" smtClean="0"/>
-              <a:t>10/2/2024</a:t>
+              <a:t>11/2/2024</a:t>
             </a:fld>
             <a:endParaRPr lang="en-SG"/>
           </a:p>
@@ -3233,7 +3318,7 @@
           <a:p>
             <a:fld id="{80132922-2178-4F3C-8D0D-6F4C7FD468A5}" type="datetimeFigureOut">
               <a:rPr lang="en-SG" smtClean="0"/>
-              <a:t>10/2/2024</a:t>
+              <a:t>11/2/2024</a:t>
             </a:fld>
             <a:endParaRPr lang="en-SG"/>
           </a:p>
@@ -3476,7 +3561,7 @@
           <a:p>
             <a:fld id="{80132922-2178-4F3C-8D0D-6F4C7FD468A5}" type="datetimeFigureOut">
               <a:rPr lang="en-SG" smtClean="0"/>
-              <a:t>10/2/2024</a:t>
+              <a:t>11/2/2024</a:t>
             </a:fld>
             <a:endParaRPr lang="en-SG"/>
           </a:p>
@@ -7879,6 +7964,1046 @@
     <p:extLst>
       <p:ext uri="{BB962C8B-B14F-4D97-AF65-F5344CB8AC3E}">
         <p14:creationId xmlns:p14="http://schemas.microsoft.com/office/powerpoint/2010/main" val="612237545"/>
+      </p:ext>
+    </p:extLst>
+  </p:cSld>
+  <p:clrMapOvr>
+    <a:masterClrMapping/>
+  </p:clrMapOvr>
+</p:sld>
+</file>
+
+<file path=ppt/slides/slide3.xml><?xml version="1.0" encoding="utf-8"?>
+<p:sld xmlns:a="http://schemas.openxmlformats.org/drawingml/2006/main" xmlns:r="http://schemas.openxmlformats.org/officeDocument/2006/relationships" xmlns:p="http://schemas.openxmlformats.org/presentationml/2006/main">
+  <p:cSld>
+    <p:spTree>
+      <p:nvGrpSpPr>
+        <p:cNvPr id="1" name=""/>
+        <p:cNvGrpSpPr/>
+        <p:nvPr/>
+      </p:nvGrpSpPr>
+      <p:grpSpPr>
+        <a:xfrm>
+          <a:off x="0" y="0"/>
+          <a:ext cx="0" cy="0"/>
+          <a:chOff x="0" y="0"/>
+          <a:chExt cx="0" cy="0"/>
+        </a:xfrm>
+      </p:grpSpPr>
+      <p:pic>
+        <p:nvPicPr>
+          <p:cNvPr id="5" name="Picture 4">
+            <a:extLst>
+              <a:ext uri="{FF2B5EF4-FFF2-40B4-BE49-F238E27FC236}">
+                <a16:creationId xmlns:a16="http://schemas.microsoft.com/office/drawing/2014/main" id="{9B2C13A7-D080-E234-F1BC-21E2060FFE64}"/>
+              </a:ext>
+            </a:extLst>
+          </p:cNvPr>
+          <p:cNvPicPr>
+            <a:picLocks noChangeAspect="1"/>
+          </p:cNvPicPr>
+          <p:nvPr/>
+        </p:nvPicPr>
+        <p:blipFill>
+          <a:blip r:embed="rId3"/>
+          <a:stretch>
+            <a:fillRect/>
+          </a:stretch>
+        </p:blipFill>
+        <p:spPr>
+          <a:xfrm>
+            <a:off x="6767734" y="3534925"/>
+            <a:ext cx="3393161" cy="2184902"/>
+          </a:xfrm>
+          <a:prstGeom prst="rect">
+            <a:avLst/>
+          </a:prstGeom>
+          <a:ln w="12700">
+            <a:solidFill>
+              <a:schemeClr val="tx1"/>
+            </a:solidFill>
+          </a:ln>
+        </p:spPr>
+      </p:pic>
+      <p:pic>
+        <p:nvPicPr>
+          <p:cNvPr id="7" name="Picture 6" descr="A screenshot of a video game&#10;&#10;Description automatically generated">
+            <a:extLst>
+              <a:ext uri="{FF2B5EF4-FFF2-40B4-BE49-F238E27FC236}">
+                <a16:creationId xmlns:a16="http://schemas.microsoft.com/office/drawing/2014/main" id="{E83C6243-1CB0-44E1-75B6-6E97C650828D}"/>
+              </a:ext>
+            </a:extLst>
+          </p:cNvPr>
+          <p:cNvPicPr>
+            <a:picLocks noChangeAspect="1"/>
+          </p:cNvPicPr>
+          <p:nvPr/>
+        </p:nvPicPr>
+        <p:blipFill>
+          <a:blip r:embed="rId4">
+            <a:extLst>
+              <a:ext uri="{28A0092B-C50C-407E-A947-70E740481C1C}">
+                <a14:useLocalDpi xmlns:a14="http://schemas.microsoft.com/office/drawing/2010/main" val="0"/>
+              </a:ext>
+            </a:extLst>
+          </a:blip>
+          <a:stretch>
+            <a:fillRect/>
+          </a:stretch>
+        </p:blipFill>
+        <p:spPr>
+          <a:xfrm>
+            <a:off x="3855987" y="777961"/>
+            <a:ext cx="6372996" cy="2457471"/>
+          </a:xfrm>
+          <a:prstGeom prst="rect">
+            <a:avLst/>
+          </a:prstGeom>
+          <a:ln w="12700">
+            <a:solidFill>
+              <a:schemeClr val="tx1"/>
+            </a:solidFill>
+          </a:ln>
+        </p:spPr>
+      </p:pic>
+      <p:pic>
+        <p:nvPicPr>
+          <p:cNvPr id="8" name="Picture 7">
+            <a:extLst>
+              <a:ext uri="{FF2B5EF4-FFF2-40B4-BE49-F238E27FC236}">
+                <a16:creationId xmlns:a16="http://schemas.microsoft.com/office/drawing/2014/main" id="{2C4C16F5-AE84-3AAA-CA07-F42B56366543}"/>
+              </a:ext>
+            </a:extLst>
+          </p:cNvPr>
+          <p:cNvPicPr>
+            <a:picLocks noChangeAspect="1"/>
+          </p:cNvPicPr>
+          <p:nvPr/>
+        </p:nvPicPr>
+        <p:blipFill>
+          <a:blip r:embed="rId5"/>
+          <a:stretch>
+            <a:fillRect/>
+          </a:stretch>
+        </p:blipFill>
+        <p:spPr>
+          <a:xfrm>
+            <a:off x="1738129" y="3507296"/>
+            <a:ext cx="3821710" cy="2238982"/>
+          </a:xfrm>
+          <a:prstGeom prst="rect">
+            <a:avLst/>
+          </a:prstGeom>
+          <a:ln w="9525">
+            <a:solidFill>
+              <a:schemeClr val="tx1"/>
+            </a:solidFill>
+          </a:ln>
+        </p:spPr>
+      </p:pic>
+      <p:pic>
+        <p:nvPicPr>
+          <p:cNvPr id="10" name="Picture 9" descr="A green circuit board with a camera attached&#10;&#10;Description automatically generated">
+            <a:extLst>
+              <a:ext uri="{FF2B5EF4-FFF2-40B4-BE49-F238E27FC236}">
+                <a16:creationId xmlns:a16="http://schemas.microsoft.com/office/drawing/2014/main" id="{87E6D4B8-96F8-7EFA-03AB-20B0BCDF65AC}"/>
+              </a:ext>
+            </a:extLst>
+          </p:cNvPr>
+          <p:cNvPicPr>
+            <a:picLocks noChangeAspect="1"/>
+          </p:cNvPicPr>
+          <p:nvPr/>
+        </p:nvPicPr>
+        <p:blipFill>
+          <a:blip r:embed="rId6">
+            <a:extLst>
+              <a:ext uri="{28A0092B-C50C-407E-A947-70E740481C1C}">
+                <a14:useLocalDpi xmlns:a14="http://schemas.microsoft.com/office/drawing/2010/main" val="0"/>
+              </a:ext>
+            </a:extLst>
+          </a:blip>
+          <a:stretch>
+            <a:fillRect/>
+          </a:stretch>
+        </p:blipFill>
+        <p:spPr>
+          <a:xfrm>
+            <a:off x="1738129" y="2225329"/>
+            <a:ext cx="1334255" cy="999403"/>
+          </a:xfrm>
+          <a:prstGeom prst="rect">
+            <a:avLst/>
+          </a:prstGeom>
+          <a:ln w="9525">
+            <a:solidFill>
+              <a:schemeClr val="tx1"/>
+            </a:solidFill>
+          </a:ln>
+        </p:spPr>
+      </p:pic>
+      <p:pic>
+        <p:nvPicPr>
+          <p:cNvPr id="14" name="Picture 13">
+            <a:extLst>
+              <a:ext uri="{FF2B5EF4-FFF2-40B4-BE49-F238E27FC236}">
+                <a16:creationId xmlns:a16="http://schemas.microsoft.com/office/drawing/2014/main" id="{4ADBEF73-0051-7164-92FD-9072A08DC62F}"/>
+              </a:ext>
+            </a:extLst>
+          </p:cNvPr>
+          <p:cNvPicPr>
+            <a:picLocks noChangeAspect="1"/>
+          </p:cNvPicPr>
+          <p:nvPr/>
+        </p:nvPicPr>
+        <p:blipFill>
+          <a:blip r:embed="rId7"/>
+          <a:stretch>
+            <a:fillRect/>
+          </a:stretch>
+        </p:blipFill>
+        <p:spPr>
+          <a:xfrm>
+            <a:off x="6810726" y="3691460"/>
+            <a:ext cx="274751" cy="237929"/>
+          </a:xfrm>
+          <a:prstGeom prst="rect">
+            <a:avLst/>
+          </a:prstGeom>
+        </p:spPr>
+      </p:pic>
+      <p:cxnSp>
+        <p:nvCxnSpPr>
+          <p:cNvPr id="16" name="Straight Connector 15">
+            <a:extLst>
+              <a:ext uri="{FF2B5EF4-FFF2-40B4-BE49-F238E27FC236}">
+                <a16:creationId xmlns:a16="http://schemas.microsoft.com/office/drawing/2014/main" id="{9CC05B32-D9B9-CFE0-8D7E-1A55BE7986CF}"/>
+              </a:ext>
+            </a:extLst>
+          </p:cNvPr>
+          <p:cNvCxnSpPr>
+            <a:cxnSpLocks/>
+          </p:cNvCxnSpPr>
+          <p:nvPr/>
+        </p:nvCxnSpPr>
+        <p:spPr>
+          <a:xfrm flipH="1">
+            <a:off x="3072384" y="1815576"/>
+            <a:ext cx="1115568" cy="409753"/>
+          </a:xfrm>
+          <a:prstGeom prst="line">
+            <a:avLst/>
+          </a:prstGeom>
+          <a:ln>
+            <a:solidFill>
+              <a:srgbClr val="FF0000"/>
+            </a:solidFill>
+          </a:ln>
+        </p:spPr>
+        <p:style>
+          <a:lnRef idx="2">
+            <a:schemeClr val="accent1"/>
+          </a:lnRef>
+          <a:fillRef idx="0">
+            <a:schemeClr val="accent1"/>
+          </a:fillRef>
+          <a:effectRef idx="1">
+            <a:schemeClr val="accent1"/>
+          </a:effectRef>
+          <a:fontRef idx="minor">
+            <a:schemeClr val="tx1"/>
+          </a:fontRef>
+        </p:style>
+      </p:cxnSp>
+      <p:cxnSp>
+        <p:nvCxnSpPr>
+          <p:cNvPr id="17" name="Straight Connector 16">
+            <a:extLst>
+              <a:ext uri="{FF2B5EF4-FFF2-40B4-BE49-F238E27FC236}">
+                <a16:creationId xmlns:a16="http://schemas.microsoft.com/office/drawing/2014/main" id="{2289F220-77D9-796B-909D-640E248CD9EF}"/>
+              </a:ext>
+            </a:extLst>
+          </p:cNvPr>
+          <p:cNvCxnSpPr>
+            <a:cxnSpLocks/>
+          </p:cNvCxnSpPr>
+          <p:nvPr/>
+        </p:nvCxnSpPr>
+        <p:spPr>
+          <a:xfrm flipH="1">
+            <a:off x="3072384" y="2147844"/>
+            <a:ext cx="1115568" cy="1006836"/>
+          </a:xfrm>
+          <a:prstGeom prst="line">
+            <a:avLst/>
+          </a:prstGeom>
+          <a:ln>
+            <a:solidFill>
+              <a:srgbClr val="FF0000"/>
+            </a:solidFill>
+          </a:ln>
+        </p:spPr>
+        <p:style>
+          <a:lnRef idx="2">
+            <a:schemeClr val="accent1"/>
+          </a:lnRef>
+          <a:fillRef idx="0">
+            <a:schemeClr val="accent1"/>
+          </a:fillRef>
+          <a:effectRef idx="1">
+            <a:schemeClr val="accent1"/>
+          </a:effectRef>
+          <a:fontRef idx="minor">
+            <a:schemeClr val="tx1"/>
+          </a:fontRef>
+        </p:style>
+      </p:cxnSp>
+      <p:sp>
+        <p:nvSpPr>
+          <p:cNvPr id="20" name="TextBox 19">
+            <a:extLst>
+              <a:ext uri="{FF2B5EF4-FFF2-40B4-BE49-F238E27FC236}">
+                <a16:creationId xmlns:a16="http://schemas.microsoft.com/office/drawing/2014/main" id="{163691D0-68BC-E8BD-9662-1EFDE0B09DD6}"/>
+              </a:ext>
+            </a:extLst>
+          </p:cNvPr>
+          <p:cNvSpPr txBox="1"/>
+          <p:nvPr/>
+        </p:nvSpPr>
+        <p:spPr>
+          <a:xfrm>
+            <a:off x="1635427" y="1956162"/>
+            <a:ext cx="1687579" cy="276999"/>
+          </a:xfrm>
+          <a:prstGeom prst="rect">
+            <a:avLst/>
+          </a:prstGeom>
+          <a:noFill/>
+        </p:spPr>
+        <p:txBody>
+          <a:bodyPr wrap="square">
+            <a:spAutoFit/>
+          </a:bodyPr>
+          <a:lstStyle/>
+          <a:p>
+            <a:r>
+              <a:rPr lang="en-US" sz="1200" dirty="0">
+                <a:solidFill>
+                  <a:srgbClr val="FF0000"/>
+                </a:solidFill>
+              </a:rPr>
+              <a:t>Raspberry PI camera</a:t>
+            </a:r>
+            <a:endParaRPr lang="en-SG" sz="1200" dirty="0">
+              <a:solidFill>
+                <a:srgbClr val="FF0000"/>
+              </a:solidFill>
+            </a:endParaRPr>
+          </a:p>
+        </p:txBody>
+      </p:sp>
+      <p:cxnSp>
+        <p:nvCxnSpPr>
+          <p:cNvPr id="22" name="Straight Arrow Connector 21">
+            <a:extLst>
+              <a:ext uri="{FF2B5EF4-FFF2-40B4-BE49-F238E27FC236}">
+                <a16:creationId xmlns:a16="http://schemas.microsoft.com/office/drawing/2014/main" id="{C8A5959E-CAB3-6B3E-3BA1-22B17F9405BA}"/>
+              </a:ext>
+            </a:extLst>
+          </p:cNvPr>
+          <p:cNvCxnSpPr>
+            <a:cxnSpLocks/>
+          </p:cNvCxnSpPr>
+          <p:nvPr/>
+        </p:nvCxnSpPr>
+        <p:spPr>
+          <a:xfrm flipH="1">
+            <a:off x="4749744" y="3833923"/>
+            <a:ext cx="960873" cy="171058"/>
+          </a:xfrm>
+          <a:prstGeom prst="straightConnector1">
+            <a:avLst/>
+          </a:prstGeom>
+          <a:ln>
+            <a:solidFill>
+              <a:srgbClr val="FF0000"/>
+            </a:solidFill>
+            <a:tailEnd type="triangle"/>
+          </a:ln>
+        </p:spPr>
+        <p:style>
+          <a:lnRef idx="2">
+            <a:schemeClr val="accent1"/>
+          </a:lnRef>
+          <a:fillRef idx="0">
+            <a:schemeClr val="accent1"/>
+          </a:fillRef>
+          <a:effectRef idx="1">
+            <a:schemeClr val="accent1"/>
+          </a:effectRef>
+          <a:fontRef idx="minor">
+            <a:schemeClr val="tx1"/>
+          </a:fontRef>
+        </p:style>
+      </p:cxnSp>
+      <p:cxnSp>
+        <p:nvCxnSpPr>
+          <p:cNvPr id="25" name="Straight Arrow Connector 24">
+            <a:extLst>
+              <a:ext uri="{FF2B5EF4-FFF2-40B4-BE49-F238E27FC236}">
+                <a16:creationId xmlns:a16="http://schemas.microsoft.com/office/drawing/2014/main" id="{25322661-3EF3-ED42-6D04-E68EBDBFBF03}"/>
+              </a:ext>
+            </a:extLst>
+          </p:cNvPr>
+          <p:cNvCxnSpPr>
+            <a:cxnSpLocks/>
+          </p:cNvCxnSpPr>
+          <p:nvPr/>
+        </p:nvCxnSpPr>
+        <p:spPr>
+          <a:xfrm flipV="1">
+            <a:off x="6410808" y="3652937"/>
+            <a:ext cx="356926" cy="44453"/>
+          </a:xfrm>
+          <a:prstGeom prst="straightConnector1">
+            <a:avLst/>
+          </a:prstGeom>
+          <a:ln>
+            <a:solidFill>
+              <a:srgbClr val="FF0000"/>
+            </a:solidFill>
+            <a:tailEnd type="triangle"/>
+          </a:ln>
+        </p:spPr>
+        <p:style>
+          <a:lnRef idx="2">
+            <a:schemeClr val="accent1"/>
+          </a:lnRef>
+          <a:fillRef idx="0">
+            <a:schemeClr val="accent1"/>
+          </a:fillRef>
+          <a:effectRef idx="1">
+            <a:schemeClr val="accent1"/>
+          </a:effectRef>
+          <a:fontRef idx="minor">
+            <a:schemeClr val="tx1"/>
+          </a:fontRef>
+        </p:style>
+      </p:cxnSp>
+      <p:sp>
+        <p:nvSpPr>
+          <p:cNvPr id="29" name="TextBox 28">
+            <a:extLst>
+              <a:ext uri="{FF2B5EF4-FFF2-40B4-BE49-F238E27FC236}">
+                <a16:creationId xmlns:a16="http://schemas.microsoft.com/office/drawing/2014/main" id="{741B2D63-2C6B-D534-24B3-D578812875B9}"/>
+              </a:ext>
+            </a:extLst>
+          </p:cNvPr>
+          <p:cNvSpPr txBox="1"/>
+          <p:nvPr/>
+        </p:nvSpPr>
+        <p:spPr>
+          <a:xfrm>
+            <a:off x="5722435" y="3574963"/>
+            <a:ext cx="1112433" cy="646331"/>
+          </a:xfrm>
+          <a:prstGeom prst="rect">
+            <a:avLst/>
+          </a:prstGeom>
+          <a:noFill/>
+        </p:spPr>
+        <p:txBody>
+          <a:bodyPr wrap="square">
+            <a:spAutoFit/>
+          </a:bodyPr>
+          <a:lstStyle/>
+          <a:p>
+            <a:r>
+              <a:rPr lang="en-US" sz="1200" b="1" dirty="0"/>
+              <a:t>Train surveillance camera  </a:t>
+            </a:r>
+            <a:endParaRPr lang="en-SG" sz="1200" b="1" dirty="0"/>
+          </a:p>
+        </p:txBody>
+      </p:sp>
+      <p:cxnSp>
+        <p:nvCxnSpPr>
+          <p:cNvPr id="30" name="Straight Arrow Connector 29">
+            <a:extLst>
+              <a:ext uri="{FF2B5EF4-FFF2-40B4-BE49-F238E27FC236}">
+                <a16:creationId xmlns:a16="http://schemas.microsoft.com/office/drawing/2014/main" id="{2C413F78-4113-5A4A-16C1-070F360CD41B}"/>
+              </a:ext>
+            </a:extLst>
+          </p:cNvPr>
+          <p:cNvCxnSpPr>
+            <a:cxnSpLocks/>
+            <a:stCxn id="46" idx="0"/>
+          </p:cNvCxnSpPr>
+          <p:nvPr/>
+        </p:nvCxnSpPr>
+        <p:spPr>
+          <a:xfrm flipH="1" flipV="1">
+            <a:off x="4831720" y="3629268"/>
+            <a:ext cx="1728282" cy="1124891"/>
+          </a:xfrm>
+          <a:prstGeom prst="straightConnector1">
+            <a:avLst/>
+          </a:prstGeom>
+          <a:ln>
+            <a:solidFill>
+              <a:srgbClr val="FF0000"/>
+            </a:solidFill>
+            <a:tailEnd type="triangle"/>
+          </a:ln>
+        </p:spPr>
+        <p:style>
+          <a:lnRef idx="2">
+            <a:schemeClr val="accent1"/>
+          </a:lnRef>
+          <a:fillRef idx="0">
+            <a:schemeClr val="accent1"/>
+          </a:fillRef>
+          <a:effectRef idx="1">
+            <a:schemeClr val="accent1"/>
+          </a:effectRef>
+          <a:fontRef idx="minor">
+            <a:schemeClr val="tx1"/>
+          </a:fontRef>
+        </p:style>
+      </p:cxnSp>
+      <p:cxnSp>
+        <p:nvCxnSpPr>
+          <p:cNvPr id="35" name="Straight Arrow Connector 34">
+            <a:extLst>
+              <a:ext uri="{FF2B5EF4-FFF2-40B4-BE49-F238E27FC236}">
+                <a16:creationId xmlns:a16="http://schemas.microsoft.com/office/drawing/2014/main" id="{2A1D9877-17A4-C9D7-7630-EBBF4031120F}"/>
+              </a:ext>
+            </a:extLst>
+          </p:cNvPr>
+          <p:cNvCxnSpPr>
+            <a:cxnSpLocks/>
+            <a:stCxn id="46" idx="0"/>
+          </p:cNvCxnSpPr>
+          <p:nvPr/>
+        </p:nvCxnSpPr>
+        <p:spPr>
+          <a:xfrm flipV="1">
+            <a:off x="6560002" y="4160552"/>
+            <a:ext cx="345107" cy="593607"/>
+          </a:xfrm>
+          <a:prstGeom prst="straightConnector1">
+            <a:avLst/>
+          </a:prstGeom>
+          <a:ln>
+            <a:solidFill>
+              <a:srgbClr val="FF0000"/>
+            </a:solidFill>
+            <a:tailEnd type="triangle"/>
+          </a:ln>
+        </p:spPr>
+        <p:style>
+          <a:lnRef idx="2">
+            <a:schemeClr val="accent1"/>
+          </a:lnRef>
+          <a:fillRef idx="0">
+            <a:schemeClr val="accent1"/>
+          </a:fillRef>
+          <a:effectRef idx="1">
+            <a:schemeClr val="accent1"/>
+          </a:effectRef>
+          <a:fontRef idx="minor">
+            <a:schemeClr val="tx1"/>
+          </a:fontRef>
+        </p:style>
+      </p:cxnSp>
+      <p:cxnSp>
+        <p:nvCxnSpPr>
+          <p:cNvPr id="38" name="Straight Arrow Connector 37">
+            <a:extLst>
+              <a:ext uri="{FF2B5EF4-FFF2-40B4-BE49-F238E27FC236}">
+                <a16:creationId xmlns:a16="http://schemas.microsoft.com/office/drawing/2014/main" id="{5C38DB5E-707B-7F89-110B-9C0D6AE02E3F}"/>
+              </a:ext>
+            </a:extLst>
+          </p:cNvPr>
+          <p:cNvCxnSpPr>
+            <a:cxnSpLocks/>
+            <a:stCxn id="46" idx="0"/>
+          </p:cNvCxnSpPr>
+          <p:nvPr/>
+        </p:nvCxnSpPr>
+        <p:spPr>
+          <a:xfrm flipV="1">
+            <a:off x="6560002" y="4144075"/>
+            <a:ext cx="718622" cy="610084"/>
+          </a:xfrm>
+          <a:prstGeom prst="straightConnector1">
+            <a:avLst/>
+          </a:prstGeom>
+          <a:ln>
+            <a:solidFill>
+              <a:srgbClr val="FF0000"/>
+            </a:solidFill>
+            <a:tailEnd type="triangle"/>
+          </a:ln>
+        </p:spPr>
+        <p:style>
+          <a:lnRef idx="2">
+            <a:schemeClr val="accent1"/>
+          </a:lnRef>
+          <a:fillRef idx="0">
+            <a:schemeClr val="accent1"/>
+          </a:fillRef>
+          <a:effectRef idx="1">
+            <a:schemeClr val="accent1"/>
+          </a:effectRef>
+          <a:fontRef idx="minor">
+            <a:schemeClr val="tx1"/>
+          </a:fontRef>
+        </p:style>
+      </p:cxnSp>
+      <p:cxnSp>
+        <p:nvCxnSpPr>
+          <p:cNvPr id="43" name="Straight Arrow Connector 42">
+            <a:extLst>
+              <a:ext uri="{FF2B5EF4-FFF2-40B4-BE49-F238E27FC236}">
+                <a16:creationId xmlns:a16="http://schemas.microsoft.com/office/drawing/2014/main" id="{4ED1E815-30CF-C54F-98C4-666D8AB3A63E}"/>
+              </a:ext>
+            </a:extLst>
+          </p:cNvPr>
+          <p:cNvCxnSpPr>
+            <a:cxnSpLocks/>
+            <a:stCxn id="46" idx="0"/>
+          </p:cNvCxnSpPr>
+          <p:nvPr/>
+        </p:nvCxnSpPr>
+        <p:spPr>
+          <a:xfrm flipH="1" flipV="1">
+            <a:off x="5102264" y="4123945"/>
+            <a:ext cx="1457738" cy="630214"/>
+          </a:xfrm>
+          <a:prstGeom prst="straightConnector1">
+            <a:avLst/>
+          </a:prstGeom>
+          <a:ln>
+            <a:solidFill>
+              <a:srgbClr val="FF0000"/>
+            </a:solidFill>
+            <a:tailEnd type="triangle"/>
+          </a:ln>
+        </p:spPr>
+        <p:style>
+          <a:lnRef idx="2">
+            <a:schemeClr val="accent1"/>
+          </a:lnRef>
+          <a:fillRef idx="0">
+            <a:schemeClr val="accent1"/>
+          </a:fillRef>
+          <a:effectRef idx="1">
+            <a:schemeClr val="accent1"/>
+          </a:effectRef>
+          <a:fontRef idx="minor">
+            <a:schemeClr val="tx1"/>
+          </a:fontRef>
+        </p:style>
+      </p:cxnSp>
+      <p:sp>
+        <p:nvSpPr>
+          <p:cNvPr id="46" name="TextBox 45">
+            <a:extLst>
+              <a:ext uri="{FF2B5EF4-FFF2-40B4-BE49-F238E27FC236}">
+                <a16:creationId xmlns:a16="http://schemas.microsoft.com/office/drawing/2014/main" id="{AA889972-848C-B43B-6F50-B20951D622C8}"/>
+              </a:ext>
+            </a:extLst>
+          </p:cNvPr>
+          <p:cNvSpPr txBox="1"/>
+          <p:nvPr/>
+        </p:nvSpPr>
+        <p:spPr>
+          <a:xfrm>
+            <a:off x="5857969" y="4754159"/>
+            <a:ext cx="1404065" cy="461665"/>
+          </a:xfrm>
+          <a:prstGeom prst="rect">
+            <a:avLst/>
+          </a:prstGeom>
+          <a:solidFill>
+            <a:schemeClr val="bg1"/>
+          </a:solidFill>
+          <a:ln w="12700">
+            <a:solidFill>
+              <a:schemeClr val="tx1"/>
+            </a:solidFill>
+          </a:ln>
+        </p:spPr>
+        <p:txBody>
+          <a:bodyPr wrap="square">
+            <a:spAutoFit/>
+          </a:bodyPr>
+          <a:lstStyle/>
+          <a:p>
+            <a:r>
+              <a:rPr lang="en-US" sz="1200" b="1" dirty="0"/>
+              <a:t>Train motion detection sensor</a:t>
+            </a:r>
+            <a:endParaRPr lang="en-SG" sz="1200" b="1" dirty="0"/>
+          </a:p>
+        </p:txBody>
+      </p:sp>
+      <p:sp>
+        <p:nvSpPr>
+          <p:cNvPr id="49" name="Rectangle 48">
+            <a:extLst>
+              <a:ext uri="{FF2B5EF4-FFF2-40B4-BE49-F238E27FC236}">
+                <a16:creationId xmlns:a16="http://schemas.microsoft.com/office/drawing/2014/main" id="{AB55BE5F-A63A-9AE6-AA6F-0E43A9581818}"/>
+              </a:ext>
+            </a:extLst>
+          </p:cNvPr>
+          <p:cNvSpPr/>
+          <p:nvPr/>
+        </p:nvSpPr>
+        <p:spPr>
+          <a:xfrm>
+            <a:off x="4786468" y="4483120"/>
+            <a:ext cx="714575" cy="1092462"/>
+          </a:xfrm>
+          <a:prstGeom prst="rect">
+            <a:avLst/>
+          </a:prstGeom>
+          <a:noFill/>
+          <a:ln w="28575">
+            <a:solidFill>
+              <a:srgbClr val="FF9900"/>
+            </a:solidFill>
+            <a:prstDash val="sysDash"/>
+          </a:ln>
+        </p:spPr>
+        <p:style>
+          <a:lnRef idx="2">
+            <a:schemeClr val="accent6"/>
+          </a:lnRef>
+          <a:fillRef idx="1">
+            <a:schemeClr val="lt1"/>
+          </a:fillRef>
+          <a:effectRef idx="0">
+            <a:schemeClr val="accent6"/>
+          </a:effectRef>
+          <a:fontRef idx="minor">
+            <a:schemeClr val="dk1"/>
+          </a:fontRef>
+        </p:style>
+        <p:txBody>
+          <a:bodyPr rtlCol="0" anchor="ctr"/>
+          <a:lstStyle/>
+          <a:p>
+            <a:pPr algn="ctr"/>
+            <a:endParaRPr lang="en-SG" dirty="0"/>
+          </a:p>
+        </p:txBody>
+      </p:sp>
+      <p:sp>
+        <p:nvSpPr>
+          <p:cNvPr id="50" name="Rectangle 49">
+            <a:extLst>
+              <a:ext uri="{FF2B5EF4-FFF2-40B4-BE49-F238E27FC236}">
+                <a16:creationId xmlns:a16="http://schemas.microsoft.com/office/drawing/2014/main" id="{E4E0B144-5A37-009E-6434-4E524AB3D2E3}"/>
+              </a:ext>
+            </a:extLst>
+          </p:cNvPr>
+          <p:cNvSpPr/>
+          <p:nvPr/>
+        </p:nvSpPr>
+        <p:spPr>
+          <a:xfrm>
+            <a:off x="8916508" y="4381255"/>
+            <a:ext cx="1023020" cy="885689"/>
+          </a:xfrm>
+          <a:prstGeom prst="rect">
+            <a:avLst/>
+          </a:prstGeom>
+          <a:noFill/>
+          <a:ln w="28575">
+            <a:solidFill>
+              <a:srgbClr val="FF9900"/>
+            </a:solidFill>
+            <a:prstDash val="sysDash"/>
+          </a:ln>
+        </p:spPr>
+        <p:style>
+          <a:lnRef idx="2">
+            <a:schemeClr val="accent6"/>
+          </a:lnRef>
+          <a:fillRef idx="1">
+            <a:schemeClr val="lt1"/>
+          </a:fillRef>
+          <a:effectRef idx="0">
+            <a:schemeClr val="accent6"/>
+          </a:effectRef>
+          <a:fontRef idx="minor">
+            <a:schemeClr val="dk1"/>
+          </a:fontRef>
+        </p:style>
+        <p:txBody>
+          <a:bodyPr rtlCol="0" anchor="ctr"/>
+          <a:lstStyle/>
+          <a:p>
+            <a:pPr algn="ctr"/>
+            <a:endParaRPr lang="en-SG" dirty="0"/>
+          </a:p>
+        </p:txBody>
+      </p:sp>
+      <p:cxnSp>
+        <p:nvCxnSpPr>
+          <p:cNvPr id="51" name="Straight Arrow Connector 50">
+            <a:extLst>
+              <a:ext uri="{FF2B5EF4-FFF2-40B4-BE49-F238E27FC236}">
+                <a16:creationId xmlns:a16="http://schemas.microsoft.com/office/drawing/2014/main" id="{A1BDED87-80C3-F359-931B-E592D198A32A}"/>
+              </a:ext>
+            </a:extLst>
+          </p:cNvPr>
+          <p:cNvCxnSpPr>
+            <a:cxnSpLocks/>
+          </p:cNvCxnSpPr>
+          <p:nvPr/>
+        </p:nvCxnSpPr>
+        <p:spPr>
+          <a:xfrm flipH="1">
+            <a:off x="5559839" y="5458968"/>
+            <a:ext cx="850969" cy="0"/>
+          </a:xfrm>
+          <a:prstGeom prst="straightConnector1">
+            <a:avLst/>
+          </a:prstGeom>
+          <a:ln>
+            <a:solidFill>
+              <a:srgbClr val="FF0000"/>
+            </a:solidFill>
+            <a:tailEnd type="triangle"/>
+          </a:ln>
+        </p:spPr>
+        <p:style>
+          <a:lnRef idx="2">
+            <a:schemeClr val="accent1"/>
+          </a:lnRef>
+          <a:fillRef idx="0">
+            <a:schemeClr val="accent1"/>
+          </a:fillRef>
+          <a:effectRef idx="1">
+            <a:schemeClr val="accent1"/>
+          </a:effectRef>
+          <a:fontRef idx="minor">
+            <a:schemeClr val="tx1"/>
+          </a:fontRef>
+        </p:style>
+      </p:cxnSp>
+      <p:cxnSp>
+        <p:nvCxnSpPr>
+          <p:cNvPr id="54" name="Straight Arrow Connector 53">
+            <a:extLst>
+              <a:ext uri="{FF2B5EF4-FFF2-40B4-BE49-F238E27FC236}">
+                <a16:creationId xmlns:a16="http://schemas.microsoft.com/office/drawing/2014/main" id="{548BC1B4-7487-3364-0FEF-73BA4C85A0E8}"/>
+              </a:ext>
+            </a:extLst>
+          </p:cNvPr>
+          <p:cNvCxnSpPr>
+            <a:cxnSpLocks/>
+            <a:stCxn id="58" idx="3"/>
+            <a:endCxn id="50" idx="2"/>
+          </p:cNvCxnSpPr>
+          <p:nvPr/>
+        </p:nvCxnSpPr>
+        <p:spPr>
+          <a:xfrm flipV="1">
+            <a:off x="8130668" y="5266944"/>
+            <a:ext cx="1297350" cy="217957"/>
+          </a:xfrm>
+          <a:prstGeom prst="straightConnector1">
+            <a:avLst/>
+          </a:prstGeom>
+          <a:ln>
+            <a:solidFill>
+              <a:srgbClr val="FF0000"/>
+            </a:solidFill>
+            <a:tailEnd type="triangle"/>
+          </a:ln>
+        </p:spPr>
+        <p:style>
+          <a:lnRef idx="2">
+            <a:schemeClr val="accent1"/>
+          </a:lnRef>
+          <a:fillRef idx="0">
+            <a:schemeClr val="accent1"/>
+          </a:fillRef>
+          <a:effectRef idx="1">
+            <a:schemeClr val="accent1"/>
+          </a:effectRef>
+          <a:fontRef idx="minor">
+            <a:schemeClr val="tx1"/>
+          </a:fontRef>
+        </p:style>
+      </p:cxnSp>
+      <p:sp>
+        <p:nvSpPr>
+          <p:cNvPr id="58" name="TextBox 57">
+            <a:extLst>
+              <a:ext uri="{FF2B5EF4-FFF2-40B4-BE49-F238E27FC236}">
+                <a16:creationId xmlns:a16="http://schemas.microsoft.com/office/drawing/2014/main" id="{7A7F9405-4DF5-F6EF-45A5-161416E0F80A}"/>
+              </a:ext>
+            </a:extLst>
+          </p:cNvPr>
+          <p:cNvSpPr txBox="1"/>
+          <p:nvPr/>
+        </p:nvSpPr>
+        <p:spPr>
+          <a:xfrm>
+            <a:off x="6410808" y="5346401"/>
+            <a:ext cx="1719860" cy="276999"/>
+          </a:xfrm>
+          <a:prstGeom prst="rect">
+            <a:avLst/>
+          </a:prstGeom>
+          <a:solidFill>
+            <a:schemeClr val="bg1"/>
+          </a:solidFill>
+          <a:ln>
+            <a:solidFill>
+              <a:schemeClr val="accent1">
+                <a:lumMod val="75000"/>
+              </a:schemeClr>
+            </a:solidFill>
+          </a:ln>
+        </p:spPr>
+        <p:txBody>
+          <a:bodyPr wrap="square">
+            <a:spAutoFit/>
+          </a:bodyPr>
+          <a:lstStyle/>
+          <a:p>
+            <a:r>
+              <a:rPr lang="en-US" sz="1200" b="1" dirty="0"/>
+              <a:t>Railway Train station </a:t>
+            </a:r>
+            <a:endParaRPr lang="en-SG" sz="1200" b="1" dirty="0"/>
+          </a:p>
+        </p:txBody>
+      </p:sp>
+      <p:sp>
+        <p:nvSpPr>
+          <p:cNvPr id="76" name="TextBox 75">
+            <a:extLst>
+              <a:ext uri="{FF2B5EF4-FFF2-40B4-BE49-F238E27FC236}">
+                <a16:creationId xmlns:a16="http://schemas.microsoft.com/office/drawing/2014/main" id="{85053011-D8CE-BC66-972B-95B7B50C4B61}"/>
+              </a:ext>
+            </a:extLst>
+          </p:cNvPr>
+          <p:cNvSpPr txBox="1"/>
+          <p:nvPr/>
+        </p:nvSpPr>
+        <p:spPr>
+          <a:xfrm>
+            <a:off x="1645758" y="3257926"/>
+            <a:ext cx="1687579" cy="276999"/>
+          </a:xfrm>
+          <a:prstGeom prst="rect">
+            <a:avLst/>
+          </a:prstGeom>
+          <a:noFill/>
+        </p:spPr>
+        <p:txBody>
+          <a:bodyPr wrap="square">
+            <a:spAutoFit/>
+          </a:bodyPr>
+          <a:lstStyle/>
+          <a:p>
+            <a:r>
+              <a:rPr lang="en-US" sz="1200" b="1" dirty="0"/>
+              <a:t>Real world emulation </a:t>
+            </a:r>
+            <a:endParaRPr lang="en-SG" sz="1200" b="1" dirty="0"/>
+          </a:p>
+        </p:txBody>
+      </p:sp>
+      <p:sp>
+        <p:nvSpPr>
+          <p:cNvPr id="77" name="TextBox 76">
+            <a:extLst>
+              <a:ext uri="{FF2B5EF4-FFF2-40B4-BE49-F238E27FC236}">
+                <a16:creationId xmlns:a16="http://schemas.microsoft.com/office/drawing/2014/main" id="{5351CF1A-60FB-0156-EB79-60D1663EFBBD}"/>
+              </a:ext>
+            </a:extLst>
+          </p:cNvPr>
+          <p:cNvSpPr txBox="1"/>
+          <p:nvPr/>
+        </p:nvSpPr>
+        <p:spPr>
+          <a:xfrm>
+            <a:off x="6647891" y="3273464"/>
+            <a:ext cx="2965554" cy="276999"/>
+          </a:xfrm>
+          <a:prstGeom prst="rect">
+            <a:avLst/>
+          </a:prstGeom>
+          <a:noFill/>
+        </p:spPr>
+        <p:txBody>
+          <a:bodyPr wrap="square">
+            <a:spAutoFit/>
+          </a:bodyPr>
+          <a:lstStyle/>
+          <a:p>
+            <a:r>
+              <a:rPr lang="en-US" sz="1200" b="1" dirty="0"/>
+              <a:t>Physical module hardware top view</a:t>
+            </a:r>
+            <a:endParaRPr lang="en-SG" sz="1200" b="1" dirty="0"/>
+          </a:p>
+        </p:txBody>
+      </p:sp>
+      <p:sp>
+        <p:nvSpPr>
+          <p:cNvPr id="78" name="TextBox 77">
+            <a:extLst>
+              <a:ext uri="{FF2B5EF4-FFF2-40B4-BE49-F238E27FC236}">
+                <a16:creationId xmlns:a16="http://schemas.microsoft.com/office/drawing/2014/main" id="{D16FA706-762E-2BF4-94EB-AA220BD32C41}"/>
+              </a:ext>
+            </a:extLst>
+          </p:cNvPr>
+          <p:cNvSpPr txBox="1"/>
+          <p:nvPr/>
+        </p:nvSpPr>
+        <p:spPr>
+          <a:xfrm>
+            <a:off x="1645758" y="774365"/>
+            <a:ext cx="1884714" cy="1015663"/>
+          </a:xfrm>
+          <a:prstGeom prst="rect">
+            <a:avLst/>
+          </a:prstGeom>
+          <a:noFill/>
+          <a:ln w="19050">
+            <a:solidFill>
+              <a:schemeClr val="tx1"/>
+            </a:solidFill>
+            <a:prstDash val="sysDash"/>
+          </a:ln>
+        </p:spPr>
+        <p:txBody>
+          <a:bodyPr wrap="square">
+            <a:spAutoFit/>
+          </a:bodyPr>
+          <a:lstStyle/>
+          <a:p>
+            <a:r>
+              <a:rPr lang="en-US" sz="1200" b="1" dirty="0"/>
+              <a:t>Railway Station Safety Surveillance System digital twin emulation and real-world physical module position </a:t>
+            </a:r>
+            <a:endParaRPr lang="en-SG" sz="1200" b="1" dirty="0"/>
+          </a:p>
+        </p:txBody>
+      </p:sp>
+    </p:spTree>
+    <p:extLst>
+      <p:ext uri="{BB962C8B-B14F-4D97-AF65-F5344CB8AC3E}">
+        <p14:creationId xmlns:p14="http://schemas.microsoft.com/office/powerpoint/2010/main" val="1159820472"/>
       </p:ext>
     </p:extLst>
   </p:cSld>

</xml_diff>

<commit_message>
Update the project design section of the read me file.
</commit_message>
<xml_diff>
--- a/doc/designDoc.pptx
+++ b/doc/designDoc.pptx
@@ -5,12 +5,13 @@
     <p:sldMasterId id="2147483648" r:id="rId1"/>
   </p:sldMasterIdLst>
   <p:notesMasterIdLst>
-    <p:notesMasterId r:id="rId5"/>
+    <p:notesMasterId r:id="rId6"/>
   </p:notesMasterIdLst>
   <p:sldIdLst>
     <p:sldId id="256" r:id="rId2"/>
     <p:sldId id="258" r:id="rId3"/>
     <p:sldId id="259" r:id="rId4"/>
+    <p:sldId id="260" r:id="rId5"/>
   </p:sldIdLst>
   <p:sldSz cx="12192000" cy="6858000"/>
   <p:notesSz cx="6858000" cy="9144000"/>
@@ -199,7 +200,7 @@
           <a:p>
             <a:fld id="{B20EB3CF-2C03-445A-AC68-BFCA7FF1C3FD}" type="datetimeFigureOut">
               <a:rPr lang="en-SG" smtClean="0"/>
-              <a:t>11/2/2024</a:t>
+              <a:t>12/2/2024</a:t>
             </a:fld>
             <a:endParaRPr lang="en-SG"/>
           </a:p>
@@ -892,7 +893,7 @@
           <a:p>
             <a:fld id="{80132922-2178-4F3C-8D0D-6F4C7FD468A5}" type="datetimeFigureOut">
               <a:rPr lang="en-SG" smtClean="0"/>
-              <a:t>11/2/2024</a:t>
+              <a:t>12/2/2024</a:t>
             </a:fld>
             <a:endParaRPr lang="en-SG"/>
           </a:p>
@@ -1092,7 +1093,7 @@
           <a:p>
             <a:fld id="{80132922-2178-4F3C-8D0D-6F4C7FD468A5}" type="datetimeFigureOut">
               <a:rPr lang="en-SG" smtClean="0"/>
-              <a:t>11/2/2024</a:t>
+              <a:t>12/2/2024</a:t>
             </a:fld>
             <a:endParaRPr lang="en-SG"/>
           </a:p>
@@ -1302,7 +1303,7 @@
           <a:p>
             <a:fld id="{80132922-2178-4F3C-8D0D-6F4C7FD468A5}" type="datetimeFigureOut">
               <a:rPr lang="en-SG" smtClean="0"/>
-              <a:t>11/2/2024</a:t>
+              <a:t>12/2/2024</a:t>
             </a:fld>
             <a:endParaRPr lang="en-SG"/>
           </a:p>
@@ -1502,7 +1503,7 @@
           <a:p>
             <a:fld id="{80132922-2178-4F3C-8D0D-6F4C7FD468A5}" type="datetimeFigureOut">
               <a:rPr lang="en-SG" smtClean="0"/>
-              <a:t>11/2/2024</a:t>
+              <a:t>12/2/2024</a:t>
             </a:fld>
             <a:endParaRPr lang="en-SG"/>
           </a:p>
@@ -1778,7 +1779,7 @@
           <a:p>
             <a:fld id="{80132922-2178-4F3C-8D0D-6F4C7FD468A5}" type="datetimeFigureOut">
               <a:rPr lang="en-SG" smtClean="0"/>
-              <a:t>11/2/2024</a:t>
+              <a:t>12/2/2024</a:t>
             </a:fld>
             <a:endParaRPr lang="en-SG"/>
           </a:p>
@@ -2046,7 +2047,7 @@
           <a:p>
             <a:fld id="{80132922-2178-4F3C-8D0D-6F4C7FD468A5}" type="datetimeFigureOut">
               <a:rPr lang="en-SG" smtClean="0"/>
-              <a:t>11/2/2024</a:t>
+              <a:t>12/2/2024</a:t>
             </a:fld>
             <a:endParaRPr lang="en-SG"/>
           </a:p>
@@ -2461,7 +2462,7 @@
           <a:p>
             <a:fld id="{80132922-2178-4F3C-8D0D-6F4C7FD468A5}" type="datetimeFigureOut">
               <a:rPr lang="en-SG" smtClean="0"/>
-              <a:t>11/2/2024</a:t>
+              <a:t>12/2/2024</a:t>
             </a:fld>
             <a:endParaRPr lang="en-SG"/>
           </a:p>
@@ -2603,7 +2604,7 @@
           <a:p>
             <a:fld id="{80132922-2178-4F3C-8D0D-6F4C7FD468A5}" type="datetimeFigureOut">
               <a:rPr lang="en-SG" smtClean="0"/>
-              <a:t>11/2/2024</a:t>
+              <a:t>12/2/2024</a:t>
             </a:fld>
             <a:endParaRPr lang="en-SG"/>
           </a:p>
@@ -2716,7 +2717,7 @@
           <a:p>
             <a:fld id="{80132922-2178-4F3C-8D0D-6F4C7FD468A5}" type="datetimeFigureOut">
               <a:rPr lang="en-SG" smtClean="0"/>
-              <a:t>11/2/2024</a:t>
+              <a:t>12/2/2024</a:t>
             </a:fld>
             <a:endParaRPr lang="en-SG"/>
           </a:p>
@@ -3029,7 +3030,7 @@
           <a:p>
             <a:fld id="{80132922-2178-4F3C-8D0D-6F4C7FD468A5}" type="datetimeFigureOut">
               <a:rPr lang="en-SG" smtClean="0"/>
-              <a:t>11/2/2024</a:t>
+              <a:t>12/2/2024</a:t>
             </a:fld>
             <a:endParaRPr lang="en-SG"/>
           </a:p>
@@ -3318,7 +3319,7 @@
           <a:p>
             <a:fld id="{80132922-2178-4F3C-8D0D-6F4C7FD468A5}" type="datetimeFigureOut">
               <a:rPr lang="en-SG" smtClean="0"/>
-              <a:t>11/2/2024</a:t>
+              <a:t>12/2/2024</a:t>
             </a:fld>
             <a:endParaRPr lang="en-SG"/>
           </a:p>
@@ -3561,7 +3562,7 @@
           <a:p>
             <a:fld id="{80132922-2178-4F3C-8D0D-6F4C7FD468A5}" type="datetimeFigureOut">
               <a:rPr lang="en-SG" smtClean="0"/>
-              <a:t>11/2/2024</a:t>
+              <a:t>12/2/2024</a:t>
             </a:fld>
             <a:endParaRPr lang="en-SG"/>
           </a:p>
@@ -9004,6 +9005,1832 @@
     <p:extLst>
       <p:ext uri="{BB962C8B-B14F-4D97-AF65-F5344CB8AC3E}">
         <p14:creationId xmlns:p14="http://schemas.microsoft.com/office/powerpoint/2010/main" val="1159820472"/>
+      </p:ext>
+    </p:extLst>
+  </p:cSld>
+  <p:clrMapOvr>
+    <a:masterClrMapping/>
+  </p:clrMapOvr>
+</p:sld>
+</file>
+
+<file path=ppt/slides/slide4.xml><?xml version="1.0" encoding="utf-8"?>
+<p:sld xmlns:a="http://schemas.openxmlformats.org/drawingml/2006/main" xmlns:r="http://schemas.openxmlformats.org/officeDocument/2006/relationships" xmlns:p="http://schemas.openxmlformats.org/presentationml/2006/main">
+  <p:cSld>
+    <p:spTree>
+      <p:nvGrpSpPr>
+        <p:cNvPr id="1" name=""/>
+        <p:cNvGrpSpPr/>
+        <p:nvPr/>
+      </p:nvGrpSpPr>
+      <p:grpSpPr>
+        <a:xfrm>
+          <a:off x="0" y="0"/>
+          <a:ext cx="0" cy="0"/>
+          <a:chOff x="0" y="0"/>
+          <a:chExt cx="0" cy="0"/>
+        </a:xfrm>
+      </p:grpSpPr>
+      <p:cxnSp>
+        <p:nvCxnSpPr>
+          <p:cNvPr id="4" name="Straight Arrow Connector 3">
+            <a:extLst>
+              <a:ext uri="{FF2B5EF4-FFF2-40B4-BE49-F238E27FC236}">
+                <a16:creationId xmlns:a16="http://schemas.microsoft.com/office/drawing/2014/main" id="{B2EE8B2E-1AF4-A92B-809C-30BA545E4FE6}"/>
+              </a:ext>
+            </a:extLst>
+          </p:cNvPr>
+          <p:cNvCxnSpPr>
+            <a:cxnSpLocks/>
+          </p:cNvCxnSpPr>
+          <p:nvPr/>
+        </p:nvCxnSpPr>
+        <p:spPr>
+          <a:xfrm>
+            <a:off x="3639128" y="1079779"/>
+            <a:ext cx="0" cy="5501996"/>
+          </a:xfrm>
+          <a:prstGeom prst="straightConnector1">
+            <a:avLst/>
+          </a:prstGeom>
+          <a:ln w="19050">
+            <a:solidFill>
+              <a:srgbClr val="002060"/>
+            </a:solidFill>
+            <a:tailEnd type="triangle"/>
+          </a:ln>
+        </p:spPr>
+        <p:style>
+          <a:lnRef idx="1">
+            <a:schemeClr val="accent1"/>
+          </a:lnRef>
+          <a:fillRef idx="0">
+            <a:schemeClr val="accent1"/>
+          </a:fillRef>
+          <a:effectRef idx="0">
+            <a:schemeClr val="accent1"/>
+          </a:effectRef>
+          <a:fontRef idx="minor">
+            <a:schemeClr val="tx1"/>
+          </a:fontRef>
+        </p:style>
+      </p:cxnSp>
+      <p:sp>
+        <p:nvSpPr>
+          <p:cNvPr id="5" name="TextBox 4">
+            <a:extLst>
+              <a:ext uri="{FF2B5EF4-FFF2-40B4-BE49-F238E27FC236}">
+                <a16:creationId xmlns:a16="http://schemas.microsoft.com/office/drawing/2014/main" id="{77B82D68-1A29-1A7D-75A5-F67521F64343}"/>
+              </a:ext>
+            </a:extLst>
+          </p:cNvPr>
+          <p:cNvSpPr txBox="1"/>
+          <p:nvPr/>
+        </p:nvSpPr>
+        <p:spPr>
+          <a:xfrm>
+            <a:off x="3053715" y="807604"/>
+            <a:ext cx="1168464" cy="363615"/>
+          </a:xfrm>
+          <a:prstGeom prst="rect">
+            <a:avLst/>
+          </a:prstGeom>
+          <a:solidFill>
+            <a:schemeClr val="bg1"/>
+          </a:solidFill>
+          <a:ln w="19050">
+            <a:solidFill>
+              <a:srgbClr val="002060"/>
+            </a:solidFill>
+          </a:ln>
+        </p:spPr>
+        <p:txBody>
+          <a:bodyPr wrap="square" lIns="36000" tIns="36000" rIns="36000" bIns="36000" rtlCol="0">
+            <a:noAutofit/>
+          </a:bodyPr>
+          <a:lstStyle/>
+          <a:p>
+            <a:r>
+              <a:rPr lang="en-US" sz="1100" b="1" dirty="0">
+                <a:solidFill>
+                  <a:srgbClr val="002060"/>
+                </a:solidFill>
+              </a:rPr>
+              <a:t>Train detection program start </a:t>
+            </a:r>
+            <a:endParaRPr lang="en-SG" sz="1100" b="1" dirty="0">
+              <a:solidFill>
+                <a:srgbClr val="002060"/>
+              </a:solidFill>
+            </a:endParaRPr>
+          </a:p>
+        </p:txBody>
+      </p:sp>
+      <p:pic>
+        <p:nvPicPr>
+          <p:cNvPr id="7" name="Picture 6">
+            <a:extLst>
+              <a:ext uri="{FF2B5EF4-FFF2-40B4-BE49-F238E27FC236}">
+                <a16:creationId xmlns:a16="http://schemas.microsoft.com/office/drawing/2014/main" id="{A335DE9E-E5CE-43A5-FB87-97044560AD3E}"/>
+              </a:ext>
+            </a:extLst>
+          </p:cNvPr>
+          <p:cNvPicPr>
+            <a:picLocks noChangeAspect="1"/>
+          </p:cNvPicPr>
+          <p:nvPr/>
+        </p:nvPicPr>
+        <p:blipFill>
+          <a:blip r:embed="rId2"/>
+          <a:stretch>
+            <a:fillRect/>
+          </a:stretch>
+        </p:blipFill>
+        <p:spPr>
+          <a:xfrm>
+            <a:off x="3053715" y="335109"/>
+            <a:ext cx="440818" cy="449635"/>
+          </a:xfrm>
+          <a:prstGeom prst="rect">
+            <a:avLst/>
+          </a:prstGeom>
+          <a:solidFill>
+            <a:schemeClr val="tx1"/>
+          </a:solidFill>
+          <a:ln>
+            <a:solidFill>
+              <a:schemeClr val="tx1"/>
+            </a:solidFill>
+          </a:ln>
+        </p:spPr>
+      </p:pic>
+      <p:sp>
+        <p:nvSpPr>
+          <p:cNvPr id="8" name="TextBox 7">
+            <a:extLst>
+              <a:ext uri="{FF2B5EF4-FFF2-40B4-BE49-F238E27FC236}">
+                <a16:creationId xmlns:a16="http://schemas.microsoft.com/office/drawing/2014/main" id="{43049C8D-6C3F-0D14-7A35-38A1CBE28E96}"/>
+              </a:ext>
+            </a:extLst>
+          </p:cNvPr>
+          <p:cNvSpPr txBox="1"/>
+          <p:nvPr/>
+        </p:nvSpPr>
+        <p:spPr>
+          <a:xfrm>
+            <a:off x="3494533" y="300219"/>
+            <a:ext cx="1971236" cy="461665"/>
+          </a:xfrm>
+          <a:prstGeom prst="rect">
+            <a:avLst/>
+          </a:prstGeom>
+          <a:noFill/>
+        </p:spPr>
+        <p:txBody>
+          <a:bodyPr wrap="square">
+            <a:spAutoFit/>
+          </a:bodyPr>
+          <a:lstStyle/>
+          <a:p>
+            <a:r>
+              <a:rPr lang="en-US" sz="1200" b="1" dirty="0"/>
+              <a:t>Train video process [train detection] computer </a:t>
+            </a:r>
+            <a:endParaRPr lang="en-SG" sz="1200" b="1" dirty="0"/>
+          </a:p>
+        </p:txBody>
+      </p:sp>
+      <p:sp>
+        <p:nvSpPr>
+          <p:cNvPr id="9" name="TextBox 8">
+            <a:extLst>
+              <a:ext uri="{FF2B5EF4-FFF2-40B4-BE49-F238E27FC236}">
+                <a16:creationId xmlns:a16="http://schemas.microsoft.com/office/drawing/2014/main" id="{CF6C343A-E611-39C1-95C9-DB23012B8852}"/>
+              </a:ext>
+            </a:extLst>
+          </p:cNvPr>
+          <p:cNvSpPr txBox="1"/>
+          <p:nvPr/>
+        </p:nvSpPr>
+        <p:spPr>
+          <a:xfrm>
+            <a:off x="5654938" y="854257"/>
+            <a:ext cx="1155859" cy="404337"/>
+          </a:xfrm>
+          <a:prstGeom prst="rect">
+            <a:avLst/>
+          </a:prstGeom>
+          <a:solidFill>
+            <a:schemeClr val="bg1"/>
+          </a:solidFill>
+          <a:ln w="19050">
+            <a:solidFill>
+              <a:srgbClr val="FF0000"/>
+            </a:solidFill>
+          </a:ln>
+        </p:spPr>
+        <p:txBody>
+          <a:bodyPr wrap="square" lIns="36000" tIns="36000" rIns="36000" bIns="36000" rtlCol="0">
+            <a:noAutofit/>
+          </a:bodyPr>
+          <a:lstStyle/>
+          <a:p>
+            <a:r>
+              <a:rPr lang="en-US" sz="1100" b="1" dirty="0">
+                <a:solidFill>
+                  <a:srgbClr val="FF0000"/>
+                </a:solidFill>
+              </a:rPr>
+              <a:t>Red team attack procedure</a:t>
+            </a:r>
+            <a:endParaRPr lang="en-SG" sz="1100" b="1" dirty="0">
+              <a:solidFill>
+                <a:srgbClr val="FF0000"/>
+              </a:solidFill>
+            </a:endParaRPr>
+          </a:p>
+        </p:txBody>
+      </p:sp>
+      <p:cxnSp>
+        <p:nvCxnSpPr>
+          <p:cNvPr id="10" name="Straight Arrow Connector 9">
+            <a:extLst>
+              <a:ext uri="{FF2B5EF4-FFF2-40B4-BE49-F238E27FC236}">
+                <a16:creationId xmlns:a16="http://schemas.microsoft.com/office/drawing/2014/main" id="{9290E90D-41EE-6680-C61F-7CC4940FE46E}"/>
+              </a:ext>
+            </a:extLst>
+          </p:cNvPr>
+          <p:cNvCxnSpPr>
+            <a:cxnSpLocks/>
+          </p:cNvCxnSpPr>
+          <p:nvPr/>
+        </p:nvCxnSpPr>
+        <p:spPr>
+          <a:xfrm>
+            <a:off x="6236372" y="1245420"/>
+            <a:ext cx="0" cy="5336355"/>
+          </a:xfrm>
+          <a:prstGeom prst="straightConnector1">
+            <a:avLst/>
+          </a:prstGeom>
+          <a:ln w="19050">
+            <a:solidFill>
+              <a:srgbClr val="FF0000"/>
+            </a:solidFill>
+            <a:tailEnd type="triangle"/>
+          </a:ln>
+        </p:spPr>
+        <p:style>
+          <a:lnRef idx="1">
+            <a:schemeClr val="accent1"/>
+          </a:lnRef>
+          <a:fillRef idx="0">
+            <a:schemeClr val="accent1"/>
+          </a:fillRef>
+          <a:effectRef idx="0">
+            <a:schemeClr val="accent1"/>
+          </a:effectRef>
+          <a:fontRef idx="minor">
+            <a:schemeClr val="tx1"/>
+          </a:fontRef>
+        </p:style>
+      </p:cxnSp>
+      <p:pic>
+        <p:nvPicPr>
+          <p:cNvPr id="11" name="Picture 10">
+            <a:extLst>
+              <a:ext uri="{FF2B5EF4-FFF2-40B4-BE49-F238E27FC236}">
+                <a16:creationId xmlns:a16="http://schemas.microsoft.com/office/drawing/2014/main" id="{03A7772E-5A2A-6D4B-ABD1-CBBD6FB72117}"/>
+              </a:ext>
+            </a:extLst>
+          </p:cNvPr>
+          <p:cNvPicPr>
+            <a:picLocks noChangeAspect="1"/>
+          </p:cNvPicPr>
+          <p:nvPr/>
+        </p:nvPicPr>
+        <p:blipFill>
+          <a:blip r:embed="rId3"/>
+          <a:stretch>
+            <a:fillRect/>
+          </a:stretch>
+        </p:blipFill>
+        <p:spPr>
+          <a:xfrm>
+            <a:off x="5654937" y="393686"/>
+            <a:ext cx="406111" cy="450255"/>
+          </a:xfrm>
+          <a:prstGeom prst="rect">
+            <a:avLst/>
+          </a:prstGeom>
+          <a:ln w="9525">
+            <a:solidFill>
+              <a:schemeClr val="tx1"/>
+            </a:solidFill>
+          </a:ln>
+        </p:spPr>
+      </p:pic>
+      <p:sp>
+        <p:nvSpPr>
+          <p:cNvPr id="13" name="TextBox 12">
+            <a:extLst>
+              <a:ext uri="{FF2B5EF4-FFF2-40B4-BE49-F238E27FC236}">
+                <a16:creationId xmlns:a16="http://schemas.microsoft.com/office/drawing/2014/main" id="{6A0F0BE2-F33E-5546-66FC-A347BF58430D}"/>
+              </a:ext>
+            </a:extLst>
+          </p:cNvPr>
+          <p:cNvSpPr txBox="1"/>
+          <p:nvPr/>
+        </p:nvSpPr>
+        <p:spPr>
+          <a:xfrm>
+            <a:off x="615819" y="807604"/>
+            <a:ext cx="1168464" cy="363615"/>
+          </a:xfrm>
+          <a:prstGeom prst="rect">
+            <a:avLst/>
+          </a:prstGeom>
+          <a:solidFill>
+            <a:schemeClr val="bg1"/>
+          </a:solidFill>
+          <a:ln w="19050">
+            <a:solidFill>
+              <a:schemeClr val="tx1"/>
+            </a:solidFill>
+          </a:ln>
+        </p:spPr>
+        <p:txBody>
+          <a:bodyPr wrap="square" lIns="36000" tIns="36000" rIns="36000" bIns="36000" rtlCol="0">
+            <a:noAutofit/>
+          </a:bodyPr>
+          <a:lstStyle/>
+          <a:p>
+            <a:r>
+              <a:rPr lang="en-US" sz="1100" b="1" dirty="0"/>
+              <a:t> Train HMI </a:t>
+            </a:r>
+            <a:endParaRPr lang="en-SG" sz="1100" b="1" dirty="0"/>
+          </a:p>
+        </p:txBody>
+      </p:sp>
+      <p:cxnSp>
+        <p:nvCxnSpPr>
+          <p:cNvPr id="14" name="Straight Arrow Connector 13">
+            <a:extLst>
+              <a:ext uri="{FF2B5EF4-FFF2-40B4-BE49-F238E27FC236}">
+                <a16:creationId xmlns:a16="http://schemas.microsoft.com/office/drawing/2014/main" id="{F3D952C5-697D-847F-5980-9B33F283BAF9}"/>
+              </a:ext>
+            </a:extLst>
+          </p:cNvPr>
+          <p:cNvCxnSpPr>
+            <a:cxnSpLocks/>
+          </p:cNvCxnSpPr>
+          <p:nvPr/>
+        </p:nvCxnSpPr>
+        <p:spPr>
+          <a:xfrm>
+            <a:off x="1162529" y="1171219"/>
+            <a:ext cx="0" cy="5501996"/>
+          </a:xfrm>
+          <a:prstGeom prst="straightConnector1">
+            <a:avLst/>
+          </a:prstGeom>
+          <a:ln w="19050">
+            <a:solidFill>
+              <a:schemeClr val="tx1"/>
+            </a:solidFill>
+            <a:tailEnd type="triangle"/>
+          </a:ln>
+        </p:spPr>
+        <p:style>
+          <a:lnRef idx="1">
+            <a:schemeClr val="accent1"/>
+          </a:lnRef>
+          <a:fillRef idx="0">
+            <a:schemeClr val="accent1"/>
+          </a:fillRef>
+          <a:effectRef idx="0">
+            <a:schemeClr val="accent1"/>
+          </a:effectRef>
+          <a:fontRef idx="minor">
+            <a:schemeClr val="tx1"/>
+          </a:fontRef>
+        </p:style>
+      </p:cxnSp>
+      <p:sp>
+        <p:nvSpPr>
+          <p:cNvPr id="15" name="TextBox 14">
+            <a:extLst>
+              <a:ext uri="{FF2B5EF4-FFF2-40B4-BE49-F238E27FC236}">
+                <a16:creationId xmlns:a16="http://schemas.microsoft.com/office/drawing/2014/main" id="{3FEC5B1B-C2C1-2FC0-B249-D771C8E1784A}"/>
+              </a:ext>
+            </a:extLst>
+          </p:cNvPr>
+          <p:cNvSpPr txBox="1"/>
+          <p:nvPr/>
+        </p:nvSpPr>
+        <p:spPr>
+          <a:xfrm>
+            <a:off x="7613121" y="854257"/>
+            <a:ext cx="1492300" cy="363615"/>
+          </a:xfrm>
+          <a:prstGeom prst="rect">
+            <a:avLst/>
+          </a:prstGeom>
+          <a:solidFill>
+            <a:schemeClr val="bg1"/>
+          </a:solidFill>
+          <a:ln w="19050">
+            <a:solidFill>
+              <a:schemeClr val="accent6">
+                <a:lumMod val="75000"/>
+              </a:schemeClr>
+            </a:solidFill>
+          </a:ln>
+        </p:spPr>
+        <p:txBody>
+          <a:bodyPr wrap="square" lIns="36000" tIns="36000" rIns="36000" bIns="36000" rtlCol="0">
+            <a:noAutofit/>
+          </a:bodyPr>
+          <a:lstStyle/>
+          <a:p>
+            <a:r>
+              <a:rPr lang="en-US" sz="1100" b="1" dirty="0">
+                <a:solidFill>
+                  <a:schemeClr val="accent6">
+                    <a:lumMod val="75000"/>
+                  </a:schemeClr>
+                </a:solidFill>
+              </a:rPr>
+              <a:t> Train motion detection sensor PLC</a:t>
+            </a:r>
+            <a:endParaRPr lang="en-SG" sz="1100" b="1" dirty="0">
+              <a:solidFill>
+                <a:schemeClr val="accent6">
+                  <a:lumMod val="75000"/>
+                </a:schemeClr>
+              </a:solidFill>
+            </a:endParaRPr>
+          </a:p>
+        </p:txBody>
+      </p:sp>
+      <p:pic>
+        <p:nvPicPr>
+          <p:cNvPr id="16" name="Picture 15">
+            <a:extLst>
+              <a:ext uri="{FF2B5EF4-FFF2-40B4-BE49-F238E27FC236}">
+                <a16:creationId xmlns:a16="http://schemas.microsoft.com/office/drawing/2014/main" id="{9F85D59C-53AE-98DB-5E8F-84C7F77B5632}"/>
+              </a:ext>
+            </a:extLst>
+          </p:cNvPr>
+          <p:cNvPicPr>
+            <a:picLocks noChangeAspect="1"/>
+          </p:cNvPicPr>
+          <p:nvPr/>
+        </p:nvPicPr>
+        <p:blipFill>
+          <a:blip r:embed="rId4"/>
+          <a:stretch>
+            <a:fillRect/>
+          </a:stretch>
+        </p:blipFill>
+        <p:spPr>
+          <a:xfrm>
+            <a:off x="614546" y="335109"/>
+            <a:ext cx="406111" cy="472495"/>
+          </a:xfrm>
+          <a:prstGeom prst="rect">
+            <a:avLst/>
+          </a:prstGeom>
+          <a:ln w="9525">
+            <a:solidFill>
+              <a:schemeClr val="tx1"/>
+            </a:solidFill>
+          </a:ln>
+        </p:spPr>
+      </p:pic>
+      <p:sp>
+        <p:nvSpPr>
+          <p:cNvPr id="17" name="TextBox 16">
+            <a:extLst>
+              <a:ext uri="{FF2B5EF4-FFF2-40B4-BE49-F238E27FC236}">
+                <a16:creationId xmlns:a16="http://schemas.microsoft.com/office/drawing/2014/main" id="{B5860927-E614-D6D8-EA70-FCCC93412D06}"/>
+              </a:ext>
+            </a:extLst>
+          </p:cNvPr>
+          <p:cNvSpPr txBox="1"/>
+          <p:nvPr/>
+        </p:nvSpPr>
+        <p:spPr>
+          <a:xfrm>
+            <a:off x="1003869" y="335109"/>
+            <a:ext cx="1286220" cy="461665"/>
+          </a:xfrm>
+          <a:prstGeom prst="rect">
+            <a:avLst/>
+          </a:prstGeom>
+          <a:noFill/>
+        </p:spPr>
+        <p:txBody>
+          <a:bodyPr wrap="square">
+            <a:spAutoFit/>
+          </a:bodyPr>
+          <a:lstStyle/>
+          <a:p>
+            <a:r>
+              <a:rPr lang="en-US" sz="1200" b="1" dirty="0"/>
+              <a:t>Railway station operator </a:t>
+            </a:r>
+            <a:endParaRPr lang="en-SG" sz="1200" b="1" dirty="0"/>
+          </a:p>
+        </p:txBody>
+      </p:sp>
+      <p:cxnSp>
+        <p:nvCxnSpPr>
+          <p:cNvPr id="18" name="Straight Arrow Connector 17">
+            <a:extLst>
+              <a:ext uri="{FF2B5EF4-FFF2-40B4-BE49-F238E27FC236}">
+                <a16:creationId xmlns:a16="http://schemas.microsoft.com/office/drawing/2014/main" id="{46DBE9B7-F19A-1693-44F0-E11B606C6C0F}"/>
+              </a:ext>
+            </a:extLst>
+          </p:cNvPr>
+          <p:cNvCxnSpPr>
+            <a:cxnSpLocks/>
+          </p:cNvCxnSpPr>
+          <p:nvPr/>
+        </p:nvCxnSpPr>
+        <p:spPr>
+          <a:xfrm>
+            <a:off x="8322347" y="1217872"/>
+            <a:ext cx="0" cy="5336355"/>
+          </a:xfrm>
+          <a:prstGeom prst="straightConnector1">
+            <a:avLst/>
+          </a:prstGeom>
+          <a:ln w="19050">
+            <a:solidFill>
+              <a:schemeClr val="accent6">
+                <a:lumMod val="75000"/>
+              </a:schemeClr>
+            </a:solidFill>
+            <a:tailEnd type="triangle"/>
+          </a:ln>
+        </p:spPr>
+        <p:style>
+          <a:lnRef idx="1">
+            <a:schemeClr val="accent1"/>
+          </a:lnRef>
+          <a:fillRef idx="0">
+            <a:schemeClr val="accent1"/>
+          </a:fillRef>
+          <a:effectRef idx="0">
+            <a:schemeClr val="accent1"/>
+          </a:effectRef>
+          <a:fontRef idx="minor">
+            <a:schemeClr val="tx1"/>
+          </a:fontRef>
+        </p:style>
+      </p:cxnSp>
+      <p:sp>
+        <p:nvSpPr>
+          <p:cNvPr id="19" name="TextBox 18">
+            <a:extLst>
+              <a:ext uri="{FF2B5EF4-FFF2-40B4-BE49-F238E27FC236}">
+                <a16:creationId xmlns:a16="http://schemas.microsoft.com/office/drawing/2014/main" id="{672A1355-CBB1-A143-EB8E-0DC3305C5835}"/>
+              </a:ext>
+            </a:extLst>
+          </p:cNvPr>
+          <p:cNvSpPr txBox="1"/>
+          <p:nvPr/>
+        </p:nvSpPr>
+        <p:spPr>
+          <a:xfrm>
+            <a:off x="9833898" y="854257"/>
+            <a:ext cx="1492300" cy="363615"/>
+          </a:xfrm>
+          <a:prstGeom prst="rect">
+            <a:avLst/>
+          </a:prstGeom>
+          <a:solidFill>
+            <a:schemeClr val="bg1"/>
+          </a:solidFill>
+          <a:ln w="19050">
+            <a:solidFill>
+              <a:schemeClr val="accent6">
+                <a:lumMod val="75000"/>
+              </a:schemeClr>
+            </a:solidFill>
+          </a:ln>
+        </p:spPr>
+        <p:txBody>
+          <a:bodyPr wrap="square" lIns="36000" tIns="36000" rIns="36000" bIns="36000" rtlCol="0">
+            <a:noAutofit/>
+          </a:bodyPr>
+          <a:lstStyle/>
+          <a:p>
+            <a:r>
+              <a:rPr lang="en-US" sz="1100" b="1" dirty="0">
+                <a:solidFill>
+                  <a:schemeClr val="accent6">
+                    <a:lumMod val="75000"/>
+                  </a:schemeClr>
+                </a:solidFill>
+              </a:rPr>
+              <a:t> Train Object detection camera </a:t>
+            </a:r>
+            <a:endParaRPr lang="en-SG" sz="1100" b="1" dirty="0">
+              <a:solidFill>
+                <a:schemeClr val="accent6">
+                  <a:lumMod val="75000"/>
+                </a:schemeClr>
+              </a:solidFill>
+            </a:endParaRPr>
+          </a:p>
+        </p:txBody>
+      </p:sp>
+      <p:cxnSp>
+        <p:nvCxnSpPr>
+          <p:cNvPr id="20" name="Straight Arrow Connector 19">
+            <a:extLst>
+              <a:ext uri="{FF2B5EF4-FFF2-40B4-BE49-F238E27FC236}">
+                <a16:creationId xmlns:a16="http://schemas.microsoft.com/office/drawing/2014/main" id="{674979AB-AEDB-A749-6AFE-4B62AD1F4BBA}"/>
+              </a:ext>
+            </a:extLst>
+          </p:cNvPr>
+          <p:cNvCxnSpPr>
+            <a:cxnSpLocks/>
+          </p:cNvCxnSpPr>
+          <p:nvPr/>
+        </p:nvCxnSpPr>
+        <p:spPr>
+          <a:xfrm>
+            <a:off x="10543124" y="1217872"/>
+            <a:ext cx="0" cy="5336355"/>
+          </a:xfrm>
+          <a:prstGeom prst="straightConnector1">
+            <a:avLst/>
+          </a:prstGeom>
+          <a:ln w="19050">
+            <a:solidFill>
+              <a:schemeClr val="accent6">
+                <a:lumMod val="75000"/>
+              </a:schemeClr>
+            </a:solidFill>
+            <a:tailEnd type="triangle"/>
+          </a:ln>
+        </p:spPr>
+        <p:style>
+          <a:lnRef idx="1">
+            <a:schemeClr val="accent1"/>
+          </a:lnRef>
+          <a:fillRef idx="0">
+            <a:schemeClr val="accent1"/>
+          </a:fillRef>
+          <a:effectRef idx="0">
+            <a:schemeClr val="accent1"/>
+          </a:effectRef>
+          <a:fontRef idx="minor">
+            <a:schemeClr val="tx1"/>
+          </a:fontRef>
+        </p:style>
+      </p:cxnSp>
+      <p:cxnSp>
+        <p:nvCxnSpPr>
+          <p:cNvPr id="21" name="Straight Arrow Connector 20">
+            <a:extLst>
+              <a:ext uri="{FF2B5EF4-FFF2-40B4-BE49-F238E27FC236}">
+                <a16:creationId xmlns:a16="http://schemas.microsoft.com/office/drawing/2014/main" id="{5EDDB114-3EFE-A9FC-ED89-19184048759A}"/>
+              </a:ext>
+            </a:extLst>
+          </p:cNvPr>
+          <p:cNvCxnSpPr>
+            <a:cxnSpLocks/>
+          </p:cNvCxnSpPr>
+          <p:nvPr/>
+        </p:nvCxnSpPr>
+        <p:spPr>
+          <a:xfrm flipH="1">
+            <a:off x="1162529" y="1643714"/>
+            <a:ext cx="7159818" cy="0"/>
+          </a:xfrm>
+          <a:prstGeom prst="straightConnector1">
+            <a:avLst/>
+          </a:prstGeom>
+          <a:ln>
+            <a:solidFill>
+              <a:schemeClr val="accent6">
+                <a:lumMod val="75000"/>
+              </a:schemeClr>
+            </a:solidFill>
+            <a:prstDash val="dash"/>
+            <a:tailEnd type="triangle"/>
+          </a:ln>
+        </p:spPr>
+        <p:style>
+          <a:lnRef idx="1">
+            <a:schemeClr val="accent1"/>
+          </a:lnRef>
+          <a:fillRef idx="0">
+            <a:schemeClr val="accent1"/>
+          </a:fillRef>
+          <a:effectRef idx="0">
+            <a:schemeClr val="accent1"/>
+          </a:effectRef>
+          <a:fontRef idx="minor">
+            <a:schemeClr val="tx1"/>
+          </a:fontRef>
+        </p:style>
+      </p:cxnSp>
+      <p:sp>
+        <p:nvSpPr>
+          <p:cNvPr id="22" name="TextBox 21">
+            <a:extLst>
+              <a:ext uri="{FF2B5EF4-FFF2-40B4-BE49-F238E27FC236}">
+                <a16:creationId xmlns:a16="http://schemas.microsoft.com/office/drawing/2014/main" id="{EE0AD98C-261E-2116-0B97-0870F3316FC4}"/>
+              </a:ext>
+            </a:extLst>
+          </p:cNvPr>
+          <p:cNvSpPr txBox="1"/>
+          <p:nvPr/>
+        </p:nvSpPr>
+        <p:spPr>
+          <a:xfrm>
+            <a:off x="6289188" y="1397493"/>
+            <a:ext cx="2100560" cy="246221"/>
+          </a:xfrm>
+          <a:prstGeom prst="rect">
+            <a:avLst/>
+          </a:prstGeom>
+          <a:noFill/>
+        </p:spPr>
+        <p:txBody>
+          <a:bodyPr wrap="square" rtlCol="0">
+            <a:spAutoFit/>
+          </a:bodyPr>
+          <a:lstStyle/>
+          <a:p>
+            <a:r>
+              <a:rPr lang="en-US" sz="1000" b="1" dirty="0">
+                <a:solidFill>
+                  <a:schemeClr val="accent6">
+                    <a:lumMod val="75000"/>
+                  </a:schemeClr>
+                </a:solidFill>
+              </a:rPr>
+              <a:t>1.1 Train passing detection signal</a:t>
+            </a:r>
+            <a:endParaRPr lang="en-SG" sz="1000" b="1" dirty="0">
+              <a:solidFill>
+                <a:schemeClr val="accent6">
+                  <a:lumMod val="75000"/>
+                </a:schemeClr>
+              </a:solidFill>
+            </a:endParaRPr>
+          </a:p>
+        </p:txBody>
+      </p:sp>
+      <p:cxnSp>
+        <p:nvCxnSpPr>
+          <p:cNvPr id="27" name="Straight Arrow Connector 26">
+            <a:extLst>
+              <a:ext uri="{FF2B5EF4-FFF2-40B4-BE49-F238E27FC236}">
+                <a16:creationId xmlns:a16="http://schemas.microsoft.com/office/drawing/2014/main" id="{DE74EA86-2F07-486C-2A04-07EC18BAECAD}"/>
+              </a:ext>
+            </a:extLst>
+          </p:cNvPr>
+          <p:cNvCxnSpPr>
+            <a:cxnSpLocks/>
+          </p:cNvCxnSpPr>
+          <p:nvPr/>
+        </p:nvCxnSpPr>
+        <p:spPr>
+          <a:xfrm flipH="1">
+            <a:off x="3637947" y="1862789"/>
+            <a:ext cx="6942101" cy="0"/>
+          </a:xfrm>
+          <a:prstGeom prst="straightConnector1">
+            <a:avLst/>
+          </a:prstGeom>
+          <a:ln>
+            <a:solidFill>
+              <a:schemeClr val="accent6">
+                <a:lumMod val="75000"/>
+              </a:schemeClr>
+            </a:solidFill>
+            <a:prstDash val="dash"/>
+            <a:tailEnd type="triangle"/>
+          </a:ln>
+        </p:spPr>
+        <p:style>
+          <a:lnRef idx="1">
+            <a:schemeClr val="accent1"/>
+          </a:lnRef>
+          <a:fillRef idx="0">
+            <a:schemeClr val="accent1"/>
+          </a:fillRef>
+          <a:effectRef idx="0">
+            <a:schemeClr val="accent1"/>
+          </a:effectRef>
+          <a:fontRef idx="minor">
+            <a:schemeClr val="tx1"/>
+          </a:fontRef>
+        </p:style>
+      </p:cxnSp>
+      <p:sp>
+        <p:nvSpPr>
+          <p:cNvPr id="29" name="TextBox 28">
+            <a:extLst>
+              <a:ext uri="{FF2B5EF4-FFF2-40B4-BE49-F238E27FC236}">
+                <a16:creationId xmlns:a16="http://schemas.microsoft.com/office/drawing/2014/main" id="{0CB44F71-E317-078E-B8BB-DFD3909038A8}"/>
+              </a:ext>
+            </a:extLst>
+          </p:cNvPr>
+          <p:cNvSpPr txBox="1"/>
+          <p:nvPr/>
+        </p:nvSpPr>
+        <p:spPr>
+          <a:xfrm>
+            <a:off x="8995136" y="1632835"/>
+            <a:ext cx="1584912" cy="246221"/>
+          </a:xfrm>
+          <a:prstGeom prst="rect">
+            <a:avLst/>
+          </a:prstGeom>
+          <a:noFill/>
+        </p:spPr>
+        <p:txBody>
+          <a:bodyPr wrap="square" rtlCol="0">
+            <a:spAutoFit/>
+          </a:bodyPr>
+          <a:lstStyle/>
+          <a:p>
+            <a:r>
+              <a:rPr lang="en-US" sz="1000" b="1" dirty="0">
+                <a:solidFill>
+                  <a:schemeClr val="accent6">
+                    <a:lumMod val="75000"/>
+                  </a:schemeClr>
+                </a:solidFill>
+              </a:rPr>
+              <a:t>1.2 Train passing video </a:t>
+            </a:r>
+            <a:endParaRPr lang="en-SG" sz="1000" b="1" dirty="0">
+              <a:solidFill>
+                <a:schemeClr val="accent6">
+                  <a:lumMod val="75000"/>
+                </a:schemeClr>
+              </a:solidFill>
+            </a:endParaRPr>
+          </a:p>
+        </p:txBody>
+      </p:sp>
+      <p:cxnSp>
+        <p:nvCxnSpPr>
+          <p:cNvPr id="30" name="Straight Arrow Connector 29">
+            <a:extLst>
+              <a:ext uri="{FF2B5EF4-FFF2-40B4-BE49-F238E27FC236}">
+                <a16:creationId xmlns:a16="http://schemas.microsoft.com/office/drawing/2014/main" id="{CC3CC932-BB6B-789E-CBF5-AEC0F5E8934B}"/>
+              </a:ext>
+            </a:extLst>
+          </p:cNvPr>
+          <p:cNvCxnSpPr>
+            <a:cxnSpLocks/>
+          </p:cNvCxnSpPr>
+          <p:nvPr/>
+        </p:nvCxnSpPr>
+        <p:spPr>
+          <a:xfrm flipH="1" flipV="1">
+            <a:off x="1162529" y="1915890"/>
+            <a:ext cx="2475418" cy="36735"/>
+          </a:xfrm>
+          <a:prstGeom prst="straightConnector1">
+            <a:avLst/>
+          </a:prstGeom>
+          <a:ln>
+            <a:solidFill>
+              <a:schemeClr val="accent6">
+                <a:lumMod val="75000"/>
+              </a:schemeClr>
+            </a:solidFill>
+            <a:prstDash val="dash"/>
+            <a:tailEnd type="triangle"/>
+          </a:ln>
+        </p:spPr>
+        <p:style>
+          <a:lnRef idx="1">
+            <a:schemeClr val="accent1"/>
+          </a:lnRef>
+          <a:fillRef idx="0">
+            <a:schemeClr val="accent1"/>
+          </a:fillRef>
+          <a:effectRef idx="0">
+            <a:schemeClr val="accent1"/>
+          </a:effectRef>
+          <a:fontRef idx="minor">
+            <a:schemeClr val="tx1"/>
+          </a:fontRef>
+        </p:style>
+      </p:cxnSp>
+      <p:sp>
+        <p:nvSpPr>
+          <p:cNvPr id="33" name="TextBox 32">
+            <a:extLst>
+              <a:ext uri="{FF2B5EF4-FFF2-40B4-BE49-F238E27FC236}">
+                <a16:creationId xmlns:a16="http://schemas.microsoft.com/office/drawing/2014/main" id="{1E8700BD-14DE-B4A4-8DF6-CC9526D231AA}"/>
+              </a:ext>
+            </a:extLst>
+          </p:cNvPr>
+          <p:cNvSpPr txBox="1"/>
+          <p:nvPr/>
+        </p:nvSpPr>
+        <p:spPr>
+          <a:xfrm>
+            <a:off x="2071497" y="1706404"/>
+            <a:ext cx="1584912" cy="246221"/>
+          </a:xfrm>
+          <a:prstGeom prst="rect">
+            <a:avLst/>
+          </a:prstGeom>
+          <a:noFill/>
+        </p:spPr>
+        <p:txBody>
+          <a:bodyPr wrap="square" rtlCol="0">
+            <a:spAutoFit/>
+          </a:bodyPr>
+          <a:lstStyle/>
+          <a:p>
+            <a:r>
+              <a:rPr lang="en-US" sz="1000" b="1" dirty="0">
+                <a:solidFill>
+                  <a:schemeClr val="accent6">
+                    <a:lumMod val="75000"/>
+                  </a:schemeClr>
+                </a:solidFill>
+              </a:rPr>
+              <a:t>1.3 Train detected result </a:t>
+            </a:r>
+            <a:endParaRPr lang="en-SG" sz="1000" b="1" dirty="0">
+              <a:solidFill>
+                <a:schemeClr val="accent6">
+                  <a:lumMod val="75000"/>
+                </a:schemeClr>
+              </a:solidFill>
+            </a:endParaRPr>
+          </a:p>
+        </p:txBody>
+      </p:sp>
+      <p:sp>
+        <p:nvSpPr>
+          <p:cNvPr id="34" name="TextBox 33">
+            <a:extLst>
+              <a:ext uri="{FF2B5EF4-FFF2-40B4-BE49-F238E27FC236}">
+                <a16:creationId xmlns:a16="http://schemas.microsoft.com/office/drawing/2014/main" id="{E4076BFD-A16C-5E5D-C97E-C21BAE77906F}"/>
+              </a:ext>
+            </a:extLst>
+          </p:cNvPr>
+          <p:cNvSpPr txBox="1"/>
+          <p:nvPr/>
+        </p:nvSpPr>
+        <p:spPr>
+          <a:xfrm>
+            <a:off x="449516" y="2049059"/>
+            <a:ext cx="1494202" cy="246222"/>
+          </a:xfrm>
+          <a:prstGeom prst="rect">
+            <a:avLst/>
+          </a:prstGeom>
+          <a:solidFill>
+            <a:schemeClr val="bg1"/>
+          </a:solidFill>
+          <a:ln w="9525">
+            <a:solidFill>
+              <a:schemeClr val="tx1"/>
+            </a:solidFill>
+          </a:ln>
+        </p:spPr>
+        <p:txBody>
+          <a:bodyPr wrap="square" lIns="36000" tIns="36000" rIns="36000" bIns="36000" rtlCol="0">
+            <a:noAutofit/>
+          </a:bodyPr>
+          <a:lstStyle/>
+          <a:p>
+            <a:r>
+              <a:rPr lang="en-US" sz="1100" dirty="0"/>
+              <a:t>Prepare train docking </a:t>
+            </a:r>
+            <a:endParaRPr lang="en-SG" sz="1100" dirty="0"/>
+          </a:p>
+        </p:txBody>
+      </p:sp>
+      <p:cxnSp>
+        <p:nvCxnSpPr>
+          <p:cNvPr id="35" name="Straight Arrow Connector 34">
+            <a:extLst>
+              <a:ext uri="{FF2B5EF4-FFF2-40B4-BE49-F238E27FC236}">
+                <a16:creationId xmlns:a16="http://schemas.microsoft.com/office/drawing/2014/main" id="{718546D3-B61E-4CD5-EDEC-B9C85124D51D}"/>
+              </a:ext>
+            </a:extLst>
+          </p:cNvPr>
+          <p:cNvCxnSpPr>
+            <a:cxnSpLocks/>
+          </p:cNvCxnSpPr>
+          <p:nvPr/>
+        </p:nvCxnSpPr>
+        <p:spPr>
+          <a:xfrm flipV="1">
+            <a:off x="6289188" y="2288631"/>
+            <a:ext cx="4253936" cy="6650"/>
+          </a:xfrm>
+          <a:prstGeom prst="straightConnector1">
+            <a:avLst/>
+          </a:prstGeom>
+          <a:ln>
+            <a:solidFill>
+              <a:srgbClr val="C00000"/>
+            </a:solidFill>
+            <a:prstDash val="dash"/>
+            <a:tailEnd type="triangle"/>
+          </a:ln>
+        </p:spPr>
+        <p:style>
+          <a:lnRef idx="1">
+            <a:schemeClr val="accent1"/>
+          </a:lnRef>
+          <a:fillRef idx="0">
+            <a:schemeClr val="accent1"/>
+          </a:fillRef>
+          <a:effectRef idx="0">
+            <a:schemeClr val="accent1"/>
+          </a:effectRef>
+          <a:fontRef idx="minor">
+            <a:schemeClr val="tx1"/>
+          </a:fontRef>
+        </p:style>
+      </p:cxnSp>
+      <p:sp>
+        <p:nvSpPr>
+          <p:cNvPr id="39" name="TextBox 38">
+            <a:extLst>
+              <a:ext uri="{FF2B5EF4-FFF2-40B4-BE49-F238E27FC236}">
+                <a16:creationId xmlns:a16="http://schemas.microsoft.com/office/drawing/2014/main" id="{58BF4F6E-B80B-408C-D4AF-5C61B8A705D1}"/>
+              </a:ext>
+            </a:extLst>
+          </p:cNvPr>
+          <p:cNvSpPr txBox="1"/>
+          <p:nvPr/>
+        </p:nvSpPr>
+        <p:spPr>
+          <a:xfrm>
+            <a:off x="6386273" y="3061944"/>
+            <a:ext cx="1584912" cy="553998"/>
+          </a:xfrm>
+          <a:prstGeom prst="rect">
+            <a:avLst/>
+          </a:prstGeom>
+          <a:noFill/>
+        </p:spPr>
+        <p:txBody>
+          <a:bodyPr wrap="square" rtlCol="0">
+            <a:spAutoFit/>
+          </a:bodyPr>
+          <a:lstStyle/>
+          <a:p>
+            <a:r>
+              <a:rPr lang="en-US" sz="1000" b="1" dirty="0">
+                <a:solidFill>
+                  <a:srgbClr val="FF0000"/>
+                </a:solidFill>
+              </a:rPr>
+              <a:t>3.1 False data injection attack to overwrite PLC state </a:t>
+            </a:r>
+            <a:endParaRPr lang="en-SG" sz="1000" b="1" dirty="0">
+              <a:solidFill>
+                <a:srgbClr val="FF0000"/>
+              </a:solidFill>
+            </a:endParaRPr>
+          </a:p>
+        </p:txBody>
+      </p:sp>
+      <p:cxnSp>
+        <p:nvCxnSpPr>
+          <p:cNvPr id="40" name="Straight Arrow Connector 39">
+            <a:extLst>
+              <a:ext uri="{FF2B5EF4-FFF2-40B4-BE49-F238E27FC236}">
+                <a16:creationId xmlns:a16="http://schemas.microsoft.com/office/drawing/2014/main" id="{AF030889-E117-3908-C155-290A493B9804}"/>
+              </a:ext>
+            </a:extLst>
+          </p:cNvPr>
+          <p:cNvCxnSpPr>
+            <a:cxnSpLocks/>
+          </p:cNvCxnSpPr>
+          <p:nvPr/>
+        </p:nvCxnSpPr>
+        <p:spPr>
+          <a:xfrm flipH="1" flipV="1">
+            <a:off x="1153375" y="4192642"/>
+            <a:ext cx="7144117" cy="40024"/>
+          </a:xfrm>
+          <a:prstGeom prst="straightConnector1">
+            <a:avLst/>
+          </a:prstGeom>
+          <a:ln>
+            <a:solidFill>
+              <a:srgbClr val="C00000"/>
+            </a:solidFill>
+            <a:prstDash val="dash"/>
+            <a:tailEnd type="triangle"/>
+          </a:ln>
+        </p:spPr>
+        <p:style>
+          <a:lnRef idx="1">
+            <a:schemeClr val="accent1"/>
+          </a:lnRef>
+          <a:fillRef idx="0">
+            <a:schemeClr val="accent1"/>
+          </a:fillRef>
+          <a:effectRef idx="0">
+            <a:schemeClr val="accent1"/>
+          </a:effectRef>
+          <a:fontRef idx="minor">
+            <a:schemeClr val="tx1"/>
+          </a:fontRef>
+        </p:style>
+      </p:cxnSp>
+      <p:sp>
+        <p:nvSpPr>
+          <p:cNvPr id="45" name="TextBox 44">
+            <a:extLst>
+              <a:ext uri="{FF2B5EF4-FFF2-40B4-BE49-F238E27FC236}">
+                <a16:creationId xmlns:a16="http://schemas.microsoft.com/office/drawing/2014/main" id="{B492FADE-9F75-77E9-AF2E-11C38875A981}"/>
+              </a:ext>
+            </a:extLst>
+          </p:cNvPr>
+          <p:cNvSpPr txBox="1"/>
+          <p:nvPr/>
+        </p:nvSpPr>
+        <p:spPr>
+          <a:xfrm>
+            <a:off x="7904849" y="3612205"/>
+            <a:ext cx="2960235" cy="246222"/>
+          </a:xfrm>
+          <a:prstGeom prst="rect">
+            <a:avLst/>
+          </a:prstGeom>
+          <a:solidFill>
+            <a:schemeClr val="bg1"/>
+          </a:solidFill>
+          <a:ln w="9525">
+            <a:solidFill>
+              <a:schemeClr val="tx1"/>
+            </a:solidFill>
+          </a:ln>
+        </p:spPr>
+        <p:txBody>
+          <a:bodyPr wrap="square" lIns="36000" tIns="36000" rIns="36000" bIns="36000" rtlCol="0">
+            <a:noAutofit/>
+          </a:bodyPr>
+          <a:lstStyle/>
+          <a:p>
+            <a:r>
+              <a:rPr lang="en-US" sz="1100" dirty="0"/>
+              <a:t> A train is passing the detection area</a:t>
+            </a:r>
+            <a:endParaRPr lang="en-SG" sz="1100" dirty="0"/>
+          </a:p>
+        </p:txBody>
+      </p:sp>
+      <p:sp>
+        <p:nvSpPr>
+          <p:cNvPr id="46" name="TextBox 45">
+            <a:extLst>
+              <a:ext uri="{FF2B5EF4-FFF2-40B4-BE49-F238E27FC236}">
+                <a16:creationId xmlns:a16="http://schemas.microsoft.com/office/drawing/2014/main" id="{BBDB5E90-0835-1BB2-5CD0-A0D002DC9AD5}"/>
+              </a:ext>
+            </a:extLst>
+          </p:cNvPr>
+          <p:cNvSpPr txBox="1"/>
+          <p:nvPr/>
+        </p:nvSpPr>
+        <p:spPr>
+          <a:xfrm>
+            <a:off x="6316540" y="4002493"/>
+            <a:ext cx="1952989" cy="246221"/>
+          </a:xfrm>
+          <a:prstGeom prst="rect">
+            <a:avLst/>
+          </a:prstGeom>
+          <a:noFill/>
+        </p:spPr>
+        <p:txBody>
+          <a:bodyPr wrap="square" rtlCol="0">
+            <a:spAutoFit/>
+          </a:bodyPr>
+          <a:lstStyle/>
+          <a:p>
+            <a:r>
+              <a:rPr lang="en-US" sz="1000" b="1" dirty="0">
+                <a:solidFill>
+                  <a:srgbClr val="FF0000"/>
+                </a:solidFill>
+              </a:rPr>
+              <a:t>3.2 No train is detected signal </a:t>
+            </a:r>
+            <a:endParaRPr lang="en-SG" sz="1000" b="1" dirty="0">
+              <a:solidFill>
+                <a:srgbClr val="FF0000"/>
+              </a:solidFill>
+            </a:endParaRPr>
+          </a:p>
+        </p:txBody>
+      </p:sp>
+      <p:sp>
+        <p:nvSpPr>
+          <p:cNvPr id="49" name="TextBox 48">
+            <a:extLst>
+              <a:ext uri="{FF2B5EF4-FFF2-40B4-BE49-F238E27FC236}">
+                <a16:creationId xmlns:a16="http://schemas.microsoft.com/office/drawing/2014/main" id="{6D1F3A81-1C1A-5A6B-4613-04C46764F530}"/>
+              </a:ext>
+            </a:extLst>
+          </p:cNvPr>
+          <p:cNvSpPr txBox="1"/>
+          <p:nvPr/>
+        </p:nvSpPr>
+        <p:spPr>
+          <a:xfrm>
+            <a:off x="6247233" y="1938990"/>
+            <a:ext cx="1744613" cy="553998"/>
+          </a:xfrm>
+          <a:prstGeom prst="rect">
+            <a:avLst/>
+          </a:prstGeom>
+          <a:noFill/>
+        </p:spPr>
+        <p:txBody>
+          <a:bodyPr wrap="square" rtlCol="0">
+            <a:spAutoFit/>
+          </a:bodyPr>
+          <a:lstStyle/>
+          <a:p>
+            <a:r>
+              <a:rPr lang="en-US" sz="1000" b="1" dirty="0">
+                <a:solidFill>
+                  <a:srgbClr val="FF0000"/>
+                </a:solidFill>
+              </a:rPr>
+              <a:t>2.1 Camera firmware attack to inject malicious backdoor code</a:t>
+            </a:r>
+            <a:endParaRPr lang="en-SG" sz="1000" b="1" dirty="0">
+              <a:solidFill>
+                <a:srgbClr val="FF0000"/>
+              </a:solidFill>
+            </a:endParaRPr>
+          </a:p>
+        </p:txBody>
+      </p:sp>
+      <p:cxnSp>
+        <p:nvCxnSpPr>
+          <p:cNvPr id="50" name="Straight Arrow Connector 49">
+            <a:extLst>
+              <a:ext uri="{FF2B5EF4-FFF2-40B4-BE49-F238E27FC236}">
+                <a16:creationId xmlns:a16="http://schemas.microsoft.com/office/drawing/2014/main" id="{252CF107-E7C2-8560-44E3-445B66BA71AF}"/>
+              </a:ext>
+            </a:extLst>
+          </p:cNvPr>
+          <p:cNvCxnSpPr>
+            <a:cxnSpLocks/>
+          </p:cNvCxnSpPr>
+          <p:nvPr/>
+        </p:nvCxnSpPr>
+        <p:spPr>
+          <a:xfrm flipH="1" flipV="1">
+            <a:off x="6289188" y="2698401"/>
+            <a:ext cx="4253936" cy="10878"/>
+          </a:xfrm>
+          <a:prstGeom prst="straightConnector1">
+            <a:avLst/>
+          </a:prstGeom>
+          <a:ln>
+            <a:solidFill>
+              <a:srgbClr val="C00000"/>
+            </a:solidFill>
+            <a:prstDash val="dash"/>
+            <a:tailEnd type="triangle"/>
+          </a:ln>
+        </p:spPr>
+        <p:style>
+          <a:lnRef idx="1">
+            <a:schemeClr val="accent1"/>
+          </a:lnRef>
+          <a:fillRef idx="0">
+            <a:schemeClr val="accent1"/>
+          </a:fillRef>
+          <a:effectRef idx="0">
+            <a:schemeClr val="accent1"/>
+          </a:effectRef>
+          <a:fontRef idx="minor">
+            <a:schemeClr val="tx1"/>
+          </a:fontRef>
+        </p:style>
+      </p:cxnSp>
+      <p:sp>
+        <p:nvSpPr>
+          <p:cNvPr id="53" name="TextBox 52">
+            <a:extLst>
+              <a:ext uri="{FF2B5EF4-FFF2-40B4-BE49-F238E27FC236}">
+                <a16:creationId xmlns:a16="http://schemas.microsoft.com/office/drawing/2014/main" id="{9ECEE72C-D464-879B-5E4A-66EE36F73606}"/>
+              </a:ext>
+            </a:extLst>
+          </p:cNvPr>
+          <p:cNvSpPr txBox="1"/>
+          <p:nvPr/>
+        </p:nvSpPr>
+        <p:spPr>
+          <a:xfrm>
+            <a:off x="8953833" y="2511572"/>
+            <a:ext cx="1744613" cy="400110"/>
+          </a:xfrm>
+          <a:prstGeom prst="rect">
+            <a:avLst/>
+          </a:prstGeom>
+          <a:noFill/>
+        </p:spPr>
+        <p:txBody>
+          <a:bodyPr wrap="square" rtlCol="0">
+            <a:spAutoFit/>
+          </a:bodyPr>
+          <a:lstStyle/>
+          <a:p>
+            <a:r>
+              <a:rPr lang="en-US" sz="1000" b="1" dirty="0">
+                <a:solidFill>
+                  <a:srgbClr val="FF0000"/>
+                </a:solidFill>
+              </a:rPr>
+              <a:t>2.2 Hacker fetching the normal no train video </a:t>
+            </a:r>
+            <a:endParaRPr lang="en-SG" sz="1000" b="1" dirty="0">
+              <a:solidFill>
+                <a:srgbClr val="FF0000"/>
+              </a:solidFill>
+            </a:endParaRPr>
+          </a:p>
+        </p:txBody>
+      </p:sp>
+      <p:cxnSp>
+        <p:nvCxnSpPr>
+          <p:cNvPr id="54" name="Straight Arrow Connector 53">
+            <a:extLst>
+              <a:ext uri="{FF2B5EF4-FFF2-40B4-BE49-F238E27FC236}">
+                <a16:creationId xmlns:a16="http://schemas.microsoft.com/office/drawing/2014/main" id="{4F6F8179-530C-3495-0B6B-AF88BF0AD09F}"/>
+              </a:ext>
+            </a:extLst>
+          </p:cNvPr>
+          <p:cNvCxnSpPr>
+            <a:cxnSpLocks/>
+          </p:cNvCxnSpPr>
+          <p:nvPr/>
+        </p:nvCxnSpPr>
+        <p:spPr>
+          <a:xfrm>
+            <a:off x="6247233" y="3257977"/>
+            <a:ext cx="2038191" cy="0"/>
+          </a:xfrm>
+          <a:prstGeom prst="straightConnector1">
+            <a:avLst/>
+          </a:prstGeom>
+          <a:ln>
+            <a:solidFill>
+              <a:srgbClr val="C00000"/>
+            </a:solidFill>
+            <a:prstDash val="dash"/>
+            <a:tailEnd type="triangle"/>
+          </a:ln>
+        </p:spPr>
+        <p:style>
+          <a:lnRef idx="1">
+            <a:schemeClr val="accent1"/>
+          </a:lnRef>
+          <a:fillRef idx="0">
+            <a:schemeClr val="accent1"/>
+          </a:fillRef>
+          <a:effectRef idx="0">
+            <a:schemeClr val="accent1"/>
+          </a:effectRef>
+          <a:fontRef idx="minor">
+            <a:schemeClr val="tx1"/>
+          </a:fontRef>
+        </p:style>
+      </p:cxnSp>
+      <p:cxnSp>
+        <p:nvCxnSpPr>
+          <p:cNvPr id="58" name="Straight Arrow Connector 57">
+            <a:extLst>
+              <a:ext uri="{FF2B5EF4-FFF2-40B4-BE49-F238E27FC236}">
+                <a16:creationId xmlns:a16="http://schemas.microsoft.com/office/drawing/2014/main" id="{950513EB-7F1A-0D93-C4EC-D077139E4395}"/>
+              </a:ext>
+            </a:extLst>
+          </p:cNvPr>
+          <p:cNvCxnSpPr>
+            <a:cxnSpLocks/>
+          </p:cNvCxnSpPr>
+          <p:nvPr/>
+        </p:nvCxnSpPr>
+        <p:spPr>
+          <a:xfrm>
+            <a:off x="6259301" y="4658152"/>
+            <a:ext cx="4065799" cy="0"/>
+          </a:xfrm>
+          <a:prstGeom prst="straightConnector1">
+            <a:avLst/>
+          </a:prstGeom>
+          <a:ln>
+            <a:solidFill>
+              <a:srgbClr val="C00000"/>
+            </a:solidFill>
+            <a:prstDash val="dash"/>
+            <a:tailEnd type="triangle"/>
+          </a:ln>
+        </p:spPr>
+        <p:style>
+          <a:lnRef idx="1">
+            <a:schemeClr val="accent1"/>
+          </a:lnRef>
+          <a:fillRef idx="0">
+            <a:schemeClr val="accent1"/>
+          </a:fillRef>
+          <a:effectRef idx="0">
+            <a:schemeClr val="accent1"/>
+          </a:effectRef>
+          <a:fontRef idx="minor">
+            <a:schemeClr val="tx1"/>
+          </a:fontRef>
+        </p:style>
+      </p:cxnSp>
+      <p:cxnSp>
+        <p:nvCxnSpPr>
+          <p:cNvPr id="60" name="Straight Arrow Connector 59">
+            <a:extLst>
+              <a:ext uri="{FF2B5EF4-FFF2-40B4-BE49-F238E27FC236}">
+                <a16:creationId xmlns:a16="http://schemas.microsoft.com/office/drawing/2014/main" id="{EFA63781-7F55-3513-8C8D-D5B3157E5281}"/>
+              </a:ext>
+            </a:extLst>
+          </p:cNvPr>
+          <p:cNvCxnSpPr>
+            <a:cxnSpLocks/>
+          </p:cNvCxnSpPr>
+          <p:nvPr/>
+        </p:nvCxnSpPr>
+        <p:spPr>
+          <a:xfrm>
+            <a:off x="10325100" y="4658152"/>
+            <a:ext cx="0" cy="800099"/>
+          </a:xfrm>
+          <a:prstGeom prst="straightConnector1">
+            <a:avLst/>
+          </a:prstGeom>
+          <a:ln>
+            <a:solidFill>
+              <a:srgbClr val="C00000"/>
+            </a:solidFill>
+            <a:prstDash val="dash"/>
+            <a:tailEnd type="triangle"/>
+          </a:ln>
+        </p:spPr>
+        <p:style>
+          <a:lnRef idx="1">
+            <a:schemeClr val="accent1"/>
+          </a:lnRef>
+          <a:fillRef idx="0">
+            <a:schemeClr val="accent1"/>
+          </a:fillRef>
+          <a:effectRef idx="0">
+            <a:schemeClr val="accent1"/>
+          </a:effectRef>
+          <a:fontRef idx="minor">
+            <a:schemeClr val="tx1"/>
+          </a:fontRef>
+        </p:style>
+      </p:cxnSp>
+      <p:sp>
+        <p:nvSpPr>
+          <p:cNvPr id="63" name="TextBox 62">
+            <a:extLst>
+              <a:ext uri="{FF2B5EF4-FFF2-40B4-BE49-F238E27FC236}">
+                <a16:creationId xmlns:a16="http://schemas.microsoft.com/office/drawing/2014/main" id="{B935353D-5618-BA0B-97FF-5A86DCA702A9}"/>
+              </a:ext>
+            </a:extLst>
+          </p:cNvPr>
+          <p:cNvSpPr txBox="1"/>
+          <p:nvPr/>
+        </p:nvSpPr>
+        <p:spPr>
+          <a:xfrm>
+            <a:off x="10408322" y="4689614"/>
+            <a:ext cx="843496" cy="664181"/>
+          </a:xfrm>
+          <a:prstGeom prst="rect">
+            <a:avLst/>
+          </a:prstGeom>
+          <a:solidFill>
+            <a:schemeClr val="bg1"/>
+          </a:solidFill>
+          <a:ln w="9525">
+            <a:solidFill>
+              <a:schemeClr val="tx1"/>
+            </a:solidFill>
+          </a:ln>
+        </p:spPr>
+        <p:txBody>
+          <a:bodyPr wrap="square" lIns="36000" tIns="36000" rIns="36000" bIns="36000" rtlCol="0">
+            <a:noAutofit/>
+          </a:bodyPr>
+          <a:lstStyle/>
+          <a:p>
+            <a:r>
+              <a:rPr lang="en-US" sz="1100" dirty="0"/>
+              <a:t> Active the camera backdoor</a:t>
+            </a:r>
+            <a:endParaRPr lang="en-SG" sz="1100" dirty="0"/>
+          </a:p>
+        </p:txBody>
+      </p:sp>
+      <p:cxnSp>
+        <p:nvCxnSpPr>
+          <p:cNvPr id="64" name="Straight Arrow Connector 63">
+            <a:extLst>
+              <a:ext uri="{FF2B5EF4-FFF2-40B4-BE49-F238E27FC236}">
+                <a16:creationId xmlns:a16="http://schemas.microsoft.com/office/drawing/2014/main" id="{B6E5BBF1-FFB9-3A7B-6F05-E136B4F35237}"/>
+              </a:ext>
+            </a:extLst>
+          </p:cNvPr>
+          <p:cNvCxnSpPr>
+            <a:cxnSpLocks/>
+          </p:cNvCxnSpPr>
+          <p:nvPr/>
+        </p:nvCxnSpPr>
+        <p:spPr>
+          <a:xfrm flipH="1">
+            <a:off x="3656409" y="5458251"/>
+            <a:ext cx="6668691" cy="10551"/>
+          </a:xfrm>
+          <a:prstGeom prst="straightConnector1">
+            <a:avLst/>
+          </a:prstGeom>
+          <a:ln>
+            <a:solidFill>
+              <a:srgbClr val="C00000"/>
+            </a:solidFill>
+            <a:prstDash val="dash"/>
+            <a:tailEnd type="triangle"/>
+          </a:ln>
+        </p:spPr>
+        <p:style>
+          <a:lnRef idx="1">
+            <a:schemeClr val="accent1"/>
+          </a:lnRef>
+          <a:fillRef idx="0">
+            <a:schemeClr val="accent1"/>
+          </a:fillRef>
+          <a:effectRef idx="0">
+            <a:schemeClr val="accent1"/>
+          </a:effectRef>
+          <a:fontRef idx="minor">
+            <a:schemeClr val="tx1"/>
+          </a:fontRef>
+        </p:style>
+      </p:cxnSp>
+      <p:sp>
+        <p:nvSpPr>
+          <p:cNvPr id="67" name="TextBox 66">
+            <a:extLst>
+              <a:ext uri="{FF2B5EF4-FFF2-40B4-BE49-F238E27FC236}">
+                <a16:creationId xmlns:a16="http://schemas.microsoft.com/office/drawing/2014/main" id="{3D7AC99A-02E5-EE22-8588-FDE5F23E81AF}"/>
+              </a:ext>
+            </a:extLst>
+          </p:cNvPr>
+          <p:cNvSpPr txBox="1"/>
+          <p:nvPr/>
+        </p:nvSpPr>
+        <p:spPr>
+          <a:xfrm>
+            <a:off x="6192902" y="4483617"/>
+            <a:ext cx="2006259" cy="400110"/>
+          </a:xfrm>
+          <a:prstGeom prst="rect">
+            <a:avLst/>
+          </a:prstGeom>
+          <a:noFill/>
+        </p:spPr>
+        <p:txBody>
+          <a:bodyPr wrap="square" rtlCol="0">
+            <a:spAutoFit/>
+          </a:bodyPr>
+          <a:lstStyle/>
+          <a:p>
+            <a:r>
+              <a:rPr lang="en-US" sz="1000" b="1" dirty="0">
+                <a:solidFill>
+                  <a:srgbClr val="FF0000"/>
+                </a:solidFill>
+              </a:rPr>
+              <a:t>4.1 hacker send the pre-saved no train video to the camera</a:t>
+            </a:r>
+            <a:endParaRPr lang="en-SG" sz="1000" b="1" dirty="0">
+              <a:solidFill>
+                <a:srgbClr val="FF0000"/>
+              </a:solidFill>
+            </a:endParaRPr>
+          </a:p>
+        </p:txBody>
+      </p:sp>
+      <p:sp>
+        <p:nvSpPr>
+          <p:cNvPr id="69" name="TextBox 68">
+            <a:extLst>
+              <a:ext uri="{FF2B5EF4-FFF2-40B4-BE49-F238E27FC236}">
+                <a16:creationId xmlns:a16="http://schemas.microsoft.com/office/drawing/2014/main" id="{E0EFBDA8-3063-D134-190F-5283F2CD7564}"/>
+              </a:ext>
+            </a:extLst>
+          </p:cNvPr>
+          <p:cNvSpPr txBox="1"/>
+          <p:nvPr/>
+        </p:nvSpPr>
+        <p:spPr>
+          <a:xfrm>
+            <a:off x="8343681" y="5465280"/>
+            <a:ext cx="2155360" cy="400110"/>
+          </a:xfrm>
+          <a:prstGeom prst="rect">
+            <a:avLst/>
+          </a:prstGeom>
+          <a:noFill/>
+        </p:spPr>
+        <p:txBody>
+          <a:bodyPr wrap="square" rtlCol="0">
+            <a:spAutoFit/>
+          </a:bodyPr>
+          <a:lstStyle/>
+          <a:p>
+            <a:r>
+              <a:rPr lang="en-US" sz="1000" b="1" dirty="0">
+                <a:solidFill>
+                  <a:srgbClr val="FF0000"/>
+                </a:solidFill>
+              </a:rPr>
+              <a:t>4.2 Camera forward the fake video to the detection computer</a:t>
+            </a:r>
+            <a:endParaRPr lang="en-SG" sz="1000" b="1" dirty="0">
+              <a:solidFill>
+                <a:srgbClr val="FF0000"/>
+              </a:solidFill>
+            </a:endParaRPr>
+          </a:p>
+        </p:txBody>
+      </p:sp>
+      <p:cxnSp>
+        <p:nvCxnSpPr>
+          <p:cNvPr id="70" name="Straight Arrow Connector 69">
+            <a:extLst>
+              <a:ext uri="{FF2B5EF4-FFF2-40B4-BE49-F238E27FC236}">
+                <a16:creationId xmlns:a16="http://schemas.microsoft.com/office/drawing/2014/main" id="{16B78B84-FA01-1B1F-7D3A-93098315186D}"/>
+              </a:ext>
+            </a:extLst>
+          </p:cNvPr>
+          <p:cNvCxnSpPr>
+            <a:cxnSpLocks/>
+          </p:cNvCxnSpPr>
+          <p:nvPr/>
+        </p:nvCxnSpPr>
+        <p:spPr>
+          <a:xfrm flipH="1">
+            <a:off x="1199488" y="5595145"/>
+            <a:ext cx="2401499" cy="0"/>
+          </a:xfrm>
+          <a:prstGeom prst="straightConnector1">
+            <a:avLst/>
+          </a:prstGeom>
+          <a:ln>
+            <a:solidFill>
+              <a:srgbClr val="C00000"/>
+            </a:solidFill>
+            <a:prstDash val="dash"/>
+            <a:tailEnd type="triangle"/>
+          </a:ln>
+        </p:spPr>
+        <p:style>
+          <a:lnRef idx="1">
+            <a:schemeClr val="accent1"/>
+          </a:lnRef>
+          <a:fillRef idx="0">
+            <a:schemeClr val="accent1"/>
+          </a:fillRef>
+          <a:effectRef idx="0">
+            <a:schemeClr val="accent1"/>
+          </a:effectRef>
+          <a:fontRef idx="minor">
+            <a:schemeClr val="tx1"/>
+          </a:fontRef>
+        </p:style>
+      </p:cxnSp>
+      <p:sp>
+        <p:nvSpPr>
+          <p:cNvPr id="73" name="TextBox 72">
+            <a:extLst>
+              <a:ext uri="{FF2B5EF4-FFF2-40B4-BE49-F238E27FC236}">
+                <a16:creationId xmlns:a16="http://schemas.microsoft.com/office/drawing/2014/main" id="{A10D398D-5406-AC81-1A63-D2FED8F9020E}"/>
+              </a:ext>
+            </a:extLst>
+          </p:cNvPr>
+          <p:cNvSpPr txBox="1"/>
+          <p:nvPr/>
+        </p:nvSpPr>
+        <p:spPr>
+          <a:xfrm>
+            <a:off x="1814981" y="5329830"/>
+            <a:ext cx="1873680" cy="246221"/>
+          </a:xfrm>
+          <a:prstGeom prst="rect">
+            <a:avLst/>
+          </a:prstGeom>
+          <a:noFill/>
+        </p:spPr>
+        <p:txBody>
+          <a:bodyPr wrap="square" rtlCol="0">
+            <a:spAutoFit/>
+          </a:bodyPr>
+          <a:lstStyle/>
+          <a:p>
+            <a:r>
+              <a:rPr lang="en-US" sz="1000" b="1" dirty="0">
+                <a:solidFill>
+                  <a:srgbClr val="FF0000"/>
+                </a:solidFill>
+              </a:rPr>
+              <a:t>4.3 No train detected result</a:t>
+            </a:r>
+            <a:endParaRPr lang="en-SG" sz="1000" b="1" dirty="0">
+              <a:solidFill>
+                <a:srgbClr val="FF0000"/>
+              </a:solidFill>
+            </a:endParaRPr>
+          </a:p>
+        </p:txBody>
+      </p:sp>
+      <p:sp>
+        <p:nvSpPr>
+          <p:cNvPr id="74" name="TextBox 73">
+            <a:extLst>
+              <a:ext uri="{FF2B5EF4-FFF2-40B4-BE49-F238E27FC236}">
+                <a16:creationId xmlns:a16="http://schemas.microsoft.com/office/drawing/2014/main" id="{A0426C54-BC03-BAA4-1FC9-1D980CED6863}"/>
+              </a:ext>
+            </a:extLst>
+          </p:cNvPr>
+          <p:cNvSpPr txBox="1"/>
+          <p:nvPr/>
+        </p:nvSpPr>
+        <p:spPr>
+          <a:xfrm>
+            <a:off x="577295" y="5810363"/>
+            <a:ext cx="2080178" cy="462756"/>
+          </a:xfrm>
+          <a:prstGeom prst="rect">
+            <a:avLst/>
+          </a:prstGeom>
+          <a:solidFill>
+            <a:schemeClr val="bg1"/>
+          </a:solidFill>
+          <a:ln w="19050">
+            <a:solidFill>
+              <a:srgbClr val="FF0000"/>
+            </a:solidFill>
+          </a:ln>
+        </p:spPr>
+        <p:txBody>
+          <a:bodyPr wrap="square" lIns="36000" tIns="36000" rIns="36000" bIns="36000" rtlCol="0">
+            <a:noAutofit/>
+          </a:bodyPr>
+          <a:lstStyle/>
+          <a:p>
+            <a:r>
+              <a:rPr lang="en-US" sz="1100" b="1" dirty="0">
+                <a:solidFill>
+                  <a:srgbClr val="FF0000"/>
+                </a:solidFill>
+              </a:rPr>
+              <a:t>Train docking is not detected, accident may happen !</a:t>
+            </a:r>
+            <a:endParaRPr lang="en-SG" sz="1100" b="1" dirty="0">
+              <a:solidFill>
+                <a:srgbClr val="FF0000"/>
+              </a:solidFill>
+            </a:endParaRPr>
+          </a:p>
+        </p:txBody>
+      </p:sp>
+    </p:spTree>
+    <p:extLst>
+      <p:ext uri="{BB962C8B-B14F-4D97-AF65-F5344CB8AC3E}">
+        <p14:creationId xmlns:p14="http://schemas.microsoft.com/office/powerpoint/2010/main" val="321429417"/>
       </p:ext>
     </p:extLst>
   </p:cSld>

</xml_diff>

<commit_message>
update the readme file.
</commit_message>
<xml_diff>
--- a/doc/designDoc.pptx
+++ b/doc/designDoc.pptx
@@ -4889,7 +4889,7 @@
         </p:nvSpPr>
         <p:spPr>
           <a:xfrm>
-            <a:off x="5139689" y="5430378"/>
+            <a:off x="4526883" y="4962068"/>
             <a:ext cx="1144339" cy="461665"/>
           </a:xfrm>
           <a:prstGeom prst="rect">
@@ -5105,7 +5105,7 @@
         </p:nvSpPr>
         <p:spPr>
           <a:xfrm>
-            <a:off x="10024016" y="4862255"/>
+            <a:off x="10680048" y="4236394"/>
             <a:ext cx="1245964" cy="461665"/>
           </a:xfrm>
           <a:prstGeom prst="rect">
@@ -5185,13 +5185,16 @@
         </p:nvCxnSpPr>
         <p:spPr>
           <a:xfrm flipV="1">
-            <a:off x="8551424" y="3215228"/>
-            <a:ext cx="0" cy="1161079"/>
+            <a:off x="8547896" y="3215228"/>
+            <a:ext cx="3528" cy="847166"/>
           </a:xfrm>
           <a:prstGeom prst="straightConnector1">
             <a:avLst/>
           </a:prstGeom>
           <a:ln w="12700">
+            <a:solidFill>
+              <a:srgbClr val="FF0000"/>
+            </a:solidFill>
             <a:prstDash val="dash"/>
             <a:tailEnd type="triangle"/>
           </a:ln>
@@ -5225,7 +5228,7 @@
         </p:nvSpPr>
         <p:spPr>
           <a:xfrm>
-            <a:off x="7978468" y="4341865"/>
+            <a:off x="7999861" y="4054162"/>
             <a:ext cx="1379127" cy="461665"/>
           </a:xfrm>
           <a:prstGeom prst="rect">
@@ -5490,7 +5493,13 @@
           <a:lstStyle/>
           <a:p>
             <a:r>
-              <a:rPr lang="en-SG" sz="1200" b="1" dirty="0"/>
+              <a:rPr lang="en-SG" sz="1200" b="1" dirty="0">
+                <a:solidFill>
+                  <a:schemeClr val="accent2">
+                    <a:lumMod val="75000"/>
+                  </a:schemeClr>
+                </a:solidFill>
+              </a:rPr>
               <a:t>surveillance  camera </a:t>
             </a:r>
           </a:p>
@@ -5569,8 +5578,18 @@
           <a:lstStyle/>
           <a:p>
             <a:r>
+              <a:rPr lang="en-US" sz="1200" b="1" dirty="0">
+                <a:solidFill>
+                  <a:schemeClr val="accent2">
+                    <a:lumMod val="75000"/>
+                  </a:schemeClr>
+                </a:solidFill>
+              </a:rPr>
+              <a:t>Train</a:t>
+            </a:r>
+            <a:r>
               <a:rPr lang="en-US" sz="1200" b="1" dirty="0"/>
-              <a:t>Train </a:t>
+              <a:t> </a:t>
             </a:r>
             <a:endParaRPr lang="en-SG" sz="1200" b="1" dirty="0"/>
           </a:p>
@@ -5649,10 +5668,22 @@
           <a:lstStyle/>
           <a:p>
             <a:r>
-              <a:rPr lang="en-US" sz="1200" b="1" dirty="0"/>
+              <a:rPr lang="en-US" sz="1200" b="1" dirty="0">
+                <a:solidFill>
+                  <a:schemeClr val="accent2">
+                    <a:lumMod val="75000"/>
+                  </a:schemeClr>
+                </a:solidFill>
+              </a:rPr>
               <a:t>Station’s train entrance detection sensor </a:t>
             </a:r>
-            <a:endParaRPr lang="en-SG" sz="1200" b="1" dirty="0"/>
+            <a:endParaRPr lang="en-SG" sz="1200" b="1" dirty="0">
+              <a:solidFill>
+                <a:schemeClr val="accent2">
+                  <a:lumMod val="75000"/>
+                </a:schemeClr>
+              </a:solidFill>
+            </a:endParaRPr>
           </a:p>
         </p:txBody>
       </p:sp>
@@ -5693,7 +5724,7 @@
                   </a:schemeClr>
                 </a:solidFill>
               </a:rPr>
-              <a:t>Train docking signal from the station entrance sensor </a:t>
+              <a:t>Train docking signal from the station entrance sensor (PLC)</a:t>
             </a:r>
             <a:endParaRPr lang="en-SG" sz="1200" b="1" dirty="0">
               <a:solidFill>
@@ -5773,7 +5804,7 @@
         </p:nvCxnSpPr>
         <p:spPr>
           <a:xfrm flipV="1">
-            <a:off x="4126527" y="4288471"/>
+            <a:off x="4068756" y="4301994"/>
             <a:ext cx="0" cy="400666"/>
           </a:xfrm>
           <a:prstGeom prst="straightConnector1">
@@ -5830,10 +5861,22 @@
           <a:lstStyle/>
           <a:p>
             <a:r>
-              <a:rPr lang="en-US" sz="1200" b="1" dirty="0"/>
+              <a:rPr lang="en-US" sz="1200" b="1" dirty="0">
+                <a:solidFill>
+                  <a:schemeClr val="accent2">
+                    <a:lumMod val="75000"/>
+                  </a:schemeClr>
+                </a:solidFill>
+              </a:rPr>
               <a:t>Train station </a:t>
             </a:r>
-            <a:endParaRPr lang="en-SG" sz="1200" b="1" dirty="0"/>
+            <a:endParaRPr lang="en-SG" sz="1200" b="1" dirty="0">
+              <a:solidFill>
+                <a:schemeClr val="accent2">
+                  <a:lumMod val="75000"/>
+                </a:schemeClr>
+              </a:solidFill>
+            </a:endParaRPr>
           </a:p>
         </p:txBody>
       </p:sp>
@@ -6068,7 +6111,7 @@
                   </a:schemeClr>
                 </a:solidFill>
               </a:rPr>
-              <a:t>Railway Surveillance camera  train objective and motion detection </a:t>
+              <a:t>Railway Surveillance camera  train objective and motion detection result </a:t>
             </a:r>
           </a:p>
         </p:txBody>
@@ -6089,7 +6132,7 @@
         </p:nvCxnSpPr>
         <p:spPr>
           <a:xfrm>
-            <a:off x="7465005" y="5677509"/>
+            <a:off x="7797931" y="5189470"/>
             <a:ext cx="403860" cy="0"/>
           </a:xfrm>
           <a:prstGeom prst="straightConnector1">
@@ -6131,7 +6174,7 @@
         </p:nvSpPr>
         <p:spPr>
           <a:xfrm>
-            <a:off x="7819040" y="5457383"/>
+            <a:off x="8197255" y="4962068"/>
             <a:ext cx="1822779" cy="461665"/>
           </a:xfrm>
           <a:prstGeom prst="rect">
@@ -6147,7 +6190,7 @@
           <a:p>
             <a:r>
               <a:rPr lang="en-US" sz="1200" b="1" dirty="0"/>
-              <a:t>Normal train camera  safety check workflow </a:t>
+              <a:t>Normal train camera  safety check progress</a:t>
             </a:r>
             <a:endParaRPr lang="en-SG" sz="1200" b="1" dirty="0"/>
           </a:p>
@@ -6169,7 +6212,7 @@
         </p:nvCxnSpPr>
         <p:spPr>
           <a:xfrm>
-            <a:off x="10015498" y="5700140"/>
+            <a:off x="10015498" y="5189470"/>
             <a:ext cx="335424" cy="0"/>
           </a:xfrm>
           <a:prstGeom prst="straightConnector1">
@@ -6211,7 +6254,7 @@
         </p:nvSpPr>
         <p:spPr>
           <a:xfrm>
-            <a:off x="10350922" y="5446676"/>
+            <a:off x="10362526" y="4963152"/>
             <a:ext cx="1822779" cy="461665"/>
           </a:xfrm>
           <a:prstGeom prst="rect">
@@ -6227,7 +6270,7 @@
           <a:p>
             <a:r>
               <a:rPr lang="en-US" sz="1200" b="1" dirty="0"/>
-              <a:t>Exception workflow after replay attack</a:t>
+              <a:t>Error camera workflow after replay attack</a:t>
             </a:r>
             <a:endParaRPr lang="en-SG" sz="1200" b="1" dirty="0"/>
           </a:p>
@@ -6247,7 +6290,7 @@
         </p:nvSpPr>
         <p:spPr>
           <a:xfrm>
-            <a:off x="338668" y="399041"/>
+            <a:off x="325653" y="593266"/>
             <a:ext cx="3270083" cy="584775"/>
           </a:xfrm>
           <a:prstGeom prst="rect">

</xml_diff>